<commit_message>
added slides and updated samples
</commit_message>
<xml_diff>
--- a/groovyfx-entfesselt-javafx/groovyfx-oop-2012.pptx
+++ b/groovyfx-entfesselt-javafx/groovyfx-oop-2012.pptx
@@ -6,10 +6,10 @@
     <p:sldMasterId id="2147483723" r:id="rId6"/>
   </p:sldMasterIdLst>
   <p:notesMasterIdLst>
-    <p:notesMasterId r:id="rId29"/>
+    <p:notesMasterId r:id="rId33"/>
   </p:notesMasterIdLst>
   <p:handoutMasterIdLst>
-    <p:handoutMasterId r:id="rId30"/>
+    <p:handoutMasterId r:id="rId34"/>
   </p:handoutMasterIdLst>
   <p:sldIdLst>
     <p:sldId id="286" r:id="rId7"/>
@@ -27,13 +27,17 @@
     <p:sldId id="306" r:id="rId19"/>
     <p:sldId id="307" r:id="rId20"/>
     <p:sldId id="309" r:id="rId21"/>
-    <p:sldId id="308" r:id="rId22"/>
-    <p:sldId id="292" r:id="rId23"/>
-    <p:sldId id="293" r:id="rId24"/>
-    <p:sldId id="302" r:id="rId25"/>
-    <p:sldId id="303" r:id="rId26"/>
-    <p:sldId id="304" r:id="rId27"/>
-    <p:sldId id="305" r:id="rId28"/>
+    <p:sldId id="313" r:id="rId22"/>
+    <p:sldId id="308" r:id="rId23"/>
+    <p:sldId id="292" r:id="rId24"/>
+    <p:sldId id="293" r:id="rId25"/>
+    <p:sldId id="310" r:id="rId26"/>
+    <p:sldId id="311" r:id="rId27"/>
+    <p:sldId id="312" r:id="rId28"/>
+    <p:sldId id="302" r:id="rId29"/>
+    <p:sldId id="303" r:id="rId30"/>
+    <p:sldId id="304" r:id="rId31"/>
+    <p:sldId id="305" r:id="rId32"/>
   </p:sldIdLst>
   <p:sldSz cx="9144000" cy="6858000" type="screen4x3"/>
   <p:notesSz cx="6858000" cy="9144000"/>
@@ -368,7 +372,7 @@
     </p:spTree>
     <p:extLst>
       <p:ext uri="{BB962C8B-B14F-4D97-AF65-F5344CB8AC3E}">
-        <p14:creationId xmlns="" xmlns:p14="http://schemas.microsoft.com/office/powerpoint/2010/main" val="143795665"/>
+        <p14:creationId xmlns:p14="http://schemas.microsoft.com/office/powerpoint/2010/main" xmlns="" val="143795665"/>
       </p:ext>
     </p:extLst>
   </p:cSld>
@@ -632,7 +636,7 @@
     </p:spTree>
     <p:extLst>
       <p:ext uri="{BB962C8B-B14F-4D97-AF65-F5344CB8AC3E}">
-        <p14:creationId xmlns="" xmlns:p14="http://schemas.microsoft.com/office/powerpoint/2010/main" val="3015979536"/>
+        <p14:creationId xmlns:p14="http://schemas.microsoft.com/office/powerpoint/2010/main" xmlns="" val="3015979536"/>
       </p:ext>
     </p:extLst>
   </p:cSld>
@@ -1235,7 +1239,7 @@
             <a:fld id="{133286C6-4904-4CD0-891D-2F37ADC6A93C}" type="slidenum">
               <a:rPr lang="de-DE" smtClean="0"/>
               <a:pPr/>
-              <a:t>19</a:t>
+              <a:t>23</a:t>
             </a:fld>
             <a:endParaRPr lang="de-DE"/>
           </a:p>
@@ -1317,7 +1321,7 @@
             <a:fld id="{133286C6-4904-4CD0-891D-2F37ADC6A93C}" type="slidenum">
               <a:rPr lang="de-DE" smtClean="0"/>
               <a:pPr/>
-              <a:t>22</a:t>
+              <a:t>26</a:t>
             </a:fld>
             <a:endParaRPr lang="de-DE"/>
           </a:p>
@@ -8140,7 +8144,7 @@
           <p:nvPr userDrawn="1">
             <p:extLst>
               <p:ext uri="{D42A27DB-BD31-4B8C-83A1-F6EECF244321}">
-                <p14:modId xmlns="" xmlns:p14="http://schemas.microsoft.com/office/powerpoint/2010/main" val="1305585469"/>
+                <p14:modId xmlns:p14="http://schemas.microsoft.com/office/powerpoint/2010/main" xmlns="" val="1305585469"/>
               </p:ext>
             </p:extLst>
           </p:nvPr>
@@ -11126,7 +11130,7 @@
     </p:spTree>
     <p:extLst>
       <p:ext uri="{BB962C8B-B14F-4D97-AF65-F5344CB8AC3E}">
-        <p14:creationId xmlns="" xmlns:p14="http://schemas.microsoft.com/office/powerpoint/2010/main" val="844123879"/>
+        <p14:creationId xmlns:p14="http://schemas.microsoft.com/office/powerpoint/2010/main" xmlns="" val="844123879"/>
       </p:ext>
     </p:extLst>
   </p:cSld>
@@ -11331,7 +11335,7 @@
     </p:spTree>
     <p:extLst>
       <p:ext uri="{BB962C8B-B14F-4D97-AF65-F5344CB8AC3E}">
-        <p14:creationId xmlns="" xmlns:p14="http://schemas.microsoft.com/office/powerpoint/2010/main" val="2057847455"/>
+        <p14:creationId xmlns:p14="http://schemas.microsoft.com/office/powerpoint/2010/main" xmlns="" val="2057847455"/>
       </p:ext>
     </p:extLst>
   </p:cSld>
@@ -11408,7 +11412,7 @@
     </p:spTree>
     <p:extLst>
       <p:ext uri="{BB962C8B-B14F-4D97-AF65-F5344CB8AC3E}">
-        <p14:creationId xmlns="" xmlns:p14="http://schemas.microsoft.com/office/powerpoint/2010/main" val="1363170605"/>
+        <p14:creationId xmlns:p14="http://schemas.microsoft.com/office/powerpoint/2010/main" xmlns="" val="1363170605"/>
       </p:ext>
     </p:extLst>
   </p:cSld>
@@ -11513,7 +11517,7 @@
     </p:spTree>
     <p:extLst>
       <p:ext uri="{BB962C8B-B14F-4D97-AF65-F5344CB8AC3E}">
-        <p14:creationId xmlns="" xmlns:p14="http://schemas.microsoft.com/office/powerpoint/2010/main" val="3061540536"/>
+        <p14:creationId xmlns:p14="http://schemas.microsoft.com/office/powerpoint/2010/main" xmlns="" val="3061540536"/>
       </p:ext>
     </p:extLst>
   </p:cSld>
@@ -11521,7 +11525,7 @@
     <a:masterClrMapping/>
   </p:clrMapOvr>
   <mc:AlternateContent xmlns:mc="http://schemas.openxmlformats.org/markup-compatibility/2006">
-    <mc:Choice xmlns="" xmlns:p14="http://schemas.microsoft.com/office/powerpoint/2010/main" Requires="p14">
+    <mc:Choice xmlns:p14="http://schemas.microsoft.com/office/powerpoint/2010/main" xmlns="" Requires="p14">
       <p:transition spd="med" p14:dur="700">
         <p:fade/>
       </p:transition>
@@ -11646,7 +11650,7 @@
     </p:spTree>
     <p:extLst>
       <p:ext uri="{BB962C8B-B14F-4D97-AF65-F5344CB8AC3E}">
-        <p14:creationId xmlns="" xmlns:p14="http://schemas.microsoft.com/office/powerpoint/2010/main" val="3295006165"/>
+        <p14:creationId xmlns:p14="http://schemas.microsoft.com/office/powerpoint/2010/main" xmlns="" val="3295006165"/>
       </p:ext>
     </p:extLst>
   </p:cSld>
@@ -11775,7 +11779,7 @@
     </p:spTree>
     <p:extLst>
       <p:ext uri="{BB962C8B-B14F-4D97-AF65-F5344CB8AC3E}">
-        <p14:creationId xmlns="" xmlns:p14="http://schemas.microsoft.com/office/powerpoint/2010/main" val="2651243940"/>
+        <p14:creationId xmlns:p14="http://schemas.microsoft.com/office/powerpoint/2010/main" xmlns="" val="2651243940"/>
       </p:ext>
     </p:extLst>
   </p:cSld>
@@ -12969,7 +12973,7 @@
     </p:spTree>
     <p:extLst>
       <p:ext uri="{BB962C8B-B14F-4D97-AF65-F5344CB8AC3E}">
-        <p14:creationId xmlns="" xmlns:p14="http://schemas.microsoft.com/office/powerpoint/2010/main" val="3634760287"/>
+        <p14:creationId xmlns:p14="http://schemas.microsoft.com/office/powerpoint/2010/main" xmlns="" val="3634760287"/>
       </p:ext>
     </p:extLst>
   </p:cSld>
@@ -13116,7 +13120,7 @@
     </p:spTree>
     <p:extLst>
       <p:ext uri="{BB962C8B-B14F-4D97-AF65-F5344CB8AC3E}">
-        <p14:creationId xmlns="" xmlns:p14="http://schemas.microsoft.com/office/powerpoint/2010/main" val="3463583603"/>
+        <p14:creationId xmlns:p14="http://schemas.microsoft.com/office/powerpoint/2010/main" xmlns="" val="3463583603"/>
       </p:ext>
     </p:extLst>
   </p:cSld>
@@ -13328,7 +13332,7 @@
     </p:spTree>
     <p:extLst>
       <p:ext uri="{BB962C8B-B14F-4D97-AF65-F5344CB8AC3E}">
-        <p14:creationId xmlns="" xmlns:p14="http://schemas.microsoft.com/office/powerpoint/2010/main" val="3494811284"/>
+        <p14:creationId xmlns:p14="http://schemas.microsoft.com/office/powerpoint/2010/main" xmlns="" val="3494811284"/>
       </p:ext>
     </p:extLst>
   </p:cSld>
@@ -13634,7 +13638,7 @@
     </p:spTree>
     <p:extLst>
       <p:ext uri="{BB962C8B-B14F-4D97-AF65-F5344CB8AC3E}">
-        <p14:creationId xmlns="" xmlns:p14="http://schemas.microsoft.com/office/powerpoint/2010/main" val="1453913930"/>
+        <p14:creationId xmlns:p14="http://schemas.microsoft.com/office/powerpoint/2010/main" xmlns="" val="1453913930"/>
       </p:ext>
     </p:extLst>
   </p:cSld>
@@ -14074,7 +14078,7 @@
     </p:spTree>
     <p:extLst>
       <p:ext uri="{BB962C8B-B14F-4D97-AF65-F5344CB8AC3E}">
-        <p14:creationId xmlns="" xmlns:p14="http://schemas.microsoft.com/office/powerpoint/2010/main" val="275773452"/>
+        <p14:creationId xmlns:p14="http://schemas.microsoft.com/office/powerpoint/2010/main" xmlns="" val="275773452"/>
       </p:ext>
     </p:extLst>
   </p:cSld>
@@ -21188,7 +21192,7 @@
     </p:spTree>
     <p:extLst>
       <p:ext uri="{BB962C8B-B14F-4D97-AF65-F5344CB8AC3E}">
-        <p14:creationId xmlns="" xmlns:p14="http://schemas.microsoft.com/office/powerpoint/2010/main" val="2421447281"/>
+        <p14:creationId xmlns:p14="http://schemas.microsoft.com/office/powerpoint/2010/main" xmlns="" val="2421447281"/>
       </p:ext>
     </p:extLst>
   </p:cSld>
@@ -21550,6 +21554,32 @@
           </a:p>
         </p:txBody>
       </p:sp>
+      <p:pic>
+        <p:nvPicPr>
+          <p:cNvPr id="28674" name="Picture 2" descr="https://github.com/groovyfx-project/groovyfx/raw/develop/artwork/GroovyFX_logo.png"/>
+          <p:cNvPicPr>
+            <a:picLocks noChangeAspect="1" noChangeArrowheads="1"/>
+          </p:cNvPicPr>
+          <p:nvPr/>
+        </p:nvPicPr>
+        <p:blipFill>
+          <a:blip r:embed="rId2" cstate="print"/>
+          <a:srcRect/>
+          <a:stretch>
+            <a:fillRect/>
+          </a:stretch>
+        </p:blipFill>
+        <p:spPr bwMode="auto">
+          <a:xfrm>
+            <a:off x="3619500" y="404664"/>
+            <a:ext cx="1905000" cy="1905000"/>
+          </a:xfrm>
+          <a:prstGeom prst="rect">
+            <a:avLst/>
+          </a:prstGeom>
+          <a:noFill/>
+        </p:spPr>
+      </p:pic>
     </p:spTree>
   </p:cSld>
   <p:clrMapOvr>
@@ -25593,11 +25623,96 @@
           </a:p>
         </p:txBody>
       </p:sp>
+      <p:sp>
+        <p:nvSpPr>
+          <p:cNvPr id="4" name="Textfeld 3"/>
+          <p:cNvSpPr txBox="1"/>
+          <p:nvPr/>
+        </p:nvSpPr>
+        <p:spPr>
+          <a:xfrm>
+            <a:off x="2843808" y="6381328"/>
+            <a:ext cx="6156358" cy="369332"/>
+          </a:xfrm>
+          <a:prstGeom prst="rect">
+            <a:avLst/>
+          </a:prstGeom>
+          <a:noFill/>
+        </p:spPr>
+        <p:txBody>
+          <a:bodyPr wrap="square" rtlCol="0">
+            <a:spAutoFit/>
+          </a:bodyPr>
+          <a:lstStyle/>
+          <a:p>
+            <a:pPr algn="r"/>
+            <a:r>
+              <a:rPr lang="de-DE" dirty="0" smtClean="0">
+                <a:solidFill>
+                  <a:schemeClr val="tx1">
+                    <a:lumMod val="50000"/>
+                    <a:lumOff val="50000"/>
+                  </a:schemeClr>
+                </a:solidFill>
+              </a:rPr>
+              <a:t>Zum Ausprobieren: </a:t>
+            </a:r>
+            <a:r>
+              <a:rPr lang="de-DE" dirty="0" err="1" smtClean="0">
+                <a:solidFill>
+                  <a:schemeClr val="tx1">
+                    <a:lumMod val="50000"/>
+                    <a:lumOff val="50000"/>
+                  </a:schemeClr>
+                </a:solidFill>
+              </a:rPr>
+              <a:t>gradle</a:t>
+            </a:r>
+            <a:r>
+              <a:rPr lang="de-DE" dirty="0" smtClean="0">
+                <a:solidFill>
+                  <a:schemeClr val="tx1">
+                    <a:lumMod val="50000"/>
+                    <a:lumOff val="50000"/>
+                  </a:schemeClr>
+                </a:solidFill>
+              </a:rPr>
+              <a:t> </a:t>
+            </a:r>
+            <a:r>
+              <a:rPr lang="de-DE" dirty="0" err="1" smtClean="0">
+                <a:solidFill>
+                  <a:schemeClr val="tx1">
+                    <a:lumMod val="50000"/>
+                    <a:lumOff val="50000"/>
+                  </a:schemeClr>
+                </a:solidFill>
+              </a:rPr>
+              <a:t>HelloWorldSample</a:t>
+            </a:r>
+            <a:endParaRPr lang="de-DE" dirty="0">
+              <a:solidFill>
+                <a:schemeClr val="tx1">
+                  <a:lumMod val="50000"/>
+                  <a:lumOff val="50000"/>
+                </a:schemeClr>
+              </a:solidFill>
+            </a:endParaRPr>
+          </a:p>
+        </p:txBody>
+      </p:sp>
     </p:spTree>
   </p:cSld>
   <p:clrMapOvr>
     <a:masterClrMapping/>
   </p:clrMapOvr>
+  <p:timing>
+    <p:tnLst>
+      <p:par>
+        <p:cTn id="1" dur="indefinite" restart="never" nodeType="tmRoot"/>
+      </p:par>
+    </p:tnLst>
+  </p:timing>
 </p:sld>
 </file>
 
@@ -25634,54 +25749,78 @@
           <a:lstStyle/>
           <a:p>
             <a:r>
+              <a:rPr lang="de-DE" dirty="0" err="1" smtClean="0"/>
+              <a:t>Hello</a:t>
+            </a:r>
+            <a:r>
               <a:rPr lang="de-DE" dirty="0" smtClean="0"/>
-              <a:t>Ein paar Fakten</a:t>
+              <a:t> World mit </a:t>
+            </a:r>
+            <a:r>
+              <a:rPr lang="de-DE" dirty="0" err="1" smtClean="0"/>
+              <a:t>GroovyFX</a:t>
             </a:r>
             <a:endParaRPr lang="de-DE" dirty="0"/>
           </a:p>
         </p:txBody>
       </p:sp>
-      <p:sp>
-        <p:nvSpPr>
-          <p:cNvPr id="4" name="Inhaltsplatzhalter 3"/>
-          <p:cNvSpPr>
-            <a:spLocks noGrp="1"/>
-          </p:cNvSpPr>
+      <p:pic>
+        <p:nvPicPr>
+          <p:cNvPr id="71682" name="Picture 2"/>
+          <p:cNvPicPr>
+            <a:picLocks noGrp="1" noChangeAspect="1" noChangeArrowheads="1"/>
+          </p:cNvPicPr>
           <p:nvPr>
             <p:ph idx="1"/>
           </p:nvPr>
+        </p:nvPicPr>
+        <p:blipFill>
+          <a:blip r:embed="rId2" cstate="print"/>
+          <a:srcRect/>
+          <a:stretch>
+            <a:fillRect/>
+          </a:stretch>
+        </p:blipFill>
+        <p:spPr bwMode="auto">
+          <a:xfrm>
+            <a:off x="1714500" y="2529681"/>
+            <a:ext cx="5715000" cy="2667000"/>
+          </a:xfrm>
+          <a:prstGeom prst="rect">
+            <a:avLst/>
+          </a:prstGeom>
+          <a:noFill/>
+          <a:ln w="9525">
+            <a:noFill/>
+            <a:miter lim="800000"/>
+            <a:headEnd/>
+            <a:tailEnd/>
+          </a:ln>
+        </p:spPr>
+      </p:pic>
+      <p:sp>
+        <p:nvSpPr>
+          <p:cNvPr id="5" name="Textfeld 4"/>
+          <p:cNvSpPr txBox="1"/>
+          <p:nvPr/>
         </p:nvSpPr>
-        <p:spPr/>
+        <p:spPr>
+          <a:xfrm>
+            <a:off x="2843808" y="6381328"/>
+            <a:ext cx="6156358" cy="369332"/>
+          </a:xfrm>
+          <a:prstGeom prst="rect">
+            <a:avLst/>
+          </a:prstGeom>
+          <a:noFill/>
+        </p:spPr>
         <p:txBody>
-          <a:bodyPr/>
+          <a:bodyPr wrap="square" rtlCol="0">
+            <a:spAutoFit/>
+          </a:bodyPr>
           <a:lstStyle/>
           <a:p>
-            <a:r>
-              <a:rPr lang="de-DE" dirty="0" smtClean="0"/>
-              <a:t>Open-Source-Projekt</a:t>
-            </a:r>
-          </a:p>
-          <a:p>
-            <a:pPr lvl="1"/>
-            <a:r>
-              <a:rPr lang="de-DE" dirty="0" smtClean="0">
-                <a:solidFill>
-                  <a:schemeClr val="bg1">
-                    <a:lumMod val="50000"/>
-                  </a:schemeClr>
-                </a:solidFill>
-              </a:rPr>
-              <a:t>https://github.com/groovyfx-project/groovyfx</a:t>
-            </a:r>
-          </a:p>
-          <a:p>
-            <a:r>
-              <a:rPr lang="de-DE" dirty="0" smtClean="0"/>
-              <a:t>Entwicklungsteam</a:t>
-            </a:r>
-          </a:p>
-          <a:p>
-            <a:pPr lvl="1"/>
+            <a:pPr algn="r"/>
             <a:r>
               <a:rPr lang="de-DE" dirty="0" smtClean="0">
                 <a:solidFill>
@@ -25691,7 +25830,7 @@
                   </a:schemeClr>
                 </a:solidFill>
               </a:rPr>
-              <a:t>Dean </a:t>
+              <a:t>Zum Ausprobieren: </a:t>
             </a:r>
             <a:r>
               <a:rPr lang="de-DE" dirty="0" err="1" smtClean="0">
@@ -25702,7 +25841,7 @@
                   </a:schemeClr>
                 </a:solidFill>
               </a:rPr>
-              <a:t>Iverson</a:t>
+              <a:t>gradle</a:t>
             </a:r>
             <a:r>
               <a:rPr lang="de-DE" dirty="0" smtClean="0">
@@ -25713,7 +25852,18 @@
                   </a:schemeClr>
                 </a:solidFill>
               </a:rPr>
-              <a:t>, Jim Clarke</a:t>
+              <a:t> </a:t>
+            </a:r>
+            <a:r>
+              <a:rPr lang="de-DE" dirty="0" err="1" smtClean="0">
+                <a:solidFill>
+                  <a:schemeClr val="tx1">
+                    <a:lumMod val="50000"/>
+                    <a:lumOff val="50000"/>
+                  </a:schemeClr>
+                </a:solidFill>
+              </a:rPr>
+              <a:t>HelloWorldSample</a:t>
             </a:r>
             <a:endParaRPr lang="de-DE" dirty="0">
               <a:solidFill>
@@ -25767,12 +25917,8 @@
           <a:lstStyle/>
           <a:p>
             <a:r>
-              <a:rPr lang="de-DE" dirty="0" err="1" smtClean="0"/>
-              <a:t>GroovyFX</a:t>
-            </a:r>
-            <a:r>
               <a:rPr lang="de-DE" dirty="0" smtClean="0"/>
-              <a:t> an Beispielen</a:t>
+              <a:t>Ein paar Fakten</a:t>
             </a:r>
             <a:endParaRPr lang="de-DE" dirty="0"/>
           </a:p>
@@ -25780,12 +25926,12 @@
       </p:sp>
       <p:sp>
         <p:nvSpPr>
-          <p:cNvPr id="3" name="Textplatzhalter 2"/>
+          <p:cNvPr id="4" name="Inhaltsplatzhalter 3"/>
           <p:cNvSpPr>
             <a:spLocks noGrp="1"/>
           </p:cNvSpPr>
           <p:nvPr>
-            <p:ph type="body" idx="1"/>
+            <p:ph idx="1"/>
           </p:nvPr>
         </p:nvSpPr>
         <p:spPr/>
@@ -25793,7 +25939,184 @@
           <a:bodyPr/>
           <a:lstStyle/>
           <a:p>
-            <a:endParaRPr lang="de-DE"/>
+            <a:r>
+              <a:rPr lang="de-DE" dirty="0" smtClean="0">
+                <a:solidFill>
+                  <a:srgbClr val="002060"/>
+                </a:solidFill>
+              </a:rPr>
+              <a:t>Open-Source-Projekt</a:t>
+            </a:r>
+          </a:p>
+          <a:p>
+            <a:pPr lvl="1"/>
+            <a:r>
+              <a:rPr lang="de-DE" dirty="0" smtClean="0">
+                <a:solidFill>
+                  <a:srgbClr val="002060"/>
+                </a:solidFill>
+              </a:rPr>
+              <a:t>Alpha 1.0 Stadium</a:t>
+            </a:r>
+          </a:p>
+          <a:p>
+            <a:pPr lvl="1"/>
+            <a:r>
+              <a:rPr lang="de-DE" dirty="0" smtClean="0">
+                <a:solidFill>
+                  <a:srgbClr val="002060"/>
+                </a:solidFill>
+                <a:hlinkClick r:id="rId2"/>
+              </a:rPr>
+              <a:t>http</a:t>
+            </a:r>
+            <a:r>
+              <a:rPr lang="de-DE" dirty="0" smtClean="0">
+                <a:solidFill>
+                  <a:srgbClr val="002060"/>
+                </a:solidFill>
+                <a:hlinkClick r:id="rId2"/>
+              </a:rPr>
+              <a:t>://</a:t>
+            </a:r>
+            <a:r>
+              <a:rPr lang="de-DE" dirty="0" smtClean="0">
+                <a:solidFill>
+                  <a:srgbClr val="002060"/>
+                </a:solidFill>
+                <a:hlinkClick r:id="rId2"/>
+              </a:rPr>
+              <a:t>svn.codehaus.org/gmod/groovyfx/trunk</a:t>
+            </a:r>
+            <a:endParaRPr lang="de-DE" dirty="0" smtClean="0">
+              <a:solidFill>
+                <a:srgbClr val="002060"/>
+              </a:solidFill>
+            </a:endParaRPr>
+          </a:p>
+          <a:p>
+            <a:pPr lvl="1"/>
+            <a:r>
+              <a:rPr lang="de-DE" dirty="0" smtClean="0">
+                <a:solidFill>
+                  <a:srgbClr val="002060"/>
+                </a:solidFill>
+                <a:hlinkClick r:id="rId3"/>
+              </a:rPr>
+              <a:t>https</a:t>
+            </a:r>
+            <a:r>
+              <a:rPr lang="de-DE" dirty="0" smtClean="0">
+                <a:solidFill>
+                  <a:srgbClr val="002060"/>
+                </a:solidFill>
+                <a:hlinkClick r:id="rId3"/>
+              </a:rPr>
+              <a:t>://</a:t>
+            </a:r>
+            <a:r>
+              <a:rPr lang="de-DE" dirty="0" smtClean="0">
+                <a:solidFill>
+                  <a:srgbClr val="002060"/>
+                </a:solidFill>
+                <a:hlinkClick r:id="rId3"/>
+              </a:rPr>
+              <a:t>github.com/groovyfx-project/groovyfx</a:t>
+            </a:r>
+            <a:endParaRPr lang="de-DE" dirty="0" smtClean="0">
+              <a:solidFill>
+                <a:srgbClr val="002060"/>
+              </a:solidFill>
+            </a:endParaRPr>
+          </a:p>
+          <a:p>
+            <a:r>
+              <a:rPr lang="de-DE" dirty="0" smtClean="0">
+                <a:solidFill>
+                  <a:srgbClr val="002060"/>
+                </a:solidFill>
+              </a:rPr>
+              <a:t>Project-Lead</a:t>
+            </a:r>
+            <a:endParaRPr lang="de-DE" dirty="0" smtClean="0">
+              <a:solidFill>
+                <a:srgbClr val="002060"/>
+              </a:solidFill>
+            </a:endParaRPr>
+          </a:p>
+          <a:p>
+            <a:pPr lvl="1"/>
+            <a:r>
+              <a:rPr lang="de-DE" dirty="0" smtClean="0">
+                <a:solidFill>
+                  <a:srgbClr val="002060"/>
+                </a:solidFill>
+              </a:rPr>
+              <a:t>Jim Clarke, Dean </a:t>
+            </a:r>
+            <a:r>
+              <a:rPr lang="de-DE" dirty="0" err="1" smtClean="0">
+                <a:solidFill>
+                  <a:srgbClr val="002060"/>
+                </a:solidFill>
+              </a:rPr>
+              <a:t>Iverson</a:t>
+            </a:r>
+            <a:r>
+              <a:rPr lang="de-DE" dirty="0" smtClean="0">
+                <a:solidFill>
+                  <a:srgbClr val="002060"/>
+                </a:solidFill>
+              </a:rPr>
+              <a:t>, Dierk König</a:t>
+            </a:r>
+            <a:endParaRPr lang="de-DE" dirty="0" smtClean="0">
+              <a:solidFill>
+                <a:srgbClr val="002060"/>
+              </a:solidFill>
+            </a:endParaRPr>
+          </a:p>
+          <a:p>
+            <a:r>
+              <a:rPr lang="de-DE" dirty="0" smtClean="0">
+                <a:solidFill>
+                  <a:srgbClr val="002060"/>
+                </a:solidFill>
+              </a:rPr>
+              <a:t>Lizenz</a:t>
+            </a:r>
+          </a:p>
+          <a:p>
+            <a:pPr lvl="1"/>
+            <a:r>
+              <a:rPr lang="de-DE" dirty="0" smtClean="0">
+                <a:solidFill>
+                  <a:srgbClr val="002060"/>
+                </a:solidFill>
+              </a:rPr>
+              <a:t>Apache </a:t>
+            </a:r>
+            <a:r>
+              <a:rPr lang="de-DE" dirty="0" err="1" smtClean="0">
+                <a:solidFill>
+                  <a:srgbClr val="002060"/>
+                </a:solidFill>
+              </a:rPr>
+              <a:t>License</a:t>
+            </a:r>
+            <a:r>
+              <a:rPr lang="de-DE" dirty="0" smtClean="0">
+                <a:solidFill>
+                  <a:srgbClr val="002060"/>
+                </a:solidFill>
+              </a:rPr>
+              <a:t>, Version 2.0</a:t>
+            </a:r>
+            <a:endParaRPr lang="de-DE" dirty="0">
+              <a:solidFill>
+                <a:srgbClr val="002060"/>
+              </a:solidFill>
+            </a:endParaRPr>
           </a:p>
         </p:txBody>
       </p:sp>
@@ -25831,7 +26154,7 @@
       </p:grpSpPr>
       <p:sp>
         <p:nvSpPr>
-          <p:cNvPr id="3" name="Titel 2"/>
+          <p:cNvPr id="2" name="Titel 1"/>
           <p:cNvSpPr>
             <a:spLocks noGrp="1"/>
           </p:cNvSpPr>
@@ -25844,18 +26167,26 @@
           <a:bodyPr/>
           <a:lstStyle/>
           <a:p>
-            <a:endParaRPr lang="de-DE"/>
+            <a:r>
+              <a:rPr lang="de-DE" dirty="0" err="1" smtClean="0"/>
+              <a:t>GroovyFX</a:t>
+            </a:r>
+            <a:r>
+              <a:rPr lang="de-DE" dirty="0" smtClean="0"/>
+              <a:t> an Beispielen</a:t>
+            </a:r>
+            <a:endParaRPr lang="de-DE" dirty="0"/>
           </a:p>
         </p:txBody>
       </p:sp>
       <p:sp>
         <p:nvSpPr>
-          <p:cNvPr id="5" name="Inhaltsplatzhalter 4"/>
+          <p:cNvPr id="3" name="Textplatzhalter 2"/>
           <p:cNvSpPr>
             <a:spLocks noGrp="1"/>
           </p:cNvSpPr>
           <p:nvPr>
-            <p:ph idx="1"/>
+            <p:ph type="body" idx="1"/>
           </p:nvPr>
         </p:nvSpPr>
         <p:spPr/>
@@ -25872,7 +26203,6 @@
   <p:clrMapOvr>
     <a:masterClrMapping/>
   </p:clrMapOvr>
-  <p:transition/>
   <p:timing>
     <p:tnLst>
       <p:par>
@@ -25902,7 +26232,7 @@
       </p:grpSpPr>
       <p:sp>
         <p:nvSpPr>
-          <p:cNvPr id="2" name="Titel 1"/>
+          <p:cNvPr id="3" name="Titel 2"/>
           <p:cNvSpPr>
             <a:spLocks noGrp="1"/>
           </p:cNvSpPr>
@@ -25916,36 +26246,1234 @@
           <a:lstStyle/>
           <a:p>
             <a:r>
-              <a:rPr lang="en-US" dirty="0" err="1" smtClean="0"/>
-              <a:t>Fazit</a:t>
+              <a:rPr lang="de-DE" dirty="0" smtClean="0"/>
+              <a:t>Properties in </a:t>
+            </a:r>
+            <a:r>
+              <a:rPr lang="de-DE" dirty="0" err="1" smtClean="0"/>
+              <a:t>JavaFX</a:t>
             </a:r>
             <a:endParaRPr lang="de-DE" dirty="0"/>
           </a:p>
         </p:txBody>
       </p:sp>
-      <p:pic>
-        <p:nvPicPr>
-          <p:cNvPr id="6" name="Inhaltsplatzhalter 5" descr="puzzle01.jpg"/>
-          <p:cNvPicPr>
-            <a:picLocks noGrp="1" noChangeAspect="1"/>
-          </p:cNvPicPr>
+      <p:sp>
+        <p:nvSpPr>
+          <p:cNvPr id="5" name="Inhaltsplatzhalter 4"/>
+          <p:cNvSpPr>
+            <a:spLocks noGrp="1"/>
+          </p:cNvSpPr>
           <p:nvPr>
             <p:ph idx="1"/>
           </p:nvPr>
-        </p:nvPicPr>
-        <p:blipFill>
-          <a:blip r:embed="rId3" cstate="print"/>
-          <a:stretch>
-            <a:fillRect/>
-          </a:stretch>
-        </p:blipFill>
+        </p:nvSpPr>
         <p:spPr>
           <a:xfrm>
-            <a:off x="566041" y="1268700"/>
-            <a:ext cx="8011918" cy="4822825"/>
+            <a:off x="457200" y="1600200"/>
+            <a:ext cx="8229600" cy="4997152"/>
           </a:xfrm>
         </p:spPr>
-      </p:pic>
+        <p:txBody>
+          <a:bodyPr>
+            <a:normAutofit lnSpcReduction="10000"/>
+          </a:bodyPr>
+          <a:lstStyle/>
+          <a:p>
+            <a:pPr marL="0" indent="0">
+              <a:buNone/>
+            </a:pPr>
+            <a:r>
+              <a:rPr lang="de-DE" sz="1600" b="0" dirty="0" err="1" smtClean="0">
+                <a:solidFill>
+                  <a:srgbClr val="770088"/>
+                </a:solidFill>
+                <a:latin typeface="Consolas" pitchFamily="49" charset="0"/>
+                <a:cs typeface="Consolas" pitchFamily="49" charset="0"/>
+              </a:rPr>
+              <a:t>public</a:t>
+            </a:r>
+            <a:r>
+              <a:rPr lang="de-DE" sz="1600" b="0" dirty="0" smtClean="0">
+                <a:solidFill>
+                  <a:srgbClr val="770088"/>
+                </a:solidFill>
+                <a:latin typeface="Consolas" pitchFamily="49" charset="0"/>
+                <a:cs typeface="Consolas" pitchFamily="49" charset="0"/>
+              </a:rPr>
+              <a:t> </a:t>
+            </a:r>
+            <a:r>
+              <a:rPr lang="de-DE" sz="1600" b="0" dirty="0" err="1" smtClean="0">
+                <a:solidFill>
+                  <a:srgbClr val="770088"/>
+                </a:solidFill>
+                <a:latin typeface="Consolas" pitchFamily="49" charset="0"/>
+                <a:cs typeface="Consolas" pitchFamily="49" charset="0"/>
+              </a:rPr>
+              <a:t>class</a:t>
+            </a:r>
+            <a:r>
+              <a:rPr lang="de-DE" sz="1600" b="0" dirty="0" smtClean="0">
+                <a:solidFill>
+                  <a:srgbClr val="770088"/>
+                </a:solidFill>
+                <a:latin typeface="Consolas" pitchFamily="49" charset="0"/>
+                <a:cs typeface="Consolas" pitchFamily="49" charset="0"/>
+              </a:rPr>
+              <a:t> </a:t>
+            </a:r>
+            <a:r>
+              <a:rPr lang="de-DE" sz="1600" b="0" dirty="0" err="1" smtClean="0">
+                <a:solidFill>
+                  <a:srgbClr val="000000"/>
+                </a:solidFill>
+                <a:latin typeface="Consolas" pitchFamily="49" charset="0"/>
+                <a:cs typeface="Consolas" pitchFamily="49" charset="0"/>
+              </a:rPr>
+              <a:t>PersonInJava</a:t>
+            </a:r>
+            <a:r>
+              <a:rPr lang="de-DE" sz="1600" b="0" dirty="0" smtClean="0">
+                <a:solidFill>
+                  <a:srgbClr val="000000"/>
+                </a:solidFill>
+                <a:latin typeface="Consolas" pitchFamily="49" charset="0"/>
+                <a:cs typeface="Consolas" pitchFamily="49" charset="0"/>
+              </a:rPr>
+              <a:t> </a:t>
+            </a:r>
+            <a:r>
+              <a:rPr lang="de-DE" sz="1600" b="0" dirty="0" smtClean="0">
+                <a:solidFill>
+                  <a:srgbClr val="666666"/>
+                </a:solidFill>
+                <a:latin typeface="Consolas" pitchFamily="49" charset="0"/>
+                <a:cs typeface="Consolas" pitchFamily="49" charset="0"/>
+              </a:rPr>
+              <a:t>{</a:t>
+            </a:r>
+            <a:r>
+              <a:rPr lang="de-DE" sz="1600" dirty="0" smtClean="0">
+                <a:latin typeface="Consolas" pitchFamily="49" charset="0"/>
+                <a:cs typeface="Consolas" pitchFamily="49" charset="0"/>
+              </a:rPr>
+              <a:t/>
+            </a:r>
+            <a:br>
+              <a:rPr lang="de-DE" sz="1600" dirty="0" smtClean="0">
+                <a:latin typeface="Consolas" pitchFamily="49" charset="0"/>
+                <a:cs typeface="Consolas" pitchFamily="49" charset="0"/>
+              </a:rPr>
+            </a:br>
+            <a:r>
+              <a:rPr lang="de-DE" sz="1600" b="0" dirty="0" smtClean="0">
+                <a:solidFill>
+                  <a:srgbClr val="666666"/>
+                </a:solidFill>
+                <a:latin typeface="Consolas" pitchFamily="49" charset="0"/>
+                <a:cs typeface="Consolas" pitchFamily="49" charset="0"/>
+              </a:rPr>
+              <a:t>    </a:t>
+            </a:r>
+            <a:r>
+              <a:rPr lang="de-DE" sz="1600" b="0" dirty="0" smtClean="0">
+                <a:solidFill>
+                  <a:srgbClr val="770088"/>
+                </a:solidFill>
+                <a:latin typeface="Consolas" pitchFamily="49" charset="0"/>
+                <a:cs typeface="Consolas" pitchFamily="49" charset="0"/>
+              </a:rPr>
+              <a:t>private </a:t>
+            </a:r>
+            <a:r>
+              <a:rPr lang="de-DE" sz="1600" b="0" dirty="0" err="1" smtClean="0">
+                <a:solidFill>
+                  <a:srgbClr val="000000"/>
+                </a:solidFill>
+                <a:latin typeface="Consolas" pitchFamily="49" charset="0"/>
+                <a:cs typeface="Consolas" pitchFamily="49" charset="0"/>
+              </a:rPr>
+              <a:t>StringProperty</a:t>
+            </a:r>
+            <a:r>
+              <a:rPr lang="de-DE" sz="1600" b="0" dirty="0" smtClean="0">
+                <a:solidFill>
+                  <a:srgbClr val="000000"/>
+                </a:solidFill>
+                <a:latin typeface="Consolas" pitchFamily="49" charset="0"/>
+                <a:cs typeface="Consolas" pitchFamily="49" charset="0"/>
+              </a:rPr>
+              <a:t> </a:t>
+            </a:r>
+            <a:r>
+              <a:rPr lang="de-DE" sz="1600" b="0" dirty="0" err="1" smtClean="0">
+                <a:solidFill>
+                  <a:srgbClr val="000000"/>
+                </a:solidFill>
+                <a:latin typeface="Consolas" pitchFamily="49" charset="0"/>
+                <a:cs typeface="Consolas" pitchFamily="49" charset="0"/>
+              </a:rPr>
+              <a:t>firstName</a:t>
+            </a:r>
+            <a:r>
+              <a:rPr lang="de-DE" sz="1600" b="0" dirty="0" smtClean="0">
+                <a:solidFill>
+                  <a:srgbClr val="666666"/>
+                </a:solidFill>
+                <a:latin typeface="Consolas" pitchFamily="49" charset="0"/>
+                <a:cs typeface="Consolas" pitchFamily="49" charset="0"/>
+              </a:rPr>
+              <a:t>;</a:t>
+            </a:r>
+            <a:r>
+              <a:rPr lang="de-DE" sz="1600" dirty="0" smtClean="0">
+                <a:latin typeface="Consolas" pitchFamily="49" charset="0"/>
+                <a:cs typeface="Consolas" pitchFamily="49" charset="0"/>
+              </a:rPr>
+              <a:t/>
+            </a:r>
+            <a:br>
+              <a:rPr lang="de-DE" sz="1600" dirty="0" smtClean="0">
+                <a:latin typeface="Consolas" pitchFamily="49" charset="0"/>
+                <a:cs typeface="Consolas" pitchFamily="49" charset="0"/>
+              </a:rPr>
+            </a:br>
+            <a:r>
+              <a:rPr lang="de-DE" sz="1600" b="0" dirty="0" smtClean="0">
+                <a:solidFill>
+                  <a:srgbClr val="666666"/>
+                </a:solidFill>
+                <a:latin typeface="Consolas" pitchFamily="49" charset="0"/>
+                <a:cs typeface="Consolas" pitchFamily="49" charset="0"/>
+              </a:rPr>
+              <a:t>    </a:t>
+            </a:r>
+            <a:r>
+              <a:rPr lang="de-DE" sz="1600" b="0" dirty="0" smtClean="0">
+                <a:solidFill>
+                  <a:srgbClr val="770088"/>
+                </a:solidFill>
+                <a:latin typeface="Consolas" pitchFamily="49" charset="0"/>
+                <a:cs typeface="Consolas" pitchFamily="49" charset="0"/>
+              </a:rPr>
+              <a:t>private </a:t>
+            </a:r>
+            <a:r>
+              <a:rPr lang="de-DE" sz="1600" b="0" dirty="0" err="1" smtClean="0">
+                <a:solidFill>
+                  <a:srgbClr val="000000"/>
+                </a:solidFill>
+                <a:latin typeface="Consolas" pitchFamily="49" charset="0"/>
+                <a:cs typeface="Consolas" pitchFamily="49" charset="0"/>
+              </a:rPr>
+              <a:t>StringProperty</a:t>
+            </a:r>
+            <a:r>
+              <a:rPr lang="de-DE" sz="1600" b="0" dirty="0" smtClean="0">
+                <a:solidFill>
+                  <a:srgbClr val="000000"/>
+                </a:solidFill>
+                <a:latin typeface="Consolas" pitchFamily="49" charset="0"/>
+                <a:cs typeface="Consolas" pitchFamily="49" charset="0"/>
+              </a:rPr>
+              <a:t> </a:t>
+            </a:r>
+            <a:r>
+              <a:rPr lang="de-DE" sz="1600" b="0" dirty="0" err="1" smtClean="0">
+                <a:solidFill>
+                  <a:srgbClr val="000000"/>
+                </a:solidFill>
+                <a:latin typeface="Consolas" pitchFamily="49" charset="0"/>
+                <a:cs typeface="Consolas" pitchFamily="49" charset="0"/>
+              </a:rPr>
+              <a:t>lastName</a:t>
+            </a:r>
+            <a:r>
+              <a:rPr lang="de-DE" sz="1600" b="0" dirty="0" smtClean="0">
+                <a:solidFill>
+                  <a:srgbClr val="666666"/>
+                </a:solidFill>
+                <a:latin typeface="Consolas" pitchFamily="49" charset="0"/>
+                <a:cs typeface="Consolas" pitchFamily="49" charset="0"/>
+              </a:rPr>
+              <a:t>;</a:t>
+            </a:r>
+            <a:r>
+              <a:rPr lang="de-DE" sz="1600" dirty="0" smtClean="0">
+                <a:latin typeface="Consolas" pitchFamily="49" charset="0"/>
+                <a:cs typeface="Consolas" pitchFamily="49" charset="0"/>
+              </a:rPr>
+              <a:t/>
+            </a:r>
+            <a:br>
+              <a:rPr lang="de-DE" sz="1600" dirty="0" smtClean="0">
+                <a:latin typeface="Consolas" pitchFamily="49" charset="0"/>
+                <a:cs typeface="Consolas" pitchFamily="49" charset="0"/>
+              </a:rPr>
+            </a:br>
+            <a:r>
+              <a:rPr lang="de-DE" sz="1600" dirty="0" smtClean="0">
+                <a:latin typeface="Consolas" pitchFamily="49" charset="0"/>
+                <a:cs typeface="Consolas" pitchFamily="49" charset="0"/>
+              </a:rPr>
+              <a:t/>
+            </a:r>
+            <a:br>
+              <a:rPr lang="de-DE" sz="1600" dirty="0" smtClean="0">
+                <a:latin typeface="Consolas" pitchFamily="49" charset="0"/>
+                <a:cs typeface="Consolas" pitchFamily="49" charset="0"/>
+              </a:rPr>
+            </a:br>
+            <a:r>
+              <a:rPr lang="de-DE" sz="1600" b="0" dirty="0" smtClean="0">
+                <a:solidFill>
+                  <a:srgbClr val="666666"/>
+                </a:solidFill>
+                <a:latin typeface="Consolas" pitchFamily="49" charset="0"/>
+                <a:cs typeface="Consolas" pitchFamily="49" charset="0"/>
+              </a:rPr>
+              <a:t>    </a:t>
+            </a:r>
+            <a:r>
+              <a:rPr lang="de-DE" sz="1600" b="0" dirty="0" err="1" smtClean="0">
+                <a:solidFill>
+                  <a:srgbClr val="770088"/>
+                </a:solidFill>
+                <a:latin typeface="Consolas" pitchFamily="49" charset="0"/>
+                <a:cs typeface="Consolas" pitchFamily="49" charset="0"/>
+              </a:rPr>
+              <a:t>public</a:t>
+            </a:r>
+            <a:r>
+              <a:rPr lang="de-DE" sz="1600" b="0" dirty="0" smtClean="0">
+                <a:solidFill>
+                  <a:srgbClr val="770088"/>
+                </a:solidFill>
+                <a:latin typeface="Consolas" pitchFamily="49" charset="0"/>
+                <a:cs typeface="Consolas" pitchFamily="49" charset="0"/>
+              </a:rPr>
+              <a:t> </a:t>
+            </a:r>
+            <a:r>
+              <a:rPr lang="de-DE" sz="1600" b="0" dirty="0" err="1" smtClean="0">
+                <a:solidFill>
+                  <a:srgbClr val="770088"/>
+                </a:solidFill>
+                <a:latin typeface="Consolas" pitchFamily="49" charset="0"/>
+                <a:cs typeface="Consolas" pitchFamily="49" charset="0"/>
+              </a:rPr>
+              <a:t>void</a:t>
+            </a:r>
+            <a:r>
+              <a:rPr lang="de-DE" sz="1600" b="0" dirty="0" smtClean="0">
+                <a:solidFill>
+                  <a:srgbClr val="770088"/>
+                </a:solidFill>
+                <a:latin typeface="Consolas" pitchFamily="49" charset="0"/>
+                <a:cs typeface="Consolas" pitchFamily="49" charset="0"/>
+              </a:rPr>
+              <a:t> </a:t>
+            </a:r>
+            <a:r>
+              <a:rPr lang="de-DE" sz="1600" b="0" dirty="0" err="1" smtClean="0">
+                <a:solidFill>
+                  <a:srgbClr val="000000"/>
+                </a:solidFill>
+                <a:latin typeface="Consolas" pitchFamily="49" charset="0"/>
+                <a:cs typeface="Consolas" pitchFamily="49" charset="0"/>
+              </a:rPr>
+              <a:t>setFirstName</a:t>
+            </a:r>
+            <a:r>
+              <a:rPr lang="de-DE" sz="1600" b="0" dirty="0" smtClean="0">
+                <a:solidFill>
+                  <a:srgbClr val="666666"/>
+                </a:solidFill>
+                <a:latin typeface="Consolas" pitchFamily="49" charset="0"/>
+                <a:cs typeface="Consolas" pitchFamily="49" charset="0"/>
+              </a:rPr>
+              <a:t>(</a:t>
+            </a:r>
+            <a:r>
+              <a:rPr lang="de-DE" sz="1600" b="0" dirty="0" smtClean="0">
+                <a:solidFill>
+                  <a:srgbClr val="000000"/>
+                </a:solidFill>
+                <a:latin typeface="Consolas" pitchFamily="49" charset="0"/>
+                <a:cs typeface="Consolas" pitchFamily="49" charset="0"/>
+              </a:rPr>
+              <a:t>String </a:t>
+            </a:r>
+            <a:r>
+              <a:rPr lang="de-DE" sz="1600" b="0" dirty="0" err="1" smtClean="0">
+                <a:solidFill>
+                  <a:srgbClr val="000000"/>
+                </a:solidFill>
+                <a:latin typeface="Consolas" pitchFamily="49" charset="0"/>
+                <a:cs typeface="Consolas" pitchFamily="49" charset="0"/>
+              </a:rPr>
+              <a:t>firstName</a:t>
+            </a:r>
+            <a:r>
+              <a:rPr lang="de-DE" sz="1600" b="0" dirty="0" smtClean="0">
+                <a:solidFill>
+                  <a:srgbClr val="666666"/>
+                </a:solidFill>
+                <a:latin typeface="Consolas" pitchFamily="49" charset="0"/>
+                <a:cs typeface="Consolas" pitchFamily="49" charset="0"/>
+              </a:rPr>
+              <a:t>) </a:t>
+            </a:r>
+            <a:r>
+              <a:rPr lang="de-DE" sz="1600" b="0" dirty="0" smtClean="0">
+                <a:solidFill>
+                  <a:srgbClr val="666666"/>
+                </a:solidFill>
+                <a:latin typeface="Consolas" pitchFamily="49" charset="0"/>
+                <a:cs typeface="Consolas" pitchFamily="49" charset="0"/>
+              </a:rPr>
+              <a:t>{</a:t>
+            </a:r>
+          </a:p>
+          <a:p>
+            <a:pPr marL="0" indent="0">
+              <a:buNone/>
+            </a:pPr>
+            <a:r>
+              <a:rPr lang="de-DE" sz="1600" b="0" dirty="0" smtClean="0">
+                <a:solidFill>
+                  <a:srgbClr val="666666"/>
+                </a:solidFill>
+                <a:latin typeface="Consolas" pitchFamily="49" charset="0"/>
+                <a:cs typeface="Consolas" pitchFamily="49" charset="0"/>
+              </a:rPr>
+              <a:t>	</a:t>
+            </a:r>
+            <a:r>
+              <a:rPr lang="de-DE" sz="1600" b="0" dirty="0" smtClean="0">
+                <a:solidFill>
+                  <a:srgbClr val="666666"/>
+                </a:solidFill>
+                <a:latin typeface="Consolas" pitchFamily="49" charset="0"/>
+                <a:cs typeface="Consolas" pitchFamily="49" charset="0"/>
+              </a:rPr>
+              <a:t>	</a:t>
+            </a:r>
+            <a:r>
+              <a:rPr lang="de-DE" sz="1600" b="0" dirty="0" err="1" smtClean="0">
+                <a:solidFill>
+                  <a:srgbClr val="000000"/>
+                </a:solidFill>
+                <a:latin typeface="Consolas" pitchFamily="49" charset="0"/>
+                <a:cs typeface="Consolas" pitchFamily="49" charset="0"/>
+              </a:rPr>
+              <a:t>firstNameProperty</a:t>
+            </a:r>
+            <a:r>
+              <a:rPr lang="de-DE" sz="1600" b="0" dirty="0" smtClean="0">
+                <a:solidFill>
+                  <a:srgbClr val="666666"/>
+                </a:solidFill>
+                <a:latin typeface="Consolas" pitchFamily="49" charset="0"/>
+                <a:cs typeface="Consolas" pitchFamily="49" charset="0"/>
+              </a:rPr>
+              <a:t>().</a:t>
+            </a:r>
+            <a:r>
+              <a:rPr lang="de-DE" sz="1600" b="0" dirty="0" err="1" smtClean="0">
+                <a:solidFill>
+                  <a:srgbClr val="000000"/>
+                </a:solidFill>
+                <a:latin typeface="Consolas" pitchFamily="49" charset="0"/>
+                <a:cs typeface="Consolas" pitchFamily="49" charset="0"/>
+              </a:rPr>
+              <a:t>set</a:t>
+            </a:r>
+            <a:r>
+              <a:rPr lang="de-DE" sz="1600" b="0" dirty="0" smtClean="0">
+                <a:solidFill>
+                  <a:srgbClr val="666666"/>
+                </a:solidFill>
+                <a:latin typeface="Consolas" pitchFamily="49" charset="0"/>
+                <a:cs typeface="Consolas" pitchFamily="49" charset="0"/>
+              </a:rPr>
+              <a:t>(</a:t>
+            </a:r>
+            <a:r>
+              <a:rPr lang="de-DE" sz="1600" b="0" dirty="0" err="1" smtClean="0">
+                <a:solidFill>
+                  <a:srgbClr val="000000"/>
+                </a:solidFill>
+                <a:latin typeface="Consolas" pitchFamily="49" charset="0"/>
+                <a:cs typeface="Consolas" pitchFamily="49" charset="0"/>
+              </a:rPr>
+              <a:t>firstName</a:t>
+            </a:r>
+            <a:r>
+              <a:rPr lang="de-DE" sz="1600" b="0" dirty="0" smtClean="0">
+                <a:solidFill>
+                  <a:srgbClr val="666666"/>
+                </a:solidFill>
+                <a:latin typeface="Consolas" pitchFamily="49" charset="0"/>
+                <a:cs typeface="Consolas" pitchFamily="49" charset="0"/>
+              </a:rPr>
+              <a:t>);</a:t>
+            </a:r>
+          </a:p>
+          <a:p>
+            <a:pPr marL="0" indent="0">
+              <a:buNone/>
+            </a:pPr>
+            <a:r>
+              <a:rPr lang="de-DE" sz="1600" b="0" dirty="0" smtClean="0">
+                <a:solidFill>
+                  <a:srgbClr val="666666"/>
+                </a:solidFill>
+                <a:latin typeface="Consolas" pitchFamily="49" charset="0"/>
+                <a:cs typeface="Consolas" pitchFamily="49" charset="0"/>
+              </a:rPr>
+              <a:t>	</a:t>
+            </a:r>
+            <a:r>
+              <a:rPr lang="de-DE" sz="1600" b="0" dirty="0" smtClean="0">
+                <a:solidFill>
+                  <a:srgbClr val="666666"/>
+                </a:solidFill>
+                <a:latin typeface="Consolas" pitchFamily="49" charset="0"/>
+                <a:cs typeface="Consolas" pitchFamily="49" charset="0"/>
+              </a:rPr>
+              <a:t>}</a:t>
+            </a:r>
+            <a:r>
+              <a:rPr lang="de-DE" sz="1600" dirty="0" smtClean="0">
+                <a:latin typeface="Consolas" pitchFamily="49" charset="0"/>
+                <a:cs typeface="Consolas" pitchFamily="49" charset="0"/>
+              </a:rPr>
+              <a:t/>
+            </a:r>
+            <a:br>
+              <a:rPr lang="de-DE" sz="1600" dirty="0" smtClean="0">
+                <a:latin typeface="Consolas" pitchFamily="49" charset="0"/>
+                <a:cs typeface="Consolas" pitchFamily="49" charset="0"/>
+              </a:rPr>
+            </a:br>
+            <a:r>
+              <a:rPr lang="de-DE" sz="1600" dirty="0" smtClean="0">
+                <a:latin typeface="Consolas" pitchFamily="49" charset="0"/>
+                <a:cs typeface="Consolas" pitchFamily="49" charset="0"/>
+              </a:rPr>
+              <a:t/>
+            </a:r>
+            <a:br>
+              <a:rPr lang="de-DE" sz="1600" dirty="0" smtClean="0">
+                <a:latin typeface="Consolas" pitchFamily="49" charset="0"/>
+                <a:cs typeface="Consolas" pitchFamily="49" charset="0"/>
+              </a:rPr>
+            </a:br>
+            <a:r>
+              <a:rPr lang="de-DE" sz="1600" b="0" dirty="0" smtClean="0">
+                <a:solidFill>
+                  <a:srgbClr val="666666"/>
+                </a:solidFill>
+                <a:latin typeface="Consolas" pitchFamily="49" charset="0"/>
+                <a:cs typeface="Consolas" pitchFamily="49" charset="0"/>
+              </a:rPr>
+              <a:t>    </a:t>
+            </a:r>
+            <a:r>
+              <a:rPr lang="de-DE" sz="1600" b="0" dirty="0" err="1" smtClean="0">
+                <a:solidFill>
+                  <a:srgbClr val="770088"/>
+                </a:solidFill>
+                <a:latin typeface="Consolas" pitchFamily="49" charset="0"/>
+                <a:cs typeface="Consolas" pitchFamily="49" charset="0"/>
+              </a:rPr>
+              <a:t>public</a:t>
+            </a:r>
+            <a:r>
+              <a:rPr lang="de-DE" sz="1600" b="0" dirty="0" smtClean="0">
+                <a:solidFill>
+                  <a:srgbClr val="770088"/>
+                </a:solidFill>
+                <a:latin typeface="Consolas" pitchFamily="49" charset="0"/>
+                <a:cs typeface="Consolas" pitchFamily="49" charset="0"/>
+              </a:rPr>
+              <a:t> </a:t>
+            </a:r>
+            <a:r>
+              <a:rPr lang="de-DE" sz="1600" b="0" dirty="0" smtClean="0">
+                <a:solidFill>
+                  <a:srgbClr val="000000"/>
+                </a:solidFill>
+                <a:latin typeface="Consolas" pitchFamily="49" charset="0"/>
+                <a:cs typeface="Consolas" pitchFamily="49" charset="0"/>
+              </a:rPr>
+              <a:t>String </a:t>
+            </a:r>
+            <a:r>
+              <a:rPr lang="de-DE" sz="1600" b="0" dirty="0" err="1" smtClean="0">
+                <a:solidFill>
+                  <a:srgbClr val="000000"/>
+                </a:solidFill>
+                <a:latin typeface="Consolas" pitchFamily="49" charset="0"/>
+                <a:cs typeface="Consolas" pitchFamily="49" charset="0"/>
+              </a:rPr>
+              <a:t>getFirstName</a:t>
+            </a:r>
+            <a:r>
+              <a:rPr lang="de-DE" sz="1600" b="0" dirty="0" smtClean="0">
+                <a:solidFill>
+                  <a:srgbClr val="666666"/>
+                </a:solidFill>
+                <a:latin typeface="Consolas" pitchFamily="49" charset="0"/>
+                <a:cs typeface="Consolas" pitchFamily="49" charset="0"/>
+              </a:rPr>
+              <a:t>() </a:t>
+            </a:r>
+            <a:r>
+              <a:rPr lang="de-DE" sz="1600" b="0" dirty="0" smtClean="0">
+                <a:solidFill>
+                  <a:srgbClr val="666666"/>
+                </a:solidFill>
+                <a:latin typeface="Consolas" pitchFamily="49" charset="0"/>
+                <a:cs typeface="Consolas" pitchFamily="49" charset="0"/>
+              </a:rPr>
+              <a:t>{</a:t>
+            </a:r>
+          </a:p>
+          <a:p>
+            <a:pPr marL="0" indent="0">
+              <a:buNone/>
+            </a:pPr>
+            <a:r>
+              <a:rPr lang="de-DE" sz="1600" b="0" dirty="0" smtClean="0">
+                <a:solidFill>
+                  <a:srgbClr val="666666"/>
+                </a:solidFill>
+                <a:latin typeface="Consolas" pitchFamily="49" charset="0"/>
+                <a:cs typeface="Consolas" pitchFamily="49" charset="0"/>
+              </a:rPr>
+              <a:t>	</a:t>
+            </a:r>
+            <a:r>
+              <a:rPr lang="de-DE" sz="1600" b="0" dirty="0" smtClean="0">
+                <a:solidFill>
+                  <a:srgbClr val="666666"/>
+                </a:solidFill>
+                <a:latin typeface="Consolas" pitchFamily="49" charset="0"/>
+                <a:cs typeface="Consolas" pitchFamily="49" charset="0"/>
+              </a:rPr>
+              <a:t>	</a:t>
+            </a:r>
+            <a:r>
+              <a:rPr lang="de-DE" sz="1600" b="0" dirty="0" err="1" smtClean="0">
+                <a:solidFill>
+                  <a:srgbClr val="770088"/>
+                </a:solidFill>
+                <a:latin typeface="Consolas" pitchFamily="49" charset="0"/>
+                <a:cs typeface="Consolas" pitchFamily="49" charset="0"/>
+              </a:rPr>
+              <a:t>return</a:t>
+            </a:r>
+            <a:r>
+              <a:rPr lang="de-DE" sz="1600" b="0" dirty="0" smtClean="0">
+                <a:solidFill>
+                  <a:srgbClr val="770088"/>
+                </a:solidFill>
+                <a:latin typeface="Consolas" pitchFamily="49" charset="0"/>
+                <a:cs typeface="Consolas" pitchFamily="49" charset="0"/>
+              </a:rPr>
+              <a:t> </a:t>
+            </a:r>
+            <a:r>
+              <a:rPr lang="de-DE" sz="1600" b="0" dirty="0" err="1" smtClean="0">
+                <a:solidFill>
+                  <a:srgbClr val="000000"/>
+                </a:solidFill>
+                <a:latin typeface="Consolas" pitchFamily="49" charset="0"/>
+                <a:cs typeface="Consolas" pitchFamily="49" charset="0"/>
+              </a:rPr>
+              <a:t>firstNameProperty</a:t>
+            </a:r>
+            <a:r>
+              <a:rPr lang="de-DE" sz="1600" b="0" dirty="0" smtClean="0">
+                <a:solidFill>
+                  <a:srgbClr val="666666"/>
+                </a:solidFill>
+                <a:latin typeface="Consolas" pitchFamily="49" charset="0"/>
+                <a:cs typeface="Consolas" pitchFamily="49" charset="0"/>
+              </a:rPr>
+              <a:t>().</a:t>
+            </a:r>
+            <a:r>
+              <a:rPr lang="de-DE" sz="1600" b="0" dirty="0" err="1" smtClean="0">
+                <a:solidFill>
+                  <a:srgbClr val="000000"/>
+                </a:solidFill>
+                <a:latin typeface="Consolas" pitchFamily="49" charset="0"/>
+                <a:cs typeface="Consolas" pitchFamily="49" charset="0"/>
+              </a:rPr>
+              <a:t>get</a:t>
+            </a:r>
+            <a:r>
+              <a:rPr lang="de-DE" sz="1600" b="0" dirty="0" smtClean="0">
+                <a:solidFill>
+                  <a:srgbClr val="666666"/>
+                </a:solidFill>
+                <a:latin typeface="Consolas" pitchFamily="49" charset="0"/>
+                <a:cs typeface="Consolas" pitchFamily="49" charset="0"/>
+              </a:rPr>
+              <a:t>();</a:t>
+            </a:r>
+          </a:p>
+          <a:p>
+            <a:pPr marL="0" indent="0">
+              <a:buNone/>
+            </a:pPr>
+            <a:r>
+              <a:rPr lang="de-DE" sz="1600" b="0" dirty="0" smtClean="0">
+                <a:solidFill>
+                  <a:srgbClr val="666666"/>
+                </a:solidFill>
+                <a:latin typeface="Consolas" pitchFamily="49" charset="0"/>
+                <a:cs typeface="Consolas" pitchFamily="49" charset="0"/>
+              </a:rPr>
+              <a:t>	</a:t>
+            </a:r>
+            <a:r>
+              <a:rPr lang="de-DE" sz="1600" b="0" dirty="0" smtClean="0">
+                <a:solidFill>
+                  <a:srgbClr val="666666"/>
+                </a:solidFill>
+                <a:latin typeface="Consolas" pitchFamily="49" charset="0"/>
+                <a:cs typeface="Consolas" pitchFamily="49" charset="0"/>
+              </a:rPr>
+              <a:t>}</a:t>
+            </a:r>
+            <a:r>
+              <a:rPr lang="de-DE" sz="1600" dirty="0" smtClean="0">
+                <a:latin typeface="Consolas" pitchFamily="49" charset="0"/>
+                <a:cs typeface="Consolas" pitchFamily="49" charset="0"/>
+              </a:rPr>
+              <a:t/>
+            </a:r>
+            <a:br>
+              <a:rPr lang="de-DE" sz="1600" dirty="0" smtClean="0">
+                <a:latin typeface="Consolas" pitchFamily="49" charset="0"/>
+                <a:cs typeface="Consolas" pitchFamily="49" charset="0"/>
+              </a:rPr>
+            </a:br>
+            <a:r>
+              <a:rPr lang="de-DE" sz="1600" dirty="0" smtClean="0">
+                <a:latin typeface="Consolas" pitchFamily="49" charset="0"/>
+                <a:cs typeface="Consolas" pitchFamily="49" charset="0"/>
+              </a:rPr>
+              <a:t/>
+            </a:r>
+            <a:br>
+              <a:rPr lang="de-DE" sz="1600" dirty="0" smtClean="0">
+                <a:latin typeface="Consolas" pitchFamily="49" charset="0"/>
+                <a:cs typeface="Consolas" pitchFamily="49" charset="0"/>
+              </a:rPr>
+            </a:br>
+            <a:r>
+              <a:rPr lang="de-DE" sz="1600" b="0" dirty="0" smtClean="0">
+                <a:solidFill>
+                  <a:srgbClr val="666666"/>
+                </a:solidFill>
+                <a:latin typeface="Consolas" pitchFamily="49" charset="0"/>
+                <a:cs typeface="Consolas" pitchFamily="49" charset="0"/>
+              </a:rPr>
+              <a:t>    </a:t>
+            </a:r>
+            <a:r>
+              <a:rPr lang="de-DE" sz="1600" b="0" dirty="0" err="1" smtClean="0">
+                <a:solidFill>
+                  <a:srgbClr val="770088"/>
+                </a:solidFill>
+                <a:latin typeface="Consolas" pitchFamily="49" charset="0"/>
+                <a:cs typeface="Consolas" pitchFamily="49" charset="0"/>
+              </a:rPr>
+              <a:t>public</a:t>
+            </a:r>
+            <a:r>
+              <a:rPr lang="de-DE" sz="1600" b="0" dirty="0" smtClean="0">
+                <a:solidFill>
+                  <a:srgbClr val="770088"/>
+                </a:solidFill>
+                <a:latin typeface="Consolas" pitchFamily="49" charset="0"/>
+                <a:cs typeface="Consolas" pitchFamily="49" charset="0"/>
+              </a:rPr>
+              <a:t> </a:t>
+            </a:r>
+            <a:r>
+              <a:rPr lang="de-DE" sz="1600" b="0" dirty="0" err="1" smtClean="0">
+                <a:solidFill>
+                  <a:srgbClr val="000000"/>
+                </a:solidFill>
+                <a:latin typeface="Consolas" pitchFamily="49" charset="0"/>
+                <a:cs typeface="Consolas" pitchFamily="49" charset="0"/>
+              </a:rPr>
+              <a:t>StringProperty</a:t>
+            </a:r>
+            <a:r>
+              <a:rPr lang="de-DE" sz="1600" b="0" dirty="0" smtClean="0">
+                <a:solidFill>
+                  <a:srgbClr val="000000"/>
+                </a:solidFill>
+                <a:latin typeface="Consolas" pitchFamily="49" charset="0"/>
+                <a:cs typeface="Consolas" pitchFamily="49" charset="0"/>
+              </a:rPr>
+              <a:t> </a:t>
+            </a:r>
+            <a:r>
+              <a:rPr lang="de-DE" sz="1600" b="0" dirty="0" err="1" smtClean="0">
+                <a:solidFill>
+                  <a:srgbClr val="000000"/>
+                </a:solidFill>
+                <a:latin typeface="Consolas" pitchFamily="49" charset="0"/>
+                <a:cs typeface="Consolas" pitchFamily="49" charset="0"/>
+              </a:rPr>
+              <a:t>firstNameProperty</a:t>
+            </a:r>
+            <a:r>
+              <a:rPr lang="de-DE" sz="1600" b="0" dirty="0" smtClean="0">
+                <a:solidFill>
+                  <a:srgbClr val="666666"/>
+                </a:solidFill>
+                <a:latin typeface="Consolas" pitchFamily="49" charset="0"/>
+                <a:cs typeface="Consolas" pitchFamily="49" charset="0"/>
+              </a:rPr>
+              <a:t>() {</a:t>
+            </a:r>
+            <a:r>
+              <a:rPr lang="de-DE" sz="1600" dirty="0" smtClean="0">
+                <a:latin typeface="Consolas" pitchFamily="49" charset="0"/>
+                <a:cs typeface="Consolas" pitchFamily="49" charset="0"/>
+              </a:rPr>
+              <a:t/>
+            </a:r>
+            <a:br>
+              <a:rPr lang="de-DE" sz="1600" dirty="0" smtClean="0">
+                <a:latin typeface="Consolas" pitchFamily="49" charset="0"/>
+                <a:cs typeface="Consolas" pitchFamily="49" charset="0"/>
+              </a:rPr>
+            </a:br>
+            <a:r>
+              <a:rPr lang="de-DE" sz="1600" b="0" dirty="0" smtClean="0">
+                <a:solidFill>
+                  <a:srgbClr val="666666"/>
+                </a:solidFill>
+                <a:latin typeface="Consolas" pitchFamily="49" charset="0"/>
+                <a:cs typeface="Consolas" pitchFamily="49" charset="0"/>
+              </a:rPr>
+              <a:t>        </a:t>
+            </a:r>
+            <a:r>
+              <a:rPr lang="de-DE" sz="1600" b="0" dirty="0" err="1" smtClean="0">
+                <a:solidFill>
+                  <a:srgbClr val="770088"/>
+                </a:solidFill>
+                <a:latin typeface="Consolas" pitchFamily="49" charset="0"/>
+                <a:cs typeface="Consolas" pitchFamily="49" charset="0"/>
+              </a:rPr>
+              <a:t>if</a:t>
+            </a:r>
+            <a:r>
+              <a:rPr lang="de-DE" sz="1600" b="0" dirty="0" smtClean="0">
+                <a:solidFill>
+                  <a:srgbClr val="770088"/>
+                </a:solidFill>
+                <a:latin typeface="Consolas" pitchFamily="49" charset="0"/>
+                <a:cs typeface="Consolas" pitchFamily="49" charset="0"/>
+              </a:rPr>
+              <a:t> </a:t>
+            </a:r>
+            <a:r>
+              <a:rPr lang="de-DE" sz="1600" b="0" dirty="0" smtClean="0">
+                <a:solidFill>
+                  <a:srgbClr val="666666"/>
+                </a:solidFill>
+                <a:latin typeface="Consolas" pitchFamily="49" charset="0"/>
+                <a:cs typeface="Consolas" pitchFamily="49" charset="0"/>
+              </a:rPr>
+              <a:t>(</a:t>
+            </a:r>
+            <a:r>
+              <a:rPr lang="de-DE" sz="1600" b="0" dirty="0" err="1" smtClean="0">
+                <a:solidFill>
+                  <a:srgbClr val="000000"/>
+                </a:solidFill>
+                <a:latin typeface="Consolas" pitchFamily="49" charset="0"/>
+                <a:cs typeface="Consolas" pitchFamily="49" charset="0"/>
+              </a:rPr>
+              <a:t>firstName</a:t>
+            </a:r>
+            <a:r>
+              <a:rPr lang="de-DE" sz="1600" b="0" dirty="0" smtClean="0">
+                <a:solidFill>
+                  <a:srgbClr val="000000"/>
+                </a:solidFill>
+                <a:latin typeface="Consolas" pitchFamily="49" charset="0"/>
+                <a:cs typeface="Consolas" pitchFamily="49" charset="0"/>
+              </a:rPr>
+              <a:t> </a:t>
+            </a:r>
+            <a:r>
+              <a:rPr lang="de-DE" sz="1600" b="0" dirty="0" smtClean="0">
+                <a:solidFill>
+                  <a:srgbClr val="666666"/>
+                </a:solidFill>
+                <a:latin typeface="Consolas" pitchFamily="49" charset="0"/>
+                <a:cs typeface="Consolas" pitchFamily="49" charset="0"/>
+              </a:rPr>
+              <a:t>== </a:t>
+            </a:r>
+            <a:r>
+              <a:rPr lang="de-DE" sz="1600" b="0" dirty="0" smtClean="0">
+                <a:solidFill>
+                  <a:srgbClr val="228811"/>
+                </a:solidFill>
+                <a:latin typeface="Consolas" pitchFamily="49" charset="0"/>
+                <a:cs typeface="Consolas" pitchFamily="49" charset="0"/>
+              </a:rPr>
+              <a:t>null</a:t>
+            </a:r>
+            <a:r>
+              <a:rPr lang="de-DE" sz="1600" b="0" dirty="0" smtClean="0">
+                <a:solidFill>
+                  <a:srgbClr val="666666"/>
+                </a:solidFill>
+                <a:latin typeface="Consolas" pitchFamily="49" charset="0"/>
+                <a:cs typeface="Consolas" pitchFamily="49" charset="0"/>
+              </a:rPr>
+              <a:t>)</a:t>
+            </a:r>
+            <a:r>
+              <a:rPr lang="de-DE" sz="1600" dirty="0" smtClean="0">
+                <a:latin typeface="Consolas" pitchFamily="49" charset="0"/>
+                <a:cs typeface="Consolas" pitchFamily="49" charset="0"/>
+              </a:rPr>
+              <a:t/>
+            </a:r>
+            <a:br>
+              <a:rPr lang="de-DE" sz="1600" dirty="0" smtClean="0">
+                <a:latin typeface="Consolas" pitchFamily="49" charset="0"/>
+                <a:cs typeface="Consolas" pitchFamily="49" charset="0"/>
+              </a:rPr>
+            </a:br>
+            <a:r>
+              <a:rPr lang="de-DE" sz="1600" b="0" dirty="0" smtClean="0">
+                <a:solidFill>
+                  <a:srgbClr val="666666"/>
+                </a:solidFill>
+                <a:latin typeface="Consolas" pitchFamily="49" charset="0"/>
+                <a:cs typeface="Consolas" pitchFamily="49" charset="0"/>
+              </a:rPr>
+              <a:t>            </a:t>
+            </a:r>
+            <a:r>
+              <a:rPr lang="de-DE" sz="1600" b="0" dirty="0" err="1" smtClean="0">
+                <a:solidFill>
+                  <a:srgbClr val="000000"/>
+                </a:solidFill>
+                <a:latin typeface="Consolas" pitchFamily="49" charset="0"/>
+                <a:cs typeface="Consolas" pitchFamily="49" charset="0"/>
+              </a:rPr>
+              <a:t>firstName</a:t>
+            </a:r>
+            <a:r>
+              <a:rPr lang="de-DE" sz="1600" b="0" dirty="0" smtClean="0">
+                <a:solidFill>
+                  <a:srgbClr val="000000"/>
+                </a:solidFill>
+                <a:latin typeface="Consolas" pitchFamily="49" charset="0"/>
+                <a:cs typeface="Consolas" pitchFamily="49" charset="0"/>
+              </a:rPr>
+              <a:t> </a:t>
+            </a:r>
+            <a:r>
+              <a:rPr lang="de-DE" sz="1600" b="0" dirty="0" smtClean="0">
+                <a:solidFill>
+                  <a:srgbClr val="666666"/>
+                </a:solidFill>
+                <a:latin typeface="Consolas" pitchFamily="49" charset="0"/>
+                <a:cs typeface="Consolas" pitchFamily="49" charset="0"/>
+              </a:rPr>
+              <a:t>= </a:t>
+            </a:r>
+            <a:r>
+              <a:rPr lang="de-DE" sz="1600" b="0" dirty="0" err="1" smtClean="0">
+                <a:solidFill>
+                  <a:srgbClr val="770088"/>
+                </a:solidFill>
+                <a:latin typeface="Consolas" pitchFamily="49" charset="0"/>
+                <a:cs typeface="Consolas" pitchFamily="49" charset="0"/>
+              </a:rPr>
+              <a:t>new</a:t>
+            </a:r>
+            <a:r>
+              <a:rPr lang="de-DE" sz="1600" b="0" dirty="0" smtClean="0">
+                <a:solidFill>
+                  <a:srgbClr val="770088"/>
+                </a:solidFill>
+                <a:latin typeface="Consolas" pitchFamily="49" charset="0"/>
+                <a:cs typeface="Consolas" pitchFamily="49" charset="0"/>
+              </a:rPr>
+              <a:t> </a:t>
+            </a:r>
+            <a:r>
+              <a:rPr lang="de-DE" sz="1600" b="0" dirty="0" err="1" smtClean="0">
+                <a:solidFill>
+                  <a:srgbClr val="000000"/>
+                </a:solidFill>
+                <a:latin typeface="Consolas" pitchFamily="49" charset="0"/>
+                <a:cs typeface="Consolas" pitchFamily="49" charset="0"/>
+              </a:rPr>
+              <a:t>SimpleStringProperty</a:t>
+            </a:r>
+            <a:r>
+              <a:rPr lang="de-DE" sz="1600" b="0" dirty="0" smtClean="0">
+                <a:solidFill>
+                  <a:srgbClr val="666666"/>
+                </a:solidFill>
+                <a:latin typeface="Consolas" pitchFamily="49" charset="0"/>
+                <a:cs typeface="Consolas" pitchFamily="49" charset="0"/>
+              </a:rPr>
+              <a:t>(</a:t>
+            </a:r>
+            <a:r>
+              <a:rPr lang="de-DE" sz="1600" b="0" dirty="0" err="1" smtClean="0">
+                <a:solidFill>
+                  <a:srgbClr val="770088"/>
+                </a:solidFill>
+                <a:latin typeface="Consolas" pitchFamily="49" charset="0"/>
+                <a:cs typeface="Consolas" pitchFamily="49" charset="0"/>
+              </a:rPr>
+              <a:t>this</a:t>
+            </a:r>
+            <a:r>
+              <a:rPr lang="de-DE" sz="1600" b="0" dirty="0" smtClean="0">
+                <a:solidFill>
+                  <a:srgbClr val="666666"/>
+                </a:solidFill>
+                <a:latin typeface="Consolas" pitchFamily="49" charset="0"/>
+                <a:cs typeface="Consolas" pitchFamily="49" charset="0"/>
+              </a:rPr>
+              <a:t>, </a:t>
+            </a:r>
+            <a:r>
+              <a:rPr lang="de-DE" sz="1600" b="0" dirty="0" smtClean="0">
+                <a:solidFill>
+                  <a:srgbClr val="AA2222"/>
+                </a:solidFill>
+                <a:latin typeface="Consolas" pitchFamily="49" charset="0"/>
+                <a:cs typeface="Consolas" pitchFamily="49" charset="0"/>
+              </a:rPr>
+              <a:t>"</a:t>
+            </a:r>
+            <a:r>
+              <a:rPr lang="de-DE" sz="1600" b="0" dirty="0" err="1" smtClean="0">
+                <a:solidFill>
+                  <a:srgbClr val="AA2222"/>
+                </a:solidFill>
+                <a:latin typeface="Consolas" pitchFamily="49" charset="0"/>
+                <a:cs typeface="Consolas" pitchFamily="49" charset="0"/>
+              </a:rPr>
+              <a:t>firstName</a:t>
+            </a:r>
+            <a:r>
+              <a:rPr lang="de-DE" sz="1600" b="0" dirty="0" smtClean="0">
+                <a:solidFill>
+                  <a:srgbClr val="AA2222"/>
+                </a:solidFill>
+                <a:latin typeface="Consolas" pitchFamily="49" charset="0"/>
+                <a:cs typeface="Consolas" pitchFamily="49" charset="0"/>
+              </a:rPr>
+              <a:t>"</a:t>
+            </a:r>
+            <a:r>
+              <a:rPr lang="de-DE" sz="1600" b="0" dirty="0" smtClean="0">
+                <a:solidFill>
+                  <a:srgbClr val="666666"/>
+                </a:solidFill>
+                <a:latin typeface="Consolas" pitchFamily="49" charset="0"/>
+                <a:cs typeface="Consolas" pitchFamily="49" charset="0"/>
+              </a:rPr>
+              <a:t>);</a:t>
+            </a:r>
+            <a:r>
+              <a:rPr lang="de-DE" sz="1600" dirty="0" smtClean="0">
+                <a:latin typeface="Consolas" pitchFamily="49" charset="0"/>
+                <a:cs typeface="Consolas" pitchFamily="49" charset="0"/>
+              </a:rPr>
+              <a:t/>
+            </a:r>
+            <a:br>
+              <a:rPr lang="de-DE" sz="1600" dirty="0" smtClean="0">
+                <a:latin typeface="Consolas" pitchFamily="49" charset="0"/>
+                <a:cs typeface="Consolas" pitchFamily="49" charset="0"/>
+              </a:rPr>
+            </a:br>
+            <a:r>
+              <a:rPr lang="de-DE" sz="1600" b="0" dirty="0" smtClean="0">
+                <a:solidFill>
+                  <a:srgbClr val="666666"/>
+                </a:solidFill>
+                <a:latin typeface="Consolas" pitchFamily="49" charset="0"/>
+                <a:cs typeface="Consolas" pitchFamily="49" charset="0"/>
+              </a:rPr>
+              <a:t>        </a:t>
+            </a:r>
+            <a:r>
+              <a:rPr lang="de-DE" sz="1600" b="0" dirty="0" err="1" smtClean="0">
+                <a:solidFill>
+                  <a:srgbClr val="770088"/>
+                </a:solidFill>
+                <a:latin typeface="Consolas" pitchFamily="49" charset="0"/>
+                <a:cs typeface="Consolas" pitchFamily="49" charset="0"/>
+              </a:rPr>
+              <a:t>return</a:t>
+            </a:r>
+            <a:r>
+              <a:rPr lang="de-DE" sz="1600" b="0" dirty="0" smtClean="0">
+                <a:solidFill>
+                  <a:srgbClr val="770088"/>
+                </a:solidFill>
+                <a:latin typeface="Consolas" pitchFamily="49" charset="0"/>
+                <a:cs typeface="Consolas" pitchFamily="49" charset="0"/>
+              </a:rPr>
+              <a:t> </a:t>
+            </a:r>
+            <a:r>
+              <a:rPr lang="de-DE" sz="1600" b="0" dirty="0" err="1" smtClean="0">
+                <a:solidFill>
+                  <a:srgbClr val="000000"/>
+                </a:solidFill>
+                <a:latin typeface="Consolas" pitchFamily="49" charset="0"/>
+                <a:cs typeface="Consolas" pitchFamily="49" charset="0"/>
+              </a:rPr>
+              <a:t>firstName</a:t>
+            </a:r>
+            <a:r>
+              <a:rPr lang="de-DE" sz="1600" b="0" dirty="0" smtClean="0">
+                <a:solidFill>
+                  <a:srgbClr val="666666"/>
+                </a:solidFill>
+                <a:latin typeface="Consolas" pitchFamily="49" charset="0"/>
+                <a:cs typeface="Consolas" pitchFamily="49" charset="0"/>
+              </a:rPr>
+              <a:t>;</a:t>
+            </a:r>
+            <a:r>
+              <a:rPr lang="de-DE" sz="1600" dirty="0" smtClean="0">
+                <a:latin typeface="Consolas" pitchFamily="49" charset="0"/>
+                <a:cs typeface="Consolas" pitchFamily="49" charset="0"/>
+              </a:rPr>
+              <a:t/>
+            </a:r>
+            <a:br>
+              <a:rPr lang="de-DE" sz="1600" dirty="0" smtClean="0">
+                <a:latin typeface="Consolas" pitchFamily="49" charset="0"/>
+                <a:cs typeface="Consolas" pitchFamily="49" charset="0"/>
+              </a:rPr>
+            </a:br>
+            <a:r>
+              <a:rPr lang="de-DE" sz="1600" b="0" dirty="0" smtClean="0">
+                <a:solidFill>
+                  <a:srgbClr val="666666"/>
+                </a:solidFill>
+                <a:latin typeface="Consolas" pitchFamily="49" charset="0"/>
+                <a:cs typeface="Consolas" pitchFamily="49" charset="0"/>
+              </a:rPr>
+              <a:t>    }</a:t>
+            </a:r>
+            <a:r>
+              <a:rPr lang="de-DE" sz="1600" dirty="0" smtClean="0">
+                <a:latin typeface="Consolas" pitchFamily="49" charset="0"/>
+                <a:cs typeface="Consolas" pitchFamily="49" charset="0"/>
+              </a:rPr>
+              <a:t/>
+            </a:r>
+            <a:br>
+              <a:rPr lang="de-DE" sz="1600" dirty="0" smtClean="0">
+                <a:latin typeface="Consolas" pitchFamily="49" charset="0"/>
+                <a:cs typeface="Consolas" pitchFamily="49" charset="0"/>
+              </a:rPr>
+            </a:br>
+            <a:r>
+              <a:rPr lang="de-DE" sz="1600" b="0" dirty="0" smtClean="0">
+                <a:solidFill>
+                  <a:srgbClr val="666666"/>
+                </a:solidFill>
+                <a:latin typeface="Consolas" pitchFamily="49" charset="0"/>
+                <a:cs typeface="Consolas" pitchFamily="49" charset="0"/>
+              </a:rPr>
+              <a:t>    </a:t>
+            </a:r>
+            <a:r>
+              <a:rPr lang="de-DE" sz="1600" dirty="0" smtClean="0">
+                <a:latin typeface="Consolas" pitchFamily="49" charset="0"/>
+                <a:cs typeface="Consolas" pitchFamily="49" charset="0"/>
+              </a:rPr>
+              <a:t/>
+            </a:r>
+            <a:br>
+              <a:rPr lang="de-DE" sz="1600" dirty="0" smtClean="0">
+                <a:latin typeface="Consolas" pitchFamily="49" charset="0"/>
+                <a:cs typeface="Consolas" pitchFamily="49" charset="0"/>
+              </a:rPr>
+            </a:br>
+            <a:r>
+              <a:rPr lang="de-DE" sz="1600" b="0" dirty="0" smtClean="0">
+                <a:solidFill>
+                  <a:srgbClr val="666666"/>
+                </a:solidFill>
+                <a:latin typeface="Consolas" pitchFamily="49" charset="0"/>
+                <a:cs typeface="Consolas" pitchFamily="49" charset="0"/>
+              </a:rPr>
+              <a:t>    </a:t>
+            </a:r>
+            <a:r>
+              <a:rPr lang="de-DE" sz="1600" b="0" dirty="0" smtClean="0">
+                <a:solidFill>
+                  <a:srgbClr val="AA7700"/>
+                </a:solidFill>
+                <a:latin typeface="Consolas" pitchFamily="49" charset="0"/>
+                <a:cs typeface="Consolas" pitchFamily="49" charset="0"/>
+              </a:rPr>
+              <a:t>// [...]</a:t>
+            </a:r>
+            <a:r>
+              <a:rPr lang="de-DE" sz="1600" dirty="0" smtClean="0">
+                <a:latin typeface="Consolas" pitchFamily="49" charset="0"/>
+                <a:cs typeface="Consolas" pitchFamily="49" charset="0"/>
+              </a:rPr>
+              <a:t/>
+            </a:r>
+            <a:br>
+              <a:rPr lang="de-DE" sz="1600" dirty="0" smtClean="0">
+                <a:latin typeface="Consolas" pitchFamily="49" charset="0"/>
+                <a:cs typeface="Consolas" pitchFamily="49" charset="0"/>
+              </a:rPr>
+            </a:br>
+            <a:r>
+              <a:rPr lang="de-DE" sz="1600" b="0" dirty="0" smtClean="0">
+                <a:solidFill>
+                  <a:srgbClr val="666666"/>
+                </a:solidFill>
+                <a:latin typeface="Consolas" pitchFamily="49" charset="0"/>
+                <a:cs typeface="Consolas" pitchFamily="49" charset="0"/>
+              </a:rPr>
+              <a:t>}</a:t>
+            </a:r>
+            <a:endParaRPr lang="de-DE" sz="1600" b="0" dirty="0">
+              <a:latin typeface="Consolas" pitchFamily="49" charset="0"/>
+              <a:cs typeface="Consolas" pitchFamily="49" charset="0"/>
+            </a:endParaRPr>
+          </a:p>
+        </p:txBody>
+      </p:sp>
     </p:spTree>
   </p:cSld>
   <p:clrMapOvr>
@@ -26344,7 +27872,11 @@
           <a:p>
             <a:r>
               <a:rPr lang="de-DE" dirty="0" smtClean="0"/>
-              <a:t>Im Netz...</a:t>
+              <a:t>Properties in </a:t>
+            </a:r>
+            <a:r>
+              <a:rPr lang="de-DE" dirty="0" err="1" smtClean="0"/>
+              <a:t>GroovyFX</a:t>
             </a:r>
             <a:endParaRPr lang="de-DE" dirty="0"/>
           </a:p>
@@ -26352,177 +27884,864 @@
       </p:sp>
       <p:sp>
         <p:nvSpPr>
-          <p:cNvPr id="4" name="Rechteck 3"/>
-          <p:cNvSpPr/>
+          <p:cNvPr id="3" name="Inhaltsplatzhalter 2"/>
+          <p:cNvSpPr>
+            <a:spLocks noGrp="1"/>
+          </p:cNvSpPr>
+          <p:nvPr>
+            <p:ph idx="1"/>
+          </p:nvPr>
+        </p:nvSpPr>
+        <p:spPr/>
+        <p:txBody>
+          <a:bodyPr>
+            <a:normAutofit/>
+          </a:bodyPr>
+          <a:lstStyle/>
+          <a:p>
+            <a:pPr marL="0" indent="0">
+              <a:buNone/>
+            </a:pPr>
+            <a:r>
+              <a:rPr lang="de-DE" sz="1600" b="0" dirty="0" err="1" smtClean="0">
+                <a:solidFill>
+                  <a:srgbClr val="770088"/>
+                </a:solidFill>
+                <a:latin typeface="Consolas" pitchFamily="49" charset="0"/>
+                <a:cs typeface="Consolas" pitchFamily="49" charset="0"/>
+              </a:rPr>
+              <a:t>import</a:t>
+            </a:r>
+            <a:r>
+              <a:rPr lang="de-DE" sz="1600" b="0" dirty="0" smtClean="0">
+                <a:solidFill>
+                  <a:srgbClr val="770088"/>
+                </a:solidFill>
+                <a:latin typeface="Consolas" pitchFamily="49" charset="0"/>
+                <a:cs typeface="Consolas" pitchFamily="49" charset="0"/>
+              </a:rPr>
+              <a:t> </a:t>
+            </a:r>
+            <a:r>
+              <a:rPr lang="de-DE" sz="1600" b="0" dirty="0" err="1" smtClean="0">
+                <a:solidFill>
+                  <a:srgbClr val="000000"/>
+                </a:solidFill>
+                <a:latin typeface="Consolas" pitchFamily="49" charset="0"/>
+                <a:cs typeface="Consolas" pitchFamily="49" charset="0"/>
+              </a:rPr>
+              <a:t>groovyx</a:t>
+            </a:r>
+            <a:r>
+              <a:rPr lang="de-DE" sz="1600" b="0" dirty="0" err="1" smtClean="0">
+                <a:solidFill>
+                  <a:srgbClr val="666666"/>
+                </a:solidFill>
+                <a:latin typeface="Consolas" pitchFamily="49" charset="0"/>
+                <a:cs typeface="Consolas" pitchFamily="49" charset="0"/>
+              </a:rPr>
+              <a:t>.</a:t>
+            </a:r>
+            <a:r>
+              <a:rPr lang="de-DE" sz="1600" b="0" dirty="0" err="1" smtClean="0">
+                <a:solidFill>
+                  <a:srgbClr val="000000"/>
+                </a:solidFill>
+                <a:latin typeface="Consolas" pitchFamily="49" charset="0"/>
+                <a:cs typeface="Consolas" pitchFamily="49" charset="0"/>
+              </a:rPr>
+              <a:t>javafx</a:t>
+            </a:r>
+            <a:r>
+              <a:rPr lang="de-DE" sz="1600" b="0" dirty="0" err="1" smtClean="0">
+                <a:solidFill>
+                  <a:srgbClr val="666666"/>
+                </a:solidFill>
+                <a:latin typeface="Consolas" pitchFamily="49" charset="0"/>
+                <a:cs typeface="Consolas" pitchFamily="49" charset="0"/>
+              </a:rPr>
+              <a:t>.</a:t>
+            </a:r>
+            <a:r>
+              <a:rPr lang="de-DE" sz="1600" b="0" dirty="0" err="1" smtClean="0">
+                <a:solidFill>
+                  <a:srgbClr val="000000"/>
+                </a:solidFill>
+                <a:latin typeface="Consolas" pitchFamily="49" charset="0"/>
+                <a:cs typeface="Consolas" pitchFamily="49" charset="0"/>
+              </a:rPr>
+              <a:t>beans</a:t>
+            </a:r>
+            <a:r>
+              <a:rPr lang="de-DE" sz="1600" b="0" dirty="0" err="1" smtClean="0">
+                <a:solidFill>
+                  <a:srgbClr val="666666"/>
+                </a:solidFill>
+                <a:latin typeface="Consolas" pitchFamily="49" charset="0"/>
+                <a:cs typeface="Consolas" pitchFamily="49" charset="0"/>
+              </a:rPr>
+              <a:t>.</a:t>
+            </a:r>
+            <a:r>
+              <a:rPr lang="de-DE" sz="1600" b="0" dirty="0" err="1" smtClean="0">
+                <a:solidFill>
+                  <a:srgbClr val="000000"/>
+                </a:solidFill>
+                <a:latin typeface="Consolas" pitchFamily="49" charset="0"/>
+                <a:cs typeface="Consolas" pitchFamily="49" charset="0"/>
+              </a:rPr>
+              <a:t>FXBindable</a:t>
+            </a:r>
+            <a:r>
+              <a:rPr lang="de-DE" sz="1600" dirty="0" smtClean="0">
+                <a:latin typeface="Consolas" pitchFamily="49" charset="0"/>
+                <a:cs typeface="Consolas" pitchFamily="49" charset="0"/>
+              </a:rPr>
+              <a:t/>
+            </a:r>
+            <a:br>
+              <a:rPr lang="de-DE" sz="1600" dirty="0" smtClean="0">
+                <a:latin typeface="Consolas" pitchFamily="49" charset="0"/>
+                <a:cs typeface="Consolas" pitchFamily="49" charset="0"/>
+              </a:rPr>
+            </a:br>
+            <a:r>
+              <a:rPr lang="de-DE" sz="1600" b="0" dirty="0" err="1" smtClean="0">
+                <a:solidFill>
+                  <a:srgbClr val="770088"/>
+                </a:solidFill>
+                <a:latin typeface="Consolas" pitchFamily="49" charset="0"/>
+                <a:cs typeface="Consolas" pitchFamily="49" charset="0"/>
+              </a:rPr>
+              <a:t>import</a:t>
+            </a:r>
+            <a:r>
+              <a:rPr lang="de-DE" sz="1600" b="0" dirty="0" smtClean="0">
+                <a:solidFill>
+                  <a:srgbClr val="770088"/>
+                </a:solidFill>
+                <a:latin typeface="Consolas" pitchFamily="49" charset="0"/>
+                <a:cs typeface="Consolas" pitchFamily="49" charset="0"/>
+              </a:rPr>
+              <a:t> </a:t>
+            </a:r>
+            <a:r>
+              <a:rPr lang="de-DE" sz="1600" b="0" dirty="0" err="1" smtClean="0">
+                <a:solidFill>
+                  <a:srgbClr val="000000"/>
+                </a:solidFill>
+                <a:latin typeface="Consolas" pitchFamily="49" charset="0"/>
+                <a:cs typeface="Consolas" pitchFamily="49" charset="0"/>
+              </a:rPr>
+              <a:t>groovy</a:t>
+            </a:r>
+            <a:r>
+              <a:rPr lang="de-DE" sz="1600" b="0" dirty="0" err="1" smtClean="0">
+                <a:solidFill>
+                  <a:srgbClr val="666666"/>
+                </a:solidFill>
+                <a:latin typeface="Consolas" pitchFamily="49" charset="0"/>
+                <a:cs typeface="Consolas" pitchFamily="49" charset="0"/>
+              </a:rPr>
+              <a:t>.</a:t>
+            </a:r>
+            <a:r>
+              <a:rPr lang="de-DE" sz="1600" b="0" dirty="0" err="1" smtClean="0">
+                <a:solidFill>
+                  <a:srgbClr val="000000"/>
+                </a:solidFill>
+                <a:latin typeface="Consolas" pitchFamily="49" charset="0"/>
+                <a:cs typeface="Consolas" pitchFamily="49" charset="0"/>
+              </a:rPr>
+              <a:t>transform</a:t>
+            </a:r>
+            <a:r>
+              <a:rPr lang="de-DE" sz="1600" b="0" dirty="0" err="1" smtClean="0">
+                <a:solidFill>
+                  <a:srgbClr val="666666"/>
+                </a:solidFill>
+                <a:latin typeface="Consolas" pitchFamily="49" charset="0"/>
+                <a:cs typeface="Consolas" pitchFamily="49" charset="0"/>
+              </a:rPr>
+              <a:t>.</a:t>
+            </a:r>
+            <a:r>
+              <a:rPr lang="de-DE" sz="1600" b="0" dirty="0" err="1" smtClean="0">
+                <a:solidFill>
+                  <a:srgbClr val="000000"/>
+                </a:solidFill>
+                <a:latin typeface="Consolas" pitchFamily="49" charset="0"/>
+                <a:cs typeface="Consolas" pitchFamily="49" charset="0"/>
+              </a:rPr>
+              <a:t>Canonical</a:t>
+            </a:r>
+            <a:r>
+              <a:rPr lang="de-DE" sz="1600" dirty="0" smtClean="0">
+                <a:latin typeface="Consolas" pitchFamily="49" charset="0"/>
+                <a:cs typeface="Consolas" pitchFamily="49" charset="0"/>
+              </a:rPr>
+              <a:t/>
+            </a:r>
+            <a:br>
+              <a:rPr lang="de-DE" sz="1600" dirty="0" smtClean="0">
+                <a:latin typeface="Consolas" pitchFamily="49" charset="0"/>
+                <a:cs typeface="Consolas" pitchFamily="49" charset="0"/>
+              </a:rPr>
+            </a:br>
+            <a:r>
+              <a:rPr lang="de-DE" sz="1600" dirty="0" smtClean="0">
+                <a:latin typeface="Consolas" pitchFamily="49" charset="0"/>
+                <a:cs typeface="Consolas" pitchFamily="49" charset="0"/>
+              </a:rPr>
+              <a:t/>
+            </a:r>
+            <a:br>
+              <a:rPr lang="de-DE" sz="1600" dirty="0" smtClean="0">
+                <a:latin typeface="Consolas" pitchFamily="49" charset="0"/>
+                <a:cs typeface="Consolas" pitchFamily="49" charset="0"/>
+              </a:rPr>
+            </a:br>
+            <a:r>
+              <a:rPr lang="de-DE" sz="1600" b="0" dirty="0" smtClean="0">
+                <a:solidFill>
+                  <a:srgbClr val="000000"/>
+                </a:solidFill>
+                <a:latin typeface="Consolas" pitchFamily="49" charset="0"/>
+                <a:cs typeface="Consolas" pitchFamily="49" charset="0"/>
+              </a:rPr>
+              <a:t>@</a:t>
+            </a:r>
+            <a:r>
+              <a:rPr lang="de-DE" sz="1600" b="0" dirty="0" err="1" smtClean="0">
+                <a:solidFill>
+                  <a:srgbClr val="000000"/>
+                </a:solidFill>
+                <a:latin typeface="Consolas" pitchFamily="49" charset="0"/>
+                <a:cs typeface="Consolas" pitchFamily="49" charset="0"/>
+              </a:rPr>
+              <a:t>Canonical</a:t>
+            </a:r>
+            <a:r>
+              <a:rPr lang="de-DE" sz="1600" dirty="0" smtClean="0">
+                <a:latin typeface="Consolas" pitchFamily="49" charset="0"/>
+                <a:cs typeface="Consolas" pitchFamily="49" charset="0"/>
+              </a:rPr>
+              <a:t/>
+            </a:r>
+            <a:br>
+              <a:rPr lang="de-DE" sz="1600" dirty="0" smtClean="0">
+                <a:latin typeface="Consolas" pitchFamily="49" charset="0"/>
+                <a:cs typeface="Consolas" pitchFamily="49" charset="0"/>
+              </a:rPr>
+            </a:br>
+            <a:r>
+              <a:rPr lang="de-DE" sz="1600" b="0" dirty="0" err="1" smtClean="0">
+                <a:solidFill>
+                  <a:srgbClr val="770088"/>
+                </a:solidFill>
+                <a:latin typeface="Consolas" pitchFamily="49" charset="0"/>
+                <a:cs typeface="Consolas" pitchFamily="49" charset="0"/>
+              </a:rPr>
+              <a:t>class</a:t>
+            </a:r>
+            <a:r>
+              <a:rPr lang="de-DE" sz="1600" b="0" dirty="0" smtClean="0">
+                <a:solidFill>
+                  <a:srgbClr val="770088"/>
+                </a:solidFill>
+                <a:latin typeface="Consolas" pitchFamily="49" charset="0"/>
+                <a:cs typeface="Consolas" pitchFamily="49" charset="0"/>
+              </a:rPr>
+              <a:t> </a:t>
+            </a:r>
+            <a:r>
+              <a:rPr lang="de-DE" sz="1600" b="0" dirty="0" smtClean="0">
+                <a:solidFill>
+                  <a:srgbClr val="000000"/>
+                </a:solidFill>
+                <a:latin typeface="Consolas" pitchFamily="49" charset="0"/>
+                <a:cs typeface="Consolas" pitchFamily="49" charset="0"/>
+              </a:rPr>
+              <a:t>Person </a:t>
+            </a:r>
+            <a:r>
+              <a:rPr lang="de-DE" sz="1600" b="0" dirty="0" smtClean="0">
+                <a:solidFill>
+                  <a:srgbClr val="666666"/>
+                </a:solidFill>
+                <a:latin typeface="Consolas" pitchFamily="49" charset="0"/>
+                <a:cs typeface="Consolas" pitchFamily="49" charset="0"/>
+              </a:rPr>
+              <a:t>{</a:t>
+            </a:r>
+            <a:r>
+              <a:rPr lang="de-DE" sz="1600" dirty="0" smtClean="0">
+                <a:latin typeface="Consolas" pitchFamily="49" charset="0"/>
+                <a:cs typeface="Consolas" pitchFamily="49" charset="0"/>
+              </a:rPr>
+              <a:t/>
+            </a:r>
+            <a:br>
+              <a:rPr lang="de-DE" sz="1600" dirty="0" smtClean="0">
+                <a:latin typeface="Consolas" pitchFamily="49" charset="0"/>
+                <a:cs typeface="Consolas" pitchFamily="49" charset="0"/>
+              </a:rPr>
+            </a:br>
+            <a:r>
+              <a:rPr lang="de-DE" sz="1600" b="0" dirty="0" smtClean="0">
+                <a:solidFill>
+                  <a:srgbClr val="666666"/>
+                </a:solidFill>
+                <a:latin typeface="Consolas" pitchFamily="49" charset="0"/>
+                <a:cs typeface="Consolas" pitchFamily="49" charset="0"/>
+              </a:rPr>
+              <a:t>    </a:t>
+            </a:r>
+            <a:r>
+              <a:rPr lang="de-DE" sz="1600" b="0" dirty="0" smtClean="0">
+                <a:solidFill>
+                  <a:srgbClr val="000000"/>
+                </a:solidFill>
+                <a:latin typeface="Consolas" pitchFamily="49" charset="0"/>
+                <a:cs typeface="Consolas" pitchFamily="49" charset="0"/>
+              </a:rPr>
+              <a:t>@</a:t>
+            </a:r>
+            <a:r>
+              <a:rPr lang="de-DE" sz="1600" b="0" dirty="0" err="1" smtClean="0">
+                <a:solidFill>
+                  <a:srgbClr val="000000"/>
+                </a:solidFill>
+                <a:latin typeface="Consolas" pitchFamily="49" charset="0"/>
+                <a:cs typeface="Consolas" pitchFamily="49" charset="0"/>
+              </a:rPr>
+              <a:t>FXBindable</a:t>
+            </a:r>
+            <a:r>
+              <a:rPr lang="de-DE" sz="1600" b="0" dirty="0" smtClean="0">
+                <a:solidFill>
+                  <a:srgbClr val="000000"/>
+                </a:solidFill>
+                <a:latin typeface="Consolas" pitchFamily="49" charset="0"/>
+                <a:cs typeface="Consolas" pitchFamily="49" charset="0"/>
+              </a:rPr>
+              <a:t> String </a:t>
+            </a:r>
+            <a:r>
+              <a:rPr lang="de-DE" sz="1600" b="0" dirty="0" err="1" smtClean="0">
+                <a:solidFill>
+                  <a:srgbClr val="000000"/>
+                </a:solidFill>
+                <a:latin typeface="Consolas" pitchFamily="49" charset="0"/>
+                <a:cs typeface="Consolas" pitchFamily="49" charset="0"/>
+              </a:rPr>
+              <a:t>firstName</a:t>
+            </a:r>
+            <a:r>
+              <a:rPr lang="de-DE" sz="1600" b="0" dirty="0" smtClean="0">
+                <a:solidFill>
+                  <a:srgbClr val="000000"/>
+                </a:solidFill>
+                <a:latin typeface="Consolas" pitchFamily="49" charset="0"/>
+                <a:cs typeface="Consolas" pitchFamily="49" charset="0"/>
+              </a:rPr>
+              <a:t> </a:t>
+            </a:r>
+            <a:r>
+              <a:rPr lang="de-DE" sz="1600" b="0" dirty="0" smtClean="0">
+                <a:solidFill>
+                  <a:srgbClr val="666666"/>
+                </a:solidFill>
+                <a:latin typeface="Consolas" pitchFamily="49" charset="0"/>
+                <a:cs typeface="Consolas" pitchFamily="49" charset="0"/>
+              </a:rPr>
+              <a:t>= </a:t>
+            </a:r>
+            <a:r>
+              <a:rPr lang="de-DE" sz="1600" b="0" dirty="0" smtClean="0">
+                <a:solidFill>
+                  <a:srgbClr val="AA2222"/>
+                </a:solidFill>
+                <a:latin typeface="Consolas" pitchFamily="49" charset="0"/>
+                <a:cs typeface="Consolas" pitchFamily="49" charset="0"/>
+              </a:rPr>
+              <a:t>'Max'</a:t>
+            </a:r>
+            <a:r>
+              <a:rPr lang="de-DE" sz="1600" dirty="0" smtClean="0">
+                <a:latin typeface="Consolas" pitchFamily="49" charset="0"/>
+                <a:cs typeface="Consolas" pitchFamily="49" charset="0"/>
+              </a:rPr>
+              <a:t/>
+            </a:r>
+            <a:br>
+              <a:rPr lang="de-DE" sz="1600" dirty="0" smtClean="0">
+                <a:latin typeface="Consolas" pitchFamily="49" charset="0"/>
+                <a:cs typeface="Consolas" pitchFamily="49" charset="0"/>
+              </a:rPr>
+            </a:br>
+            <a:r>
+              <a:rPr lang="de-DE" sz="1600" b="0" dirty="0" smtClean="0">
+                <a:solidFill>
+                  <a:srgbClr val="666666"/>
+                </a:solidFill>
+                <a:latin typeface="Consolas" pitchFamily="49" charset="0"/>
+                <a:cs typeface="Consolas" pitchFamily="49" charset="0"/>
+              </a:rPr>
+              <a:t>    </a:t>
+            </a:r>
+            <a:r>
+              <a:rPr lang="de-DE" sz="1600" b="0" dirty="0" smtClean="0">
+                <a:solidFill>
+                  <a:srgbClr val="000000"/>
+                </a:solidFill>
+                <a:latin typeface="Consolas" pitchFamily="49" charset="0"/>
+                <a:cs typeface="Consolas" pitchFamily="49" charset="0"/>
+              </a:rPr>
+              <a:t>@</a:t>
+            </a:r>
+            <a:r>
+              <a:rPr lang="de-DE" sz="1600" b="0" dirty="0" err="1" smtClean="0">
+                <a:solidFill>
+                  <a:srgbClr val="000000"/>
+                </a:solidFill>
+                <a:latin typeface="Consolas" pitchFamily="49" charset="0"/>
+                <a:cs typeface="Consolas" pitchFamily="49" charset="0"/>
+              </a:rPr>
+              <a:t>FXBindable</a:t>
+            </a:r>
+            <a:r>
+              <a:rPr lang="de-DE" sz="1600" b="0" dirty="0" smtClean="0">
+                <a:solidFill>
+                  <a:srgbClr val="000000"/>
+                </a:solidFill>
+                <a:latin typeface="Consolas" pitchFamily="49" charset="0"/>
+                <a:cs typeface="Consolas" pitchFamily="49" charset="0"/>
+              </a:rPr>
+              <a:t> String </a:t>
+            </a:r>
+            <a:r>
+              <a:rPr lang="de-DE" sz="1600" b="0" dirty="0" err="1" smtClean="0">
+                <a:solidFill>
+                  <a:srgbClr val="000000"/>
+                </a:solidFill>
+                <a:latin typeface="Consolas" pitchFamily="49" charset="0"/>
+                <a:cs typeface="Consolas" pitchFamily="49" charset="0"/>
+              </a:rPr>
+              <a:t>lastName</a:t>
+            </a:r>
+            <a:r>
+              <a:rPr lang="de-DE" sz="1600" b="0" dirty="0" smtClean="0">
+                <a:solidFill>
+                  <a:srgbClr val="000000"/>
+                </a:solidFill>
+                <a:latin typeface="Consolas" pitchFamily="49" charset="0"/>
+                <a:cs typeface="Consolas" pitchFamily="49" charset="0"/>
+              </a:rPr>
+              <a:t> </a:t>
+            </a:r>
+            <a:r>
+              <a:rPr lang="de-DE" sz="1600" b="0" dirty="0" smtClean="0">
+                <a:solidFill>
+                  <a:srgbClr val="666666"/>
+                </a:solidFill>
+                <a:latin typeface="Consolas" pitchFamily="49" charset="0"/>
+                <a:cs typeface="Consolas" pitchFamily="49" charset="0"/>
+              </a:rPr>
+              <a:t>= </a:t>
+            </a:r>
+            <a:r>
+              <a:rPr lang="de-DE" sz="1600" b="0" dirty="0" smtClean="0">
+                <a:solidFill>
+                  <a:srgbClr val="AA2222"/>
+                </a:solidFill>
+                <a:latin typeface="Consolas" pitchFamily="49" charset="0"/>
+                <a:cs typeface="Consolas" pitchFamily="49" charset="0"/>
+              </a:rPr>
+              <a:t>'Mustermann'</a:t>
+            </a:r>
+            <a:r>
+              <a:rPr lang="de-DE" sz="1600" dirty="0" smtClean="0">
+                <a:latin typeface="Consolas" pitchFamily="49" charset="0"/>
+                <a:cs typeface="Consolas" pitchFamily="49" charset="0"/>
+              </a:rPr>
+              <a:t/>
+            </a:r>
+            <a:br>
+              <a:rPr lang="de-DE" sz="1600" dirty="0" smtClean="0">
+                <a:latin typeface="Consolas" pitchFamily="49" charset="0"/>
+                <a:cs typeface="Consolas" pitchFamily="49" charset="0"/>
+              </a:rPr>
+            </a:br>
+            <a:r>
+              <a:rPr lang="de-DE" sz="1600" b="0" dirty="0" smtClean="0">
+                <a:solidFill>
+                  <a:srgbClr val="666666"/>
+                </a:solidFill>
+                <a:latin typeface="Consolas" pitchFamily="49" charset="0"/>
+                <a:cs typeface="Consolas" pitchFamily="49" charset="0"/>
+              </a:rPr>
+              <a:t>}</a:t>
+            </a:r>
+            <a:r>
+              <a:rPr lang="de-DE" sz="1600" dirty="0" smtClean="0">
+                <a:latin typeface="Consolas" pitchFamily="49" charset="0"/>
+                <a:cs typeface="Consolas" pitchFamily="49" charset="0"/>
+              </a:rPr>
+              <a:t/>
+            </a:r>
+            <a:br>
+              <a:rPr lang="de-DE" sz="1600" dirty="0" smtClean="0">
+                <a:latin typeface="Consolas" pitchFamily="49" charset="0"/>
+                <a:cs typeface="Consolas" pitchFamily="49" charset="0"/>
+              </a:rPr>
+            </a:br>
+            <a:r>
+              <a:rPr lang="de-DE" sz="1600" b="0" dirty="0" smtClean="0">
+                <a:solidFill>
+                  <a:srgbClr val="000000"/>
+                </a:solidFill>
+                <a:latin typeface="Consolas" pitchFamily="49" charset="0"/>
+                <a:cs typeface="Consolas" pitchFamily="49" charset="0"/>
+              </a:rPr>
+              <a:t>​</a:t>
+            </a:r>
+            <a:endParaRPr lang="de-DE" sz="1600" dirty="0">
+              <a:latin typeface="Consolas" pitchFamily="49" charset="0"/>
+              <a:cs typeface="Consolas" pitchFamily="49" charset="0"/>
+            </a:endParaRPr>
+          </a:p>
+        </p:txBody>
+      </p:sp>
+      <p:sp>
+        <p:nvSpPr>
+          <p:cNvPr id="4" name="Inhaltsplatzhalter 4"/>
+          <p:cNvSpPr txBox="1">
+            <a:spLocks/>
+          </p:cNvSpPr>
           <p:nvPr/>
         </p:nvSpPr>
         <p:spPr>
           <a:xfrm>
-            <a:off x="323410" y="1628750"/>
-            <a:ext cx="8497180" cy="4524315"/>
+            <a:off x="457200" y="3891805"/>
+            <a:ext cx="8229600" cy="2561531"/>
           </a:xfrm>
           <a:prstGeom prst="rect">
             <a:avLst/>
           </a:prstGeom>
         </p:spPr>
         <p:txBody>
-          <a:bodyPr wrap="square">
-            <a:spAutoFit/>
+          <a:bodyPr vert="horz" lIns="91440" tIns="45720" rIns="91440" bIns="45720" rtlCol="0">
+            <a:normAutofit fontScale="77500" lnSpcReduction="20000"/>
           </a:bodyPr>
           <a:lstStyle/>
           <a:p>
-            <a:pPr algn="ctr">
+            <a:pPr marL="355600" marR="0" lvl="0" indent="-355600" algn="l" defTabSz="457200" rtl="0" eaLnBrk="1" fontAlgn="auto" latinLnBrk="0" hangingPunct="1">
               <a:lnSpc>
-                <a:spcPct val="120000"/>
+                <a:spcPct val="100000"/>
               </a:lnSpc>
+              <a:spcBef>
+                <a:spcPct val="20000"/>
+              </a:spcBef>
+              <a:spcAft>
+                <a:spcPts val="0"/>
+              </a:spcAft>
+              <a:buClrTx/>
+              <a:buSzTx/>
+              <a:buFont typeface="Arial" pitchFamily="34" charset="0"/>
+              <a:buChar char="•"/>
+              <a:tabLst/>
+              <a:defRPr/>
             </a:pPr>
             <a:r>
-              <a:rPr lang="de-DE" sz="2400" b="1" dirty="0" smtClean="0"/>
-              <a:t>Groovy und </a:t>
-            </a:r>
-            <a:r>
-              <a:rPr lang="de-DE" sz="2400" b="1" dirty="0" err="1" smtClean="0"/>
+              <a:rPr kumimoji="0" lang="de-DE" sz="3200" b="1" i="0" u="none" strike="noStrike" kern="1200" cap="none" spc="0" normalizeH="0" baseline="0" noProof="0" dirty="0" smtClean="0">
+                <a:ln>
+                  <a:noFill/>
+                </a:ln>
+                <a:solidFill>
+                  <a:srgbClr val="1E2959"/>
+                </a:solidFill>
+                <a:effectLst/>
+                <a:uLnTx/>
+                <a:uFillTx/>
+                <a:latin typeface="+mn-lt"/>
+                <a:ea typeface="+mn-ea"/>
+                <a:cs typeface="+mn-cs"/>
+              </a:rPr>
+              <a:t>@</a:t>
+            </a:r>
+            <a:r>
+              <a:rPr kumimoji="0" lang="de-DE" sz="3200" b="1" i="0" u="none" strike="noStrike" kern="1200" cap="none" spc="0" normalizeH="0" baseline="0" noProof="0" dirty="0" err="1" smtClean="0">
+                <a:ln>
+                  <a:noFill/>
+                </a:ln>
+                <a:solidFill>
+                  <a:srgbClr val="1E2959"/>
+                </a:solidFill>
+                <a:effectLst/>
+                <a:uLnTx/>
+                <a:uFillTx/>
+                <a:latin typeface="+mn-lt"/>
+                <a:ea typeface="+mn-ea"/>
+                <a:cs typeface="+mn-cs"/>
+              </a:rPr>
+              <a:t>Canonical</a:t>
+            </a:r>
+            <a:endParaRPr lang="de-DE" sz="3200" b="1" dirty="0" smtClean="0">
+              <a:solidFill>
+                <a:srgbClr val="1E2959"/>
+              </a:solidFill>
+            </a:endParaRPr>
+          </a:p>
+          <a:p>
+            <a:pPr marL="812800" lvl="1" indent="-355600" defTabSz="457200">
+              <a:spcBef>
+                <a:spcPct val="20000"/>
+              </a:spcBef>
+              <a:buFont typeface="Arial" pitchFamily="34" charset="0"/>
+              <a:buChar char="•"/>
+            </a:pPr>
+            <a:r>
+              <a:rPr kumimoji="0" lang="de-DE" sz="3200" b="1" i="0" u="none" strike="noStrike" kern="1200" cap="none" spc="0" normalizeH="0" baseline="0" noProof="0" dirty="0" smtClean="0">
+                <a:ln>
+                  <a:noFill/>
+                </a:ln>
+                <a:solidFill>
+                  <a:srgbClr val="1E2959"/>
+                </a:solidFill>
+                <a:effectLst/>
+                <a:uLnTx/>
+                <a:uFillTx/>
+                <a:latin typeface="+mn-lt"/>
+                <a:ea typeface="+mn-ea"/>
+                <a:cs typeface="+mn-cs"/>
+              </a:rPr>
+              <a:t>Groovy AST</a:t>
+            </a:r>
+            <a:r>
+              <a:rPr lang="de-DE" sz="3200" b="1" dirty="0" smtClean="0">
+                <a:solidFill>
+                  <a:srgbClr val="1E2959"/>
+                </a:solidFill>
+              </a:rPr>
+              <a:t>-Transformation für </a:t>
+            </a:r>
+            <a:r>
+              <a:rPr lang="de-DE" sz="3200" b="1" dirty="0" err="1" smtClean="0">
+                <a:solidFill>
+                  <a:srgbClr val="1E2959"/>
+                </a:solidFill>
+              </a:rPr>
+              <a:t>Tupel-Konstruktor</a:t>
+            </a:r>
+            <a:r>
+              <a:rPr lang="de-DE" sz="3200" b="1" dirty="0" smtClean="0">
+                <a:solidFill>
+                  <a:srgbClr val="1E2959"/>
+                </a:solidFill>
+              </a:rPr>
+              <a:t>, </a:t>
+            </a:r>
+            <a:r>
+              <a:rPr lang="de-DE" sz="3200" b="1" dirty="0" err="1" smtClean="0">
+                <a:solidFill>
+                  <a:srgbClr val="1E2959"/>
+                </a:solidFill>
+              </a:rPr>
+              <a:t>equals</a:t>
+            </a:r>
+            <a:r>
+              <a:rPr lang="de-DE" sz="3200" b="1" dirty="0" smtClean="0">
+                <a:solidFill>
+                  <a:srgbClr val="1E2959"/>
+                </a:solidFill>
+              </a:rPr>
+              <a:t>(), </a:t>
+            </a:r>
+            <a:r>
+              <a:rPr lang="de-DE" sz="3200" b="1" dirty="0" err="1" smtClean="0">
+                <a:solidFill>
+                  <a:srgbClr val="1E2959"/>
+                </a:solidFill>
+              </a:rPr>
+              <a:t>hashCode</a:t>
+            </a:r>
+            <a:r>
+              <a:rPr lang="de-DE" sz="3200" b="1" dirty="0" smtClean="0">
+                <a:solidFill>
+                  <a:srgbClr val="1E2959"/>
+                </a:solidFill>
+              </a:rPr>
+              <a:t>() und </a:t>
+            </a:r>
+            <a:r>
+              <a:rPr lang="de-DE" sz="3200" b="1" dirty="0" err="1" smtClean="0">
+                <a:solidFill>
+                  <a:srgbClr val="1E2959"/>
+                </a:solidFill>
+              </a:rPr>
+              <a:t>toString</a:t>
+            </a:r>
+            <a:r>
+              <a:rPr lang="de-DE" sz="3200" b="1" dirty="0" smtClean="0">
+                <a:solidFill>
+                  <a:srgbClr val="1E2959"/>
+                </a:solidFill>
+              </a:rPr>
+              <a:t>()</a:t>
+            </a:r>
+          </a:p>
+          <a:p>
+            <a:pPr marL="355600" indent="-355600" defTabSz="457200">
+              <a:spcBef>
+                <a:spcPct val="20000"/>
+              </a:spcBef>
+              <a:buFont typeface="Arial" pitchFamily="34" charset="0"/>
+              <a:buChar char="•"/>
+            </a:pPr>
+            <a:r>
+              <a:rPr kumimoji="0" lang="de-DE" sz="3200" b="1" i="0" u="none" strike="noStrike" kern="1200" cap="none" spc="0" normalizeH="0" baseline="0" noProof="0" dirty="0" smtClean="0">
+                <a:ln>
+                  <a:noFill/>
+                </a:ln>
+                <a:solidFill>
+                  <a:srgbClr val="1E2959"/>
+                </a:solidFill>
+                <a:effectLst/>
+                <a:uLnTx/>
+                <a:uFillTx/>
+                <a:latin typeface="+mn-lt"/>
+                <a:ea typeface="+mn-ea"/>
+                <a:cs typeface="+mn-cs"/>
+              </a:rPr>
+              <a:t>@</a:t>
+            </a:r>
+            <a:r>
+              <a:rPr kumimoji="0" lang="de-DE" sz="3200" b="1" i="0" u="none" strike="noStrike" kern="1200" cap="none" spc="0" normalizeH="0" baseline="0" noProof="0" dirty="0" err="1" smtClean="0">
+                <a:ln>
+                  <a:noFill/>
+                </a:ln>
+                <a:solidFill>
+                  <a:srgbClr val="1E2959"/>
+                </a:solidFill>
+                <a:effectLst/>
+                <a:uLnTx/>
+                <a:uFillTx/>
+                <a:latin typeface="+mn-lt"/>
+                <a:ea typeface="+mn-ea"/>
+                <a:cs typeface="+mn-cs"/>
+              </a:rPr>
+              <a:t>FXBindable</a:t>
+            </a:r>
+            <a:endParaRPr kumimoji="0" lang="de-DE" sz="3200" b="1" i="0" u="none" strike="noStrike" kern="1200" cap="none" spc="0" normalizeH="0" baseline="0" noProof="0" dirty="0" smtClean="0">
+              <a:ln>
+                <a:noFill/>
+              </a:ln>
+              <a:solidFill>
+                <a:srgbClr val="1E2959"/>
+              </a:solidFill>
+              <a:effectLst/>
+              <a:uLnTx/>
+              <a:uFillTx/>
+              <a:latin typeface="+mn-lt"/>
+              <a:ea typeface="+mn-ea"/>
+              <a:cs typeface="+mn-cs"/>
+            </a:endParaRPr>
+          </a:p>
+          <a:p>
+            <a:pPr marL="812800" lvl="1" indent="-355600" defTabSz="457200">
+              <a:spcBef>
+                <a:spcPct val="20000"/>
+              </a:spcBef>
+              <a:buFont typeface="Arial" pitchFamily="34" charset="0"/>
+              <a:buChar char="•"/>
+            </a:pPr>
+            <a:r>
+              <a:rPr lang="de-DE" sz="3200" b="1" dirty="0" err="1" smtClean="0">
+                <a:solidFill>
+                  <a:srgbClr val="1E2959"/>
+                </a:solidFill>
+              </a:rPr>
               <a:t>GroovyFX</a:t>
             </a:r>
-            <a:endParaRPr lang="de-DE" sz="2400" b="1" dirty="0" smtClean="0"/>
-          </a:p>
-          <a:p>
-            <a:pPr algn="ctr">
-              <a:lnSpc>
-                <a:spcPct val="120000"/>
-              </a:lnSpc>
-            </a:pPr>
-            <a:r>
-              <a:rPr lang="de-DE" sz="2400" dirty="0" smtClean="0">
-                <a:hlinkClick r:id="rId2"/>
-              </a:rPr>
-              <a:t>http://groovy.codehaus.org</a:t>
-            </a:r>
-            <a:r>
-              <a:rPr lang="de-DE" sz="2400" dirty="0" smtClean="0"/>
-              <a:t> </a:t>
-            </a:r>
-          </a:p>
-          <a:p>
-            <a:pPr algn="ctr">
-              <a:lnSpc>
-                <a:spcPct val="120000"/>
-              </a:lnSpc>
-            </a:pPr>
-            <a:r>
-              <a:rPr lang="de-DE" sz="2400" dirty="0" smtClean="0">
-                <a:hlinkClick r:id="rId3"/>
-              </a:rPr>
-              <a:t>http://groovy.codehaus.org/GroovyFX</a:t>
-            </a:r>
-            <a:r>
-              <a:rPr lang="de-DE" sz="2400" dirty="0" smtClean="0"/>
-              <a:t> </a:t>
-            </a:r>
-          </a:p>
-          <a:p>
-            <a:pPr algn="ctr">
-              <a:lnSpc>
-                <a:spcPct val="120000"/>
-              </a:lnSpc>
-            </a:pPr>
-            <a:r>
-              <a:rPr lang="de-DE" sz="2400" dirty="0" smtClean="0">
-                <a:hlinkClick r:id="rId4"/>
-              </a:rPr>
-              <a:t>http://fxexperience.com</a:t>
-            </a:r>
-            <a:endParaRPr lang="de-DE" sz="2400" dirty="0" smtClean="0"/>
-          </a:p>
-          <a:p>
-            <a:pPr algn="ctr">
-              <a:lnSpc>
-                <a:spcPct val="120000"/>
-              </a:lnSpc>
-            </a:pPr>
-            <a:endParaRPr lang="de-DE" sz="2400" dirty="0" smtClean="0"/>
-          </a:p>
-          <a:p>
-            <a:pPr algn="ctr">
-              <a:lnSpc>
-                <a:spcPct val="120000"/>
-              </a:lnSpc>
-            </a:pPr>
-            <a:r>
-              <a:rPr lang="de-DE" sz="2400" b="1" dirty="0" smtClean="0"/>
-              <a:t>Beispiele:</a:t>
-            </a:r>
-          </a:p>
-          <a:p>
-            <a:pPr algn="ctr">
-              <a:lnSpc>
-                <a:spcPct val="120000"/>
-              </a:lnSpc>
-            </a:pPr>
-            <a:r>
-              <a:rPr lang="de-DE" sz="2400" dirty="0" smtClean="0">
-                <a:hlinkClick r:id="rId5"/>
-              </a:rPr>
-              <a:t>https://github.com/codescape/presentations</a:t>
-            </a:r>
-            <a:endParaRPr lang="de-DE" sz="2400" dirty="0" smtClean="0"/>
-          </a:p>
-          <a:p>
-            <a:pPr algn="ctr">
-              <a:lnSpc>
-                <a:spcPct val="120000"/>
-              </a:lnSpc>
-            </a:pPr>
-            <a:endParaRPr lang="de-DE" sz="2400" b="1" dirty="0" smtClean="0"/>
-          </a:p>
-          <a:p>
-            <a:pPr algn="ctr">
-              <a:lnSpc>
-                <a:spcPct val="120000"/>
-              </a:lnSpc>
-            </a:pPr>
-            <a:r>
-              <a:rPr lang="de-DE" sz="2400" b="1" dirty="0" err="1" smtClean="0"/>
-              <a:t>Twitter</a:t>
-            </a:r>
-            <a:r>
-              <a:rPr lang="de-DE" sz="2400" b="1" dirty="0" smtClean="0"/>
-              <a:t>:</a:t>
-            </a:r>
-          </a:p>
-          <a:p>
-            <a:pPr algn="ctr">
-              <a:lnSpc>
-                <a:spcPct val="120000"/>
-              </a:lnSpc>
-            </a:pPr>
-            <a:r>
-              <a:rPr lang="de-DE" sz="2400" dirty="0" smtClean="0">
-                <a:hlinkClick r:id="rId6"/>
-              </a:rPr>
-              <a:t>@</a:t>
-            </a:r>
-            <a:r>
-              <a:rPr lang="de-DE" sz="2400" dirty="0" err="1" smtClean="0">
-                <a:hlinkClick r:id="rId6"/>
-              </a:rPr>
-              <a:t>stefanglase</a:t>
-            </a:r>
-            <a:endParaRPr lang="de-DE" sz="2400" dirty="0"/>
+            <a:r>
+              <a:rPr lang="de-DE" sz="3200" b="1" dirty="0" smtClean="0">
+                <a:solidFill>
+                  <a:srgbClr val="1E2959"/>
+                </a:solidFill>
+              </a:rPr>
+              <a:t> AST-Transformation für </a:t>
+            </a:r>
+            <a:r>
+              <a:rPr lang="de-DE" sz="3200" b="1" dirty="0" err="1" smtClean="0">
+                <a:solidFill>
+                  <a:srgbClr val="1E2959"/>
+                </a:solidFill>
+              </a:rPr>
+              <a:t>get</a:t>
+            </a:r>
+            <a:r>
+              <a:rPr lang="de-DE" sz="3200" b="1" dirty="0" smtClean="0">
+                <a:solidFill>
+                  <a:srgbClr val="1E2959"/>
+                </a:solidFill>
+              </a:rPr>
+              <a:t>&lt;Eigenschaft&gt;(), </a:t>
+            </a:r>
+            <a:r>
+              <a:rPr lang="de-DE" sz="3200" b="1" dirty="0" err="1" smtClean="0">
+                <a:solidFill>
+                  <a:srgbClr val="1E2959"/>
+                </a:solidFill>
+              </a:rPr>
+              <a:t>set</a:t>
+            </a:r>
+            <a:r>
+              <a:rPr lang="de-DE" sz="3200" b="1" dirty="0" smtClean="0">
+                <a:solidFill>
+                  <a:srgbClr val="1E2959"/>
+                </a:solidFill>
+              </a:rPr>
+              <a:t>&lt;Eigenschaft&gt;() und </a:t>
+            </a:r>
+            <a:r>
+              <a:rPr lang="de-DE" sz="3200" b="1" dirty="0" err="1" smtClean="0">
+                <a:solidFill>
+                  <a:srgbClr val="1E2959"/>
+                </a:solidFill>
+              </a:rPr>
+              <a:t>get</a:t>
+            </a:r>
+            <a:r>
+              <a:rPr lang="de-DE" sz="3200" b="1" dirty="0" smtClean="0">
+                <a:solidFill>
+                  <a:srgbClr val="1E2959"/>
+                </a:solidFill>
+              </a:rPr>
+              <a:t>&lt;Eigenschaft&gt;Property()</a:t>
+            </a:r>
+            <a:endParaRPr kumimoji="0" lang="de-DE" sz="3200" b="1" i="0" u="none" strike="noStrike" kern="1200" cap="none" spc="0" normalizeH="0" baseline="0" noProof="0" dirty="0">
+              <a:ln>
+                <a:noFill/>
+              </a:ln>
+              <a:solidFill>
+                <a:srgbClr val="1E2959"/>
+              </a:solidFill>
+              <a:effectLst/>
+              <a:uLnTx/>
+              <a:uFillTx/>
+              <a:latin typeface="+mn-lt"/>
+              <a:ea typeface="+mn-ea"/>
+              <a:cs typeface="+mn-cs"/>
+            </a:endParaRPr>
           </a:p>
         </p:txBody>
       </p:sp>
     </p:spTree>
-    <p:extLst>
-      <p:ext uri="{BB962C8B-B14F-4D97-AF65-F5344CB8AC3E}">
-        <p14:creationId xmlns:p14="http://schemas.microsoft.com/office/powerpoint/2010/main" xmlns="" val="1364891894"/>
-      </p:ext>
-    </p:extLst>
   </p:cSld>
   <p:clrMapOvr>
     <a:masterClrMapping/>
   </p:clrMapOvr>
-  <p:transition/>
   <p:timing>
     <p:tnLst>
       <p:par>
@@ -26567,6 +28786,1810 @@
           <a:p>
             <a:r>
               <a:rPr lang="de-DE" dirty="0" smtClean="0"/>
+              <a:t>Properties Beispiel</a:t>
+            </a:r>
+            <a:endParaRPr lang="de-DE" dirty="0"/>
+          </a:p>
+        </p:txBody>
+      </p:sp>
+      <p:sp>
+        <p:nvSpPr>
+          <p:cNvPr id="3" name="Inhaltsplatzhalter 2"/>
+          <p:cNvSpPr>
+            <a:spLocks noGrp="1"/>
+          </p:cNvSpPr>
+          <p:nvPr>
+            <p:ph idx="1"/>
+          </p:nvPr>
+        </p:nvSpPr>
+        <p:spPr/>
+        <p:txBody>
+          <a:bodyPr>
+            <a:noAutofit/>
+          </a:bodyPr>
+          <a:lstStyle/>
+          <a:p>
+            <a:pPr marL="0" indent="0">
+              <a:buNone/>
+            </a:pPr>
+            <a:r>
+              <a:rPr lang="de-DE" sz="1600" b="0" dirty="0" smtClean="0">
+                <a:solidFill>
+                  <a:srgbClr val="000000"/>
+                </a:solidFill>
+                <a:latin typeface="Consolas" pitchFamily="49" charset="0"/>
+                <a:cs typeface="Consolas" pitchFamily="49" charset="0"/>
+              </a:rPr>
+              <a:t>@</a:t>
+            </a:r>
+            <a:r>
+              <a:rPr lang="de-DE" sz="1600" b="0" dirty="0" err="1" smtClean="0">
+                <a:solidFill>
+                  <a:srgbClr val="000000"/>
+                </a:solidFill>
+                <a:latin typeface="Consolas" pitchFamily="49" charset="0"/>
+                <a:cs typeface="Consolas" pitchFamily="49" charset="0"/>
+              </a:rPr>
+              <a:t>Canonical</a:t>
+            </a:r>
+            <a:r>
+              <a:rPr lang="de-DE" sz="1600" dirty="0" smtClean="0">
+                <a:latin typeface="Consolas" pitchFamily="49" charset="0"/>
+                <a:cs typeface="Consolas" pitchFamily="49" charset="0"/>
+              </a:rPr>
+              <a:t/>
+            </a:r>
+            <a:br>
+              <a:rPr lang="de-DE" sz="1600" dirty="0" smtClean="0">
+                <a:latin typeface="Consolas" pitchFamily="49" charset="0"/>
+                <a:cs typeface="Consolas" pitchFamily="49" charset="0"/>
+              </a:rPr>
+            </a:br>
+            <a:r>
+              <a:rPr lang="de-DE" sz="1600" b="0" dirty="0" err="1" smtClean="0">
+                <a:solidFill>
+                  <a:srgbClr val="770088"/>
+                </a:solidFill>
+                <a:latin typeface="Consolas" pitchFamily="49" charset="0"/>
+                <a:cs typeface="Consolas" pitchFamily="49" charset="0"/>
+              </a:rPr>
+              <a:t>class</a:t>
+            </a:r>
+            <a:r>
+              <a:rPr lang="de-DE" sz="1600" b="0" dirty="0" smtClean="0">
+                <a:solidFill>
+                  <a:srgbClr val="770088"/>
+                </a:solidFill>
+                <a:latin typeface="Consolas" pitchFamily="49" charset="0"/>
+                <a:cs typeface="Consolas" pitchFamily="49" charset="0"/>
+              </a:rPr>
+              <a:t> </a:t>
+            </a:r>
+            <a:r>
+              <a:rPr lang="de-DE" sz="1600" b="0" dirty="0" smtClean="0">
+                <a:solidFill>
+                  <a:srgbClr val="000000"/>
+                </a:solidFill>
+                <a:latin typeface="Consolas" pitchFamily="49" charset="0"/>
+                <a:cs typeface="Consolas" pitchFamily="49" charset="0"/>
+              </a:rPr>
+              <a:t>Person </a:t>
+            </a:r>
+            <a:r>
+              <a:rPr lang="de-DE" sz="1600" b="0" dirty="0" smtClean="0">
+                <a:solidFill>
+                  <a:srgbClr val="666666"/>
+                </a:solidFill>
+                <a:latin typeface="Consolas" pitchFamily="49" charset="0"/>
+                <a:cs typeface="Consolas" pitchFamily="49" charset="0"/>
+              </a:rPr>
+              <a:t>{</a:t>
+            </a:r>
+            <a:r>
+              <a:rPr lang="de-DE" sz="1600" dirty="0" smtClean="0">
+                <a:latin typeface="Consolas" pitchFamily="49" charset="0"/>
+                <a:cs typeface="Consolas" pitchFamily="49" charset="0"/>
+              </a:rPr>
+              <a:t/>
+            </a:r>
+            <a:br>
+              <a:rPr lang="de-DE" sz="1600" dirty="0" smtClean="0">
+                <a:latin typeface="Consolas" pitchFamily="49" charset="0"/>
+                <a:cs typeface="Consolas" pitchFamily="49" charset="0"/>
+              </a:rPr>
+            </a:br>
+            <a:r>
+              <a:rPr lang="de-DE" sz="1600" b="0" dirty="0" smtClean="0">
+                <a:solidFill>
+                  <a:srgbClr val="666666"/>
+                </a:solidFill>
+                <a:latin typeface="Consolas" pitchFamily="49" charset="0"/>
+                <a:cs typeface="Consolas" pitchFamily="49" charset="0"/>
+              </a:rPr>
+              <a:t>    </a:t>
+            </a:r>
+            <a:r>
+              <a:rPr lang="de-DE" sz="1600" b="0" dirty="0" smtClean="0">
+                <a:solidFill>
+                  <a:srgbClr val="000000"/>
+                </a:solidFill>
+                <a:latin typeface="Consolas" pitchFamily="49" charset="0"/>
+                <a:cs typeface="Consolas" pitchFamily="49" charset="0"/>
+              </a:rPr>
+              <a:t>@</a:t>
+            </a:r>
+            <a:r>
+              <a:rPr lang="de-DE" sz="1600" b="0" dirty="0" err="1" smtClean="0">
+                <a:solidFill>
+                  <a:srgbClr val="000000"/>
+                </a:solidFill>
+                <a:latin typeface="Consolas" pitchFamily="49" charset="0"/>
+                <a:cs typeface="Consolas" pitchFamily="49" charset="0"/>
+              </a:rPr>
+              <a:t>FXBindable</a:t>
+            </a:r>
+            <a:r>
+              <a:rPr lang="de-DE" sz="1600" b="0" dirty="0" smtClean="0">
+                <a:solidFill>
+                  <a:srgbClr val="000000"/>
+                </a:solidFill>
+                <a:latin typeface="Consolas" pitchFamily="49" charset="0"/>
+                <a:cs typeface="Consolas" pitchFamily="49" charset="0"/>
+              </a:rPr>
+              <a:t> String </a:t>
+            </a:r>
+            <a:r>
+              <a:rPr lang="de-DE" sz="1600" b="0" dirty="0" err="1" smtClean="0">
+                <a:solidFill>
+                  <a:srgbClr val="000000"/>
+                </a:solidFill>
+                <a:latin typeface="Consolas" pitchFamily="49" charset="0"/>
+                <a:cs typeface="Consolas" pitchFamily="49" charset="0"/>
+              </a:rPr>
+              <a:t>firstName</a:t>
+            </a:r>
+            <a:r>
+              <a:rPr lang="de-DE" sz="1600" b="0" dirty="0" smtClean="0">
+                <a:solidFill>
+                  <a:srgbClr val="000000"/>
+                </a:solidFill>
+                <a:latin typeface="Consolas" pitchFamily="49" charset="0"/>
+                <a:cs typeface="Consolas" pitchFamily="49" charset="0"/>
+              </a:rPr>
+              <a:t> </a:t>
+            </a:r>
+            <a:r>
+              <a:rPr lang="de-DE" sz="1600" b="0" dirty="0" smtClean="0">
+                <a:solidFill>
+                  <a:srgbClr val="666666"/>
+                </a:solidFill>
+                <a:latin typeface="Consolas" pitchFamily="49" charset="0"/>
+                <a:cs typeface="Consolas" pitchFamily="49" charset="0"/>
+              </a:rPr>
+              <a:t>= </a:t>
+            </a:r>
+            <a:r>
+              <a:rPr lang="de-DE" sz="1600" b="0" dirty="0" smtClean="0">
+                <a:solidFill>
+                  <a:srgbClr val="AA2222"/>
+                </a:solidFill>
+                <a:latin typeface="Consolas" pitchFamily="49" charset="0"/>
+                <a:cs typeface="Consolas" pitchFamily="49" charset="0"/>
+              </a:rPr>
+              <a:t>'Max'</a:t>
+            </a:r>
+            <a:r>
+              <a:rPr lang="de-DE" sz="1600" dirty="0" smtClean="0">
+                <a:latin typeface="Consolas" pitchFamily="49" charset="0"/>
+                <a:cs typeface="Consolas" pitchFamily="49" charset="0"/>
+              </a:rPr>
+              <a:t/>
+            </a:r>
+            <a:br>
+              <a:rPr lang="de-DE" sz="1600" dirty="0" smtClean="0">
+                <a:latin typeface="Consolas" pitchFamily="49" charset="0"/>
+                <a:cs typeface="Consolas" pitchFamily="49" charset="0"/>
+              </a:rPr>
+            </a:br>
+            <a:r>
+              <a:rPr lang="de-DE" sz="1600" b="0" dirty="0" smtClean="0">
+                <a:solidFill>
+                  <a:srgbClr val="666666"/>
+                </a:solidFill>
+                <a:latin typeface="Consolas" pitchFamily="49" charset="0"/>
+                <a:cs typeface="Consolas" pitchFamily="49" charset="0"/>
+              </a:rPr>
+              <a:t>    </a:t>
+            </a:r>
+            <a:r>
+              <a:rPr lang="de-DE" sz="1600" b="0" dirty="0" smtClean="0">
+                <a:solidFill>
+                  <a:srgbClr val="000000"/>
+                </a:solidFill>
+                <a:latin typeface="Consolas" pitchFamily="49" charset="0"/>
+                <a:cs typeface="Consolas" pitchFamily="49" charset="0"/>
+              </a:rPr>
+              <a:t>@</a:t>
+            </a:r>
+            <a:r>
+              <a:rPr lang="de-DE" sz="1600" b="0" dirty="0" err="1" smtClean="0">
+                <a:solidFill>
+                  <a:srgbClr val="000000"/>
+                </a:solidFill>
+                <a:latin typeface="Consolas" pitchFamily="49" charset="0"/>
+                <a:cs typeface="Consolas" pitchFamily="49" charset="0"/>
+              </a:rPr>
+              <a:t>FXBindable</a:t>
+            </a:r>
+            <a:r>
+              <a:rPr lang="de-DE" sz="1600" b="0" dirty="0" smtClean="0">
+                <a:solidFill>
+                  <a:srgbClr val="000000"/>
+                </a:solidFill>
+                <a:latin typeface="Consolas" pitchFamily="49" charset="0"/>
+                <a:cs typeface="Consolas" pitchFamily="49" charset="0"/>
+              </a:rPr>
+              <a:t> String </a:t>
+            </a:r>
+            <a:r>
+              <a:rPr lang="de-DE" sz="1600" b="0" dirty="0" err="1" smtClean="0">
+                <a:solidFill>
+                  <a:srgbClr val="000000"/>
+                </a:solidFill>
+                <a:latin typeface="Consolas" pitchFamily="49" charset="0"/>
+                <a:cs typeface="Consolas" pitchFamily="49" charset="0"/>
+              </a:rPr>
+              <a:t>lastName</a:t>
+            </a:r>
+            <a:r>
+              <a:rPr lang="de-DE" sz="1600" b="0" dirty="0" smtClean="0">
+                <a:solidFill>
+                  <a:srgbClr val="000000"/>
+                </a:solidFill>
+                <a:latin typeface="Consolas" pitchFamily="49" charset="0"/>
+                <a:cs typeface="Consolas" pitchFamily="49" charset="0"/>
+              </a:rPr>
+              <a:t> </a:t>
+            </a:r>
+            <a:r>
+              <a:rPr lang="de-DE" sz="1600" b="0" dirty="0" smtClean="0">
+                <a:solidFill>
+                  <a:srgbClr val="666666"/>
+                </a:solidFill>
+                <a:latin typeface="Consolas" pitchFamily="49" charset="0"/>
+                <a:cs typeface="Consolas" pitchFamily="49" charset="0"/>
+              </a:rPr>
+              <a:t>= </a:t>
+            </a:r>
+            <a:r>
+              <a:rPr lang="de-DE" sz="1600" b="0" dirty="0" smtClean="0">
+                <a:solidFill>
+                  <a:srgbClr val="AA2222"/>
+                </a:solidFill>
+                <a:latin typeface="Consolas" pitchFamily="49" charset="0"/>
+                <a:cs typeface="Consolas" pitchFamily="49" charset="0"/>
+              </a:rPr>
+              <a:t>'Mustermann'</a:t>
+            </a:r>
+            <a:r>
+              <a:rPr lang="de-DE" sz="1600" dirty="0" smtClean="0">
+                <a:latin typeface="Consolas" pitchFamily="49" charset="0"/>
+                <a:cs typeface="Consolas" pitchFamily="49" charset="0"/>
+              </a:rPr>
+              <a:t/>
+            </a:r>
+            <a:br>
+              <a:rPr lang="de-DE" sz="1600" dirty="0" smtClean="0">
+                <a:latin typeface="Consolas" pitchFamily="49" charset="0"/>
+                <a:cs typeface="Consolas" pitchFamily="49" charset="0"/>
+              </a:rPr>
+            </a:br>
+            <a:r>
+              <a:rPr lang="de-DE" sz="1600" b="0" dirty="0" smtClean="0">
+                <a:solidFill>
+                  <a:srgbClr val="666666"/>
+                </a:solidFill>
+                <a:latin typeface="Consolas" pitchFamily="49" charset="0"/>
+                <a:cs typeface="Consolas" pitchFamily="49" charset="0"/>
+              </a:rPr>
+              <a:t>}</a:t>
+            </a:r>
+            <a:r>
+              <a:rPr lang="de-DE" sz="1600" dirty="0" smtClean="0">
+                <a:latin typeface="Consolas" pitchFamily="49" charset="0"/>
+                <a:cs typeface="Consolas" pitchFamily="49" charset="0"/>
+              </a:rPr>
+              <a:t/>
+            </a:r>
+            <a:br>
+              <a:rPr lang="de-DE" sz="1600" dirty="0" smtClean="0">
+                <a:latin typeface="Consolas" pitchFamily="49" charset="0"/>
+                <a:cs typeface="Consolas" pitchFamily="49" charset="0"/>
+              </a:rPr>
+            </a:br>
+            <a:r>
+              <a:rPr lang="de-DE" sz="1600" b="0" dirty="0" err="1" smtClean="0">
+                <a:solidFill>
+                  <a:srgbClr val="770088"/>
+                </a:solidFill>
+                <a:latin typeface="Consolas" pitchFamily="49" charset="0"/>
+                <a:cs typeface="Consolas" pitchFamily="49" charset="0"/>
+              </a:rPr>
+              <a:t>def</a:t>
+            </a:r>
+            <a:r>
+              <a:rPr lang="de-DE" sz="1600" b="0" dirty="0" smtClean="0">
+                <a:solidFill>
+                  <a:srgbClr val="770088"/>
+                </a:solidFill>
+                <a:latin typeface="Consolas" pitchFamily="49" charset="0"/>
+                <a:cs typeface="Consolas" pitchFamily="49" charset="0"/>
+              </a:rPr>
+              <a:t> </a:t>
+            </a:r>
+            <a:r>
+              <a:rPr lang="de-DE" sz="1600" b="0" dirty="0" err="1" smtClean="0">
+                <a:solidFill>
+                  <a:srgbClr val="000000"/>
+                </a:solidFill>
+                <a:latin typeface="Consolas" pitchFamily="49" charset="0"/>
+                <a:cs typeface="Consolas" pitchFamily="49" charset="0"/>
+              </a:rPr>
+              <a:t>person</a:t>
+            </a:r>
+            <a:r>
+              <a:rPr lang="de-DE" sz="1600" b="0" dirty="0" smtClean="0">
+                <a:solidFill>
+                  <a:srgbClr val="000000"/>
+                </a:solidFill>
+                <a:latin typeface="Consolas" pitchFamily="49" charset="0"/>
+                <a:cs typeface="Consolas" pitchFamily="49" charset="0"/>
+              </a:rPr>
+              <a:t> </a:t>
+            </a:r>
+            <a:r>
+              <a:rPr lang="de-DE" sz="1600" b="0" dirty="0" smtClean="0">
+                <a:solidFill>
+                  <a:srgbClr val="666666"/>
+                </a:solidFill>
+                <a:latin typeface="Consolas" pitchFamily="49" charset="0"/>
+                <a:cs typeface="Consolas" pitchFamily="49" charset="0"/>
+              </a:rPr>
+              <a:t>= </a:t>
+            </a:r>
+            <a:r>
+              <a:rPr lang="de-DE" sz="1600" b="0" dirty="0" err="1" smtClean="0">
+                <a:solidFill>
+                  <a:srgbClr val="770088"/>
+                </a:solidFill>
+                <a:latin typeface="Consolas" pitchFamily="49" charset="0"/>
+                <a:cs typeface="Consolas" pitchFamily="49" charset="0"/>
+              </a:rPr>
+              <a:t>new</a:t>
+            </a:r>
+            <a:r>
+              <a:rPr lang="de-DE" sz="1600" b="0" dirty="0" smtClean="0">
+                <a:solidFill>
+                  <a:srgbClr val="770088"/>
+                </a:solidFill>
+                <a:latin typeface="Consolas" pitchFamily="49" charset="0"/>
+                <a:cs typeface="Consolas" pitchFamily="49" charset="0"/>
+              </a:rPr>
+              <a:t> </a:t>
+            </a:r>
+            <a:r>
+              <a:rPr lang="de-DE" sz="1600" b="0" dirty="0" smtClean="0">
+                <a:solidFill>
+                  <a:srgbClr val="000000"/>
+                </a:solidFill>
+                <a:latin typeface="Consolas" pitchFamily="49" charset="0"/>
+                <a:cs typeface="Consolas" pitchFamily="49" charset="0"/>
+              </a:rPr>
+              <a:t>Person</a:t>
+            </a:r>
+            <a:r>
+              <a:rPr lang="de-DE" sz="1600" b="0" dirty="0" smtClean="0">
+                <a:solidFill>
+                  <a:srgbClr val="666666"/>
+                </a:solidFill>
+                <a:latin typeface="Consolas" pitchFamily="49" charset="0"/>
+                <a:cs typeface="Consolas" pitchFamily="49" charset="0"/>
+              </a:rPr>
+              <a:t>(</a:t>
+            </a:r>
+            <a:r>
+              <a:rPr lang="de-DE" sz="1600" b="0" dirty="0" smtClean="0">
+                <a:solidFill>
+                  <a:srgbClr val="AA2222"/>
+                </a:solidFill>
+                <a:latin typeface="Consolas" pitchFamily="49" charset="0"/>
+                <a:cs typeface="Consolas" pitchFamily="49" charset="0"/>
+              </a:rPr>
+              <a:t>'Stefan'</a:t>
+            </a:r>
+            <a:r>
+              <a:rPr lang="de-DE" sz="1600" b="0" dirty="0" smtClean="0">
+                <a:solidFill>
+                  <a:srgbClr val="666666"/>
+                </a:solidFill>
+                <a:latin typeface="Consolas" pitchFamily="49" charset="0"/>
+                <a:cs typeface="Consolas" pitchFamily="49" charset="0"/>
+              </a:rPr>
+              <a:t>, </a:t>
+            </a:r>
+            <a:r>
+              <a:rPr lang="de-DE" sz="1600" b="0" dirty="0" smtClean="0">
+                <a:solidFill>
+                  <a:srgbClr val="AA2222"/>
+                </a:solidFill>
+                <a:latin typeface="Consolas" pitchFamily="49" charset="0"/>
+                <a:cs typeface="Consolas" pitchFamily="49" charset="0"/>
+              </a:rPr>
+              <a:t>'Glase'</a:t>
+            </a:r>
+            <a:r>
+              <a:rPr lang="de-DE" sz="1600" b="0" dirty="0" smtClean="0">
+                <a:solidFill>
+                  <a:srgbClr val="666666"/>
+                </a:solidFill>
+                <a:latin typeface="Consolas" pitchFamily="49" charset="0"/>
+                <a:cs typeface="Consolas" pitchFamily="49" charset="0"/>
+              </a:rPr>
+              <a:t>)</a:t>
+            </a:r>
+            <a:r>
+              <a:rPr lang="de-DE" sz="1600" dirty="0" smtClean="0">
+                <a:latin typeface="Consolas" pitchFamily="49" charset="0"/>
+                <a:cs typeface="Consolas" pitchFamily="49" charset="0"/>
+              </a:rPr>
+              <a:t/>
+            </a:r>
+            <a:br>
+              <a:rPr lang="de-DE" sz="1600" dirty="0" smtClean="0">
+                <a:latin typeface="Consolas" pitchFamily="49" charset="0"/>
+                <a:cs typeface="Consolas" pitchFamily="49" charset="0"/>
+              </a:rPr>
+            </a:br>
+            <a:endParaRPr lang="de-DE" sz="1600" dirty="0" smtClean="0">
+              <a:latin typeface="Consolas" pitchFamily="49" charset="0"/>
+              <a:cs typeface="Consolas" pitchFamily="49" charset="0"/>
+            </a:endParaRPr>
+          </a:p>
+          <a:p>
+            <a:pPr marL="0" indent="0">
+              <a:buNone/>
+            </a:pPr>
+            <a:r>
+              <a:rPr lang="de-DE" sz="1600" b="0" dirty="0" err="1" smtClean="0">
+                <a:solidFill>
+                  <a:srgbClr val="000000"/>
+                </a:solidFill>
+                <a:latin typeface="Consolas" pitchFamily="49" charset="0"/>
+                <a:cs typeface="Consolas" pitchFamily="49" charset="0"/>
+              </a:rPr>
+              <a:t>GroovyFX</a:t>
+            </a:r>
+            <a:r>
+              <a:rPr lang="de-DE" sz="1600" b="0" dirty="0" err="1" smtClean="0">
+                <a:solidFill>
+                  <a:srgbClr val="666666"/>
+                </a:solidFill>
+                <a:latin typeface="Consolas" pitchFamily="49" charset="0"/>
+                <a:cs typeface="Consolas" pitchFamily="49" charset="0"/>
+              </a:rPr>
+              <a:t>.</a:t>
+            </a:r>
+            <a:r>
+              <a:rPr lang="de-DE" sz="1600" b="0" dirty="0" err="1" smtClean="0">
+                <a:solidFill>
+                  <a:srgbClr val="000000"/>
+                </a:solidFill>
+                <a:latin typeface="Consolas" pitchFamily="49" charset="0"/>
+                <a:cs typeface="Consolas" pitchFamily="49" charset="0"/>
+              </a:rPr>
+              <a:t>start</a:t>
+            </a:r>
+            <a:r>
+              <a:rPr lang="de-DE" sz="1600" b="0" dirty="0" smtClean="0">
+                <a:solidFill>
+                  <a:srgbClr val="000000"/>
+                </a:solidFill>
+                <a:latin typeface="Consolas" pitchFamily="49" charset="0"/>
+                <a:cs typeface="Consolas" pitchFamily="49" charset="0"/>
+              </a:rPr>
+              <a:t> </a:t>
+            </a:r>
+            <a:r>
+              <a:rPr lang="de-DE" sz="1600" b="0" dirty="0" smtClean="0">
+                <a:solidFill>
+                  <a:srgbClr val="666666"/>
+                </a:solidFill>
+                <a:latin typeface="Consolas" pitchFamily="49" charset="0"/>
+                <a:cs typeface="Consolas" pitchFamily="49" charset="0"/>
+              </a:rPr>
+              <a:t>{</a:t>
+            </a:r>
+            <a:r>
+              <a:rPr lang="de-DE" sz="1600" dirty="0" smtClean="0">
+                <a:latin typeface="Consolas" pitchFamily="49" charset="0"/>
+                <a:cs typeface="Consolas" pitchFamily="49" charset="0"/>
+              </a:rPr>
+              <a:t/>
+            </a:r>
+            <a:br>
+              <a:rPr lang="de-DE" sz="1600" dirty="0" smtClean="0">
+                <a:latin typeface="Consolas" pitchFamily="49" charset="0"/>
+                <a:cs typeface="Consolas" pitchFamily="49" charset="0"/>
+              </a:rPr>
+            </a:br>
+            <a:r>
+              <a:rPr lang="de-DE" sz="1600" b="0" dirty="0" smtClean="0">
+                <a:solidFill>
+                  <a:srgbClr val="666666"/>
+                </a:solidFill>
+                <a:latin typeface="Consolas" pitchFamily="49" charset="0"/>
+                <a:cs typeface="Consolas" pitchFamily="49" charset="0"/>
+              </a:rPr>
+              <a:t>    </a:t>
+            </a:r>
+            <a:r>
+              <a:rPr lang="de-DE" sz="1600" b="0" dirty="0" err="1" smtClean="0">
+                <a:solidFill>
+                  <a:srgbClr val="770088"/>
+                </a:solidFill>
+                <a:latin typeface="Consolas" pitchFamily="49" charset="0"/>
+                <a:cs typeface="Consolas" pitchFamily="49" charset="0"/>
+              </a:rPr>
+              <a:t>new</a:t>
+            </a:r>
+            <a:r>
+              <a:rPr lang="de-DE" sz="1600" b="0" dirty="0" smtClean="0">
+                <a:solidFill>
+                  <a:srgbClr val="770088"/>
+                </a:solidFill>
+                <a:latin typeface="Consolas" pitchFamily="49" charset="0"/>
+                <a:cs typeface="Consolas" pitchFamily="49" charset="0"/>
+              </a:rPr>
+              <a:t> </a:t>
+            </a:r>
+            <a:r>
+              <a:rPr lang="de-DE" sz="1600" b="0" dirty="0" err="1" smtClean="0">
+                <a:solidFill>
+                  <a:srgbClr val="000000"/>
+                </a:solidFill>
+                <a:latin typeface="Consolas" pitchFamily="49" charset="0"/>
+                <a:cs typeface="Consolas" pitchFamily="49" charset="0"/>
+              </a:rPr>
+              <a:t>SceneGraphBuilder</a:t>
+            </a:r>
+            <a:r>
+              <a:rPr lang="de-DE" sz="1600" b="0" dirty="0" smtClean="0">
+                <a:solidFill>
+                  <a:srgbClr val="666666"/>
+                </a:solidFill>
+                <a:latin typeface="Consolas" pitchFamily="49" charset="0"/>
+                <a:cs typeface="Consolas" pitchFamily="49" charset="0"/>
+              </a:rPr>
+              <a:t>().</a:t>
+            </a:r>
+            <a:r>
+              <a:rPr lang="de-DE" sz="1600" b="0" dirty="0" err="1" smtClean="0">
+                <a:solidFill>
+                  <a:srgbClr val="000000"/>
+                </a:solidFill>
+                <a:latin typeface="Consolas" pitchFamily="49" charset="0"/>
+                <a:cs typeface="Consolas" pitchFamily="49" charset="0"/>
+              </a:rPr>
+              <a:t>stage</a:t>
+            </a:r>
+            <a:r>
+              <a:rPr lang="de-DE" sz="1600" b="0" dirty="0" smtClean="0">
+                <a:solidFill>
+                  <a:srgbClr val="666666"/>
+                </a:solidFill>
+                <a:latin typeface="Consolas" pitchFamily="49" charset="0"/>
+                <a:cs typeface="Consolas" pitchFamily="49" charset="0"/>
+              </a:rPr>
+              <a:t>(</a:t>
+            </a:r>
+            <a:r>
+              <a:rPr lang="de-DE" sz="1600" b="0" dirty="0" smtClean="0">
+                <a:solidFill>
+                  <a:srgbClr val="000000"/>
+                </a:solidFill>
+                <a:latin typeface="Consolas" pitchFamily="49" charset="0"/>
+                <a:cs typeface="Consolas" pitchFamily="49" charset="0"/>
+              </a:rPr>
+              <a:t>title</a:t>
+            </a:r>
+            <a:r>
+              <a:rPr lang="de-DE" sz="1600" b="0" dirty="0" smtClean="0">
+                <a:solidFill>
+                  <a:srgbClr val="666666"/>
+                </a:solidFill>
+                <a:latin typeface="Consolas" pitchFamily="49" charset="0"/>
+                <a:cs typeface="Consolas" pitchFamily="49" charset="0"/>
+              </a:rPr>
+              <a:t>: </a:t>
+            </a:r>
+            <a:r>
+              <a:rPr lang="de-DE" sz="1600" b="0" dirty="0" smtClean="0">
+                <a:solidFill>
+                  <a:srgbClr val="AA2222"/>
+                </a:solidFill>
+                <a:latin typeface="Consolas" pitchFamily="49" charset="0"/>
+                <a:cs typeface="Consolas" pitchFamily="49" charset="0"/>
+              </a:rPr>
+              <a:t>'Properties'</a:t>
+            </a:r>
+            <a:r>
+              <a:rPr lang="de-DE" sz="1600" b="0" dirty="0" smtClean="0">
+                <a:solidFill>
+                  <a:srgbClr val="666666"/>
+                </a:solidFill>
+                <a:latin typeface="Consolas" pitchFamily="49" charset="0"/>
+                <a:cs typeface="Consolas" pitchFamily="49" charset="0"/>
+              </a:rPr>
+              <a:t>,</a:t>
+            </a:r>
+            <a:r>
+              <a:rPr lang="de-DE" sz="1600" b="0" dirty="0" smtClean="0">
+                <a:solidFill>
+                  <a:srgbClr val="666666"/>
+                </a:solidFill>
+                <a:latin typeface="Consolas" pitchFamily="49" charset="0"/>
+                <a:cs typeface="Consolas" pitchFamily="49" charset="0"/>
+              </a:rPr>
+              <a:t> </a:t>
+            </a:r>
+            <a:r>
+              <a:rPr lang="de-DE" sz="1600" b="0" dirty="0" err="1" smtClean="0">
+                <a:solidFill>
+                  <a:srgbClr val="000000"/>
+                </a:solidFill>
+                <a:latin typeface="Consolas" pitchFamily="49" charset="0"/>
+                <a:cs typeface="Consolas" pitchFamily="49" charset="0"/>
+              </a:rPr>
+              <a:t>show</a:t>
+            </a:r>
+            <a:r>
+              <a:rPr lang="de-DE" sz="1600" b="0" dirty="0" smtClean="0">
+                <a:solidFill>
+                  <a:srgbClr val="666666"/>
+                </a:solidFill>
+                <a:latin typeface="Consolas" pitchFamily="49" charset="0"/>
+                <a:cs typeface="Consolas" pitchFamily="49" charset="0"/>
+              </a:rPr>
+              <a:t>: </a:t>
+            </a:r>
+            <a:r>
+              <a:rPr lang="de-DE" sz="1600" b="0" dirty="0" err="1" smtClean="0">
+                <a:solidFill>
+                  <a:srgbClr val="228811"/>
+                </a:solidFill>
+                <a:latin typeface="Consolas" pitchFamily="49" charset="0"/>
+                <a:cs typeface="Consolas" pitchFamily="49" charset="0"/>
+              </a:rPr>
+              <a:t>true</a:t>
+            </a:r>
+            <a:r>
+              <a:rPr lang="de-DE" sz="1600" b="0" dirty="0" smtClean="0">
+                <a:solidFill>
+                  <a:srgbClr val="666666"/>
+                </a:solidFill>
+                <a:latin typeface="Consolas" pitchFamily="49" charset="0"/>
+                <a:cs typeface="Consolas" pitchFamily="49" charset="0"/>
+              </a:rPr>
+              <a:t>) {</a:t>
+            </a:r>
+            <a:r>
+              <a:rPr lang="de-DE" sz="1600" dirty="0" smtClean="0">
+                <a:latin typeface="Consolas" pitchFamily="49" charset="0"/>
+                <a:cs typeface="Consolas" pitchFamily="49" charset="0"/>
+              </a:rPr>
+              <a:t/>
+            </a:r>
+            <a:br>
+              <a:rPr lang="de-DE" sz="1600" dirty="0" smtClean="0">
+                <a:latin typeface="Consolas" pitchFamily="49" charset="0"/>
+                <a:cs typeface="Consolas" pitchFamily="49" charset="0"/>
+              </a:rPr>
+            </a:br>
+            <a:r>
+              <a:rPr lang="de-DE" sz="1600" b="0" dirty="0" smtClean="0">
+                <a:solidFill>
+                  <a:srgbClr val="666666"/>
+                </a:solidFill>
+                <a:latin typeface="Consolas" pitchFamily="49" charset="0"/>
+                <a:cs typeface="Consolas" pitchFamily="49" charset="0"/>
+              </a:rPr>
+              <a:t>        </a:t>
+            </a:r>
+            <a:r>
+              <a:rPr lang="de-DE" sz="1600" b="0" dirty="0" err="1" smtClean="0">
+                <a:solidFill>
+                  <a:srgbClr val="000000"/>
+                </a:solidFill>
+                <a:latin typeface="Consolas" pitchFamily="49" charset="0"/>
+                <a:cs typeface="Consolas" pitchFamily="49" charset="0"/>
+              </a:rPr>
+              <a:t>scene</a:t>
+            </a:r>
+            <a:r>
+              <a:rPr lang="de-DE" sz="1600" b="0" dirty="0" smtClean="0">
+                <a:solidFill>
+                  <a:srgbClr val="666666"/>
+                </a:solidFill>
+                <a:latin typeface="Consolas" pitchFamily="49" charset="0"/>
+                <a:cs typeface="Consolas" pitchFamily="49" charset="0"/>
+              </a:rPr>
+              <a:t>(</a:t>
+            </a:r>
+            <a:r>
+              <a:rPr lang="de-DE" sz="1600" b="0" dirty="0" err="1" smtClean="0">
+                <a:solidFill>
+                  <a:srgbClr val="000000"/>
+                </a:solidFill>
+                <a:latin typeface="Consolas" pitchFamily="49" charset="0"/>
+                <a:cs typeface="Consolas" pitchFamily="49" charset="0"/>
+              </a:rPr>
+              <a:t>width</a:t>
+            </a:r>
+            <a:r>
+              <a:rPr lang="de-DE" sz="1600" b="0" dirty="0" smtClean="0">
+                <a:solidFill>
+                  <a:srgbClr val="666666"/>
+                </a:solidFill>
+                <a:latin typeface="Consolas" pitchFamily="49" charset="0"/>
+                <a:cs typeface="Consolas" pitchFamily="49" charset="0"/>
+              </a:rPr>
+              <a:t>: </a:t>
+            </a:r>
+            <a:r>
+              <a:rPr lang="de-DE" sz="1600" b="0" dirty="0" smtClean="0">
+                <a:solidFill>
+                  <a:srgbClr val="228811"/>
+                </a:solidFill>
+                <a:latin typeface="Consolas" pitchFamily="49" charset="0"/>
+                <a:cs typeface="Consolas" pitchFamily="49" charset="0"/>
+              </a:rPr>
+              <a:t>300</a:t>
+            </a:r>
+            <a:r>
+              <a:rPr lang="de-DE" sz="1600" b="0" dirty="0" smtClean="0">
+                <a:solidFill>
+                  <a:srgbClr val="666666"/>
+                </a:solidFill>
+                <a:latin typeface="Consolas" pitchFamily="49" charset="0"/>
+                <a:cs typeface="Consolas" pitchFamily="49" charset="0"/>
+              </a:rPr>
+              <a:t>) {</a:t>
+            </a:r>
+            <a:r>
+              <a:rPr lang="de-DE" sz="1600" dirty="0" smtClean="0">
+                <a:latin typeface="Consolas" pitchFamily="49" charset="0"/>
+                <a:cs typeface="Consolas" pitchFamily="49" charset="0"/>
+              </a:rPr>
+              <a:t/>
+            </a:r>
+            <a:br>
+              <a:rPr lang="de-DE" sz="1600" dirty="0" smtClean="0">
+                <a:latin typeface="Consolas" pitchFamily="49" charset="0"/>
+                <a:cs typeface="Consolas" pitchFamily="49" charset="0"/>
+              </a:rPr>
+            </a:br>
+            <a:r>
+              <a:rPr lang="de-DE" sz="1600" b="0" dirty="0" smtClean="0">
+                <a:solidFill>
+                  <a:srgbClr val="666666"/>
+                </a:solidFill>
+                <a:latin typeface="Consolas" pitchFamily="49" charset="0"/>
+                <a:cs typeface="Consolas" pitchFamily="49" charset="0"/>
+              </a:rPr>
+              <a:t>            </a:t>
+            </a:r>
+            <a:r>
+              <a:rPr lang="de-DE" sz="1600" b="0" dirty="0" err="1" smtClean="0">
+                <a:solidFill>
+                  <a:srgbClr val="000000"/>
+                </a:solidFill>
+                <a:latin typeface="Consolas" pitchFamily="49" charset="0"/>
+                <a:cs typeface="Consolas" pitchFamily="49" charset="0"/>
+              </a:rPr>
+              <a:t>vbox</a:t>
+            </a:r>
+            <a:r>
+              <a:rPr lang="de-DE" sz="1600" b="0" dirty="0" smtClean="0">
+                <a:solidFill>
+                  <a:srgbClr val="000000"/>
+                </a:solidFill>
+                <a:latin typeface="Consolas" pitchFamily="49" charset="0"/>
+                <a:cs typeface="Consolas" pitchFamily="49" charset="0"/>
+              </a:rPr>
+              <a:t> </a:t>
+            </a:r>
+            <a:r>
+              <a:rPr lang="de-DE" sz="1600" b="0" dirty="0" smtClean="0">
+                <a:solidFill>
+                  <a:srgbClr val="666666"/>
+                </a:solidFill>
+                <a:latin typeface="Consolas" pitchFamily="49" charset="0"/>
+                <a:cs typeface="Consolas" pitchFamily="49" charset="0"/>
+              </a:rPr>
+              <a:t>{</a:t>
+            </a:r>
+            <a:r>
+              <a:rPr lang="de-DE" sz="1600" dirty="0" smtClean="0">
+                <a:latin typeface="Consolas" pitchFamily="49" charset="0"/>
+                <a:cs typeface="Consolas" pitchFamily="49" charset="0"/>
+              </a:rPr>
+              <a:t/>
+            </a:r>
+            <a:br>
+              <a:rPr lang="de-DE" sz="1600" dirty="0" smtClean="0">
+                <a:latin typeface="Consolas" pitchFamily="49" charset="0"/>
+                <a:cs typeface="Consolas" pitchFamily="49" charset="0"/>
+              </a:rPr>
+            </a:br>
+            <a:r>
+              <a:rPr lang="de-DE" sz="1600" b="0" dirty="0" smtClean="0">
+                <a:solidFill>
+                  <a:srgbClr val="666666"/>
+                </a:solidFill>
+                <a:latin typeface="Consolas" pitchFamily="49" charset="0"/>
+                <a:cs typeface="Consolas" pitchFamily="49" charset="0"/>
+              </a:rPr>
+              <a:t>                </a:t>
+            </a:r>
+            <a:r>
+              <a:rPr lang="de-DE" sz="1600" b="0" dirty="0" err="1" smtClean="0">
+                <a:solidFill>
+                  <a:srgbClr val="000000"/>
+                </a:solidFill>
+                <a:latin typeface="Consolas" pitchFamily="49" charset="0"/>
+                <a:cs typeface="Consolas" pitchFamily="49" charset="0"/>
+              </a:rPr>
+              <a:t>textField</a:t>
+            </a:r>
+            <a:r>
+              <a:rPr lang="de-DE" sz="1600" b="0" dirty="0" smtClean="0">
+                <a:solidFill>
+                  <a:srgbClr val="666666"/>
+                </a:solidFill>
+                <a:latin typeface="Consolas" pitchFamily="49" charset="0"/>
+                <a:cs typeface="Consolas" pitchFamily="49" charset="0"/>
+              </a:rPr>
+              <a:t>(</a:t>
+            </a:r>
+            <a:r>
+              <a:rPr lang="de-DE" sz="1600" b="0" dirty="0" err="1" smtClean="0">
+                <a:solidFill>
+                  <a:srgbClr val="000000"/>
+                </a:solidFill>
+                <a:latin typeface="Consolas" pitchFamily="49" charset="0"/>
+                <a:cs typeface="Consolas" pitchFamily="49" charset="0"/>
+              </a:rPr>
+              <a:t>text</a:t>
+            </a:r>
+            <a:r>
+              <a:rPr lang="de-DE" sz="1600" b="0" dirty="0" smtClean="0">
+                <a:solidFill>
+                  <a:srgbClr val="666666"/>
+                </a:solidFill>
+                <a:latin typeface="Consolas" pitchFamily="49" charset="0"/>
+                <a:cs typeface="Consolas" pitchFamily="49" charset="0"/>
+              </a:rPr>
+              <a:t>: </a:t>
+            </a:r>
+            <a:r>
+              <a:rPr lang="de-DE" sz="1600" b="0" dirty="0" smtClean="0">
+                <a:solidFill>
+                  <a:srgbClr val="000000"/>
+                </a:solidFill>
+                <a:latin typeface="Consolas" pitchFamily="49" charset="0"/>
+                <a:cs typeface="Consolas" pitchFamily="49" charset="0"/>
+              </a:rPr>
+              <a:t>bind</a:t>
+            </a:r>
+            <a:r>
+              <a:rPr lang="de-DE" sz="1600" b="0" dirty="0" smtClean="0">
+                <a:solidFill>
+                  <a:srgbClr val="666666"/>
+                </a:solidFill>
+                <a:latin typeface="Consolas" pitchFamily="49" charset="0"/>
+                <a:cs typeface="Consolas" pitchFamily="49" charset="0"/>
+              </a:rPr>
+              <a:t>(</a:t>
+            </a:r>
+            <a:r>
+              <a:rPr lang="de-DE" sz="1600" b="0" dirty="0" err="1" smtClean="0">
+                <a:solidFill>
+                  <a:srgbClr val="000000"/>
+                </a:solidFill>
+                <a:latin typeface="Consolas" pitchFamily="49" charset="0"/>
+                <a:cs typeface="Consolas" pitchFamily="49" charset="0"/>
+              </a:rPr>
+              <a:t>person</a:t>
+            </a:r>
+            <a:r>
+              <a:rPr lang="de-DE" sz="1600" b="0" dirty="0" err="1" smtClean="0">
+                <a:solidFill>
+                  <a:srgbClr val="666666"/>
+                </a:solidFill>
+                <a:latin typeface="Consolas" pitchFamily="49" charset="0"/>
+                <a:cs typeface="Consolas" pitchFamily="49" charset="0"/>
+              </a:rPr>
+              <a:t>.</a:t>
+            </a:r>
+            <a:r>
+              <a:rPr lang="de-DE" sz="1600" b="0" dirty="0" err="1" smtClean="0">
+                <a:solidFill>
+                  <a:srgbClr val="000000"/>
+                </a:solidFill>
+                <a:latin typeface="Consolas" pitchFamily="49" charset="0"/>
+                <a:cs typeface="Consolas" pitchFamily="49" charset="0"/>
+              </a:rPr>
+              <a:t>firstNameProperty</a:t>
+            </a:r>
+            <a:r>
+              <a:rPr lang="de-DE" sz="1600" b="0" dirty="0" smtClean="0">
+                <a:solidFill>
+                  <a:srgbClr val="666666"/>
+                </a:solidFill>
+                <a:latin typeface="Consolas" pitchFamily="49" charset="0"/>
+                <a:cs typeface="Consolas" pitchFamily="49" charset="0"/>
+              </a:rPr>
+              <a:t>()))</a:t>
+            </a:r>
+            <a:r>
+              <a:rPr lang="de-DE" sz="1600" dirty="0" smtClean="0">
+                <a:latin typeface="Consolas" pitchFamily="49" charset="0"/>
+                <a:cs typeface="Consolas" pitchFamily="49" charset="0"/>
+              </a:rPr>
+              <a:t/>
+            </a:r>
+            <a:br>
+              <a:rPr lang="de-DE" sz="1600" dirty="0" smtClean="0">
+                <a:latin typeface="Consolas" pitchFamily="49" charset="0"/>
+                <a:cs typeface="Consolas" pitchFamily="49" charset="0"/>
+              </a:rPr>
+            </a:br>
+            <a:r>
+              <a:rPr lang="de-DE" sz="1600" b="0" dirty="0" smtClean="0">
+                <a:solidFill>
+                  <a:srgbClr val="666666"/>
+                </a:solidFill>
+                <a:latin typeface="Consolas" pitchFamily="49" charset="0"/>
+                <a:cs typeface="Consolas" pitchFamily="49" charset="0"/>
+              </a:rPr>
+              <a:t>                </a:t>
+            </a:r>
+            <a:r>
+              <a:rPr lang="de-DE" sz="1600" b="0" dirty="0" err="1" smtClean="0">
+                <a:solidFill>
+                  <a:srgbClr val="000000"/>
+                </a:solidFill>
+                <a:latin typeface="Consolas" pitchFamily="49" charset="0"/>
+                <a:cs typeface="Consolas" pitchFamily="49" charset="0"/>
+              </a:rPr>
+              <a:t>textField</a:t>
+            </a:r>
+            <a:r>
+              <a:rPr lang="de-DE" sz="1600" b="0" dirty="0" smtClean="0">
+                <a:solidFill>
+                  <a:srgbClr val="666666"/>
+                </a:solidFill>
+                <a:latin typeface="Consolas" pitchFamily="49" charset="0"/>
+                <a:cs typeface="Consolas" pitchFamily="49" charset="0"/>
+              </a:rPr>
+              <a:t>(</a:t>
+            </a:r>
+            <a:r>
+              <a:rPr lang="de-DE" sz="1600" b="0" dirty="0" err="1" smtClean="0">
+                <a:solidFill>
+                  <a:srgbClr val="000000"/>
+                </a:solidFill>
+                <a:latin typeface="Consolas" pitchFamily="49" charset="0"/>
+                <a:cs typeface="Consolas" pitchFamily="49" charset="0"/>
+              </a:rPr>
+              <a:t>text</a:t>
+            </a:r>
+            <a:r>
+              <a:rPr lang="de-DE" sz="1600" b="0" dirty="0" smtClean="0">
+                <a:solidFill>
+                  <a:srgbClr val="666666"/>
+                </a:solidFill>
+                <a:latin typeface="Consolas" pitchFamily="49" charset="0"/>
+                <a:cs typeface="Consolas" pitchFamily="49" charset="0"/>
+              </a:rPr>
+              <a:t>: </a:t>
+            </a:r>
+            <a:r>
+              <a:rPr lang="de-DE" sz="1600" b="0" dirty="0" smtClean="0">
+                <a:solidFill>
+                  <a:srgbClr val="000000"/>
+                </a:solidFill>
+                <a:latin typeface="Consolas" pitchFamily="49" charset="0"/>
+                <a:cs typeface="Consolas" pitchFamily="49" charset="0"/>
+              </a:rPr>
+              <a:t>bind</a:t>
+            </a:r>
+            <a:r>
+              <a:rPr lang="de-DE" sz="1600" b="0" dirty="0" smtClean="0">
+                <a:solidFill>
+                  <a:srgbClr val="666666"/>
+                </a:solidFill>
+                <a:latin typeface="Consolas" pitchFamily="49" charset="0"/>
+                <a:cs typeface="Consolas" pitchFamily="49" charset="0"/>
+              </a:rPr>
+              <a:t>(</a:t>
+            </a:r>
+            <a:r>
+              <a:rPr lang="de-DE" sz="1600" b="0" dirty="0" err="1" smtClean="0">
+                <a:solidFill>
+                  <a:srgbClr val="000000"/>
+                </a:solidFill>
+                <a:latin typeface="Consolas" pitchFamily="49" charset="0"/>
+                <a:cs typeface="Consolas" pitchFamily="49" charset="0"/>
+              </a:rPr>
+              <a:t>person</a:t>
+            </a:r>
+            <a:r>
+              <a:rPr lang="de-DE" sz="1600" b="0" dirty="0" err="1" smtClean="0">
+                <a:solidFill>
+                  <a:srgbClr val="666666"/>
+                </a:solidFill>
+                <a:latin typeface="Consolas" pitchFamily="49" charset="0"/>
+                <a:cs typeface="Consolas" pitchFamily="49" charset="0"/>
+              </a:rPr>
+              <a:t>.</a:t>
+            </a:r>
+            <a:r>
+              <a:rPr lang="de-DE" sz="1600" b="0" dirty="0" err="1" smtClean="0">
+                <a:solidFill>
+                  <a:srgbClr val="000000"/>
+                </a:solidFill>
+                <a:latin typeface="Consolas" pitchFamily="49" charset="0"/>
+                <a:cs typeface="Consolas" pitchFamily="49" charset="0"/>
+              </a:rPr>
+              <a:t>lastNameProperty</a:t>
+            </a:r>
+            <a:r>
+              <a:rPr lang="de-DE" sz="1600" b="0" dirty="0" smtClean="0">
+                <a:solidFill>
+                  <a:srgbClr val="666666"/>
+                </a:solidFill>
+                <a:latin typeface="Consolas" pitchFamily="49" charset="0"/>
+                <a:cs typeface="Consolas" pitchFamily="49" charset="0"/>
+              </a:rPr>
+              <a:t>()))</a:t>
+            </a:r>
+            <a:r>
+              <a:rPr lang="de-DE" sz="1600" dirty="0" smtClean="0">
+                <a:latin typeface="Consolas" pitchFamily="49" charset="0"/>
+                <a:cs typeface="Consolas" pitchFamily="49" charset="0"/>
+              </a:rPr>
+              <a:t/>
+            </a:r>
+            <a:br>
+              <a:rPr lang="de-DE" sz="1600" dirty="0" smtClean="0">
+                <a:latin typeface="Consolas" pitchFamily="49" charset="0"/>
+                <a:cs typeface="Consolas" pitchFamily="49" charset="0"/>
+              </a:rPr>
+            </a:br>
+            <a:r>
+              <a:rPr lang="de-DE" sz="1600" b="0" dirty="0" smtClean="0">
+                <a:solidFill>
+                  <a:srgbClr val="666666"/>
+                </a:solidFill>
+                <a:latin typeface="Consolas" pitchFamily="49" charset="0"/>
+                <a:cs typeface="Consolas" pitchFamily="49" charset="0"/>
+              </a:rPr>
+              <a:t>            }</a:t>
+            </a:r>
+            <a:r>
+              <a:rPr lang="de-DE" sz="1600" dirty="0" smtClean="0">
+                <a:latin typeface="Consolas" pitchFamily="49" charset="0"/>
+                <a:cs typeface="Consolas" pitchFamily="49" charset="0"/>
+              </a:rPr>
+              <a:t/>
+            </a:r>
+            <a:br>
+              <a:rPr lang="de-DE" sz="1600" dirty="0" smtClean="0">
+                <a:latin typeface="Consolas" pitchFamily="49" charset="0"/>
+                <a:cs typeface="Consolas" pitchFamily="49" charset="0"/>
+              </a:rPr>
+            </a:br>
+            <a:r>
+              <a:rPr lang="de-DE" sz="1600" b="0" dirty="0" smtClean="0">
+                <a:solidFill>
+                  <a:srgbClr val="666666"/>
+                </a:solidFill>
+                <a:latin typeface="Consolas" pitchFamily="49" charset="0"/>
+                <a:cs typeface="Consolas" pitchFamily="49" charset="0"/>
+              </a:rPr>
+              <a:t>        }</a:t>
+            </a:r>
+            <a:r>
+              <a:rPr lang="de-DE" sz="1600" dirty="0" smtClean="0">
+                <a:latin typeface="Consolas" pitchFamily="49" charset="0"/>
+                <a:cs typeface="Consolas" pitchFamily="49" charset="0"/>
+              </a:rPr>
+              <a:t/>
+            </a:r>
+            <a:br>
+              <a:rPr lang="de-DE" sz="1600" dirty="0" smtClean="0">
+                <a:latin typeface="Consolas" pitchFamily="49" charset="0"/>
+                <a:cs typeface="Consolas" pitchFamily="49" charset="0"/>
+              </a:rPr>
+            </a:br>
+            <a:r>
+              <a:rPr lang="de-DE" sz="1600" b="0" dirty="0" smtClean="0">
+                <a:solidFill>
+                  <a:srgbClr val="666666"/>
+                </a:solidFill>
+                <a:latin typeface="Consolas" pitchFamily="49" charset="0"/>
+                <a:cs typeface="Consolas" pitchFamily="49" charset="0"/>
+              </a:rPr>
+              <a:t>    }</a:t>
+            </a:r>
+            <a:r>
+              <a:rPr lang="de-DE" sz="1600" dirty="0" smtClean="0">
+                <a:latin typeface="Consolas" pitchFamily="49" charset="0"/>
+                <a:cs typeface="Consolas" pitchFamily="49" charset="0"/>
+              </a:rPr>
+              <a:t/>
+            </a:r>
+            <a:br>
+              <a:rPr lang="de-DE" sz="1600" dirty="0" smtClean="0">
+                <a:latin typeface="Consolas" pitchFamily="49" charset="0"/>
+                <a:cs typeface="Consolas" pitchFamily="49" charset="0"/>
+              </a:rPr>
+            </a:br>
+            <a:r>
+              <a:rPr lang="de-DE" sz="1600" b="0" dirty="0" smtClean="0">
+                <a:solidFill>
+                  <a:srgbClr val="666666"/>
+                </a:solidFill>
+                <a:latin typeface="Consolas" pitchFamily="49" charset="0"/>
+                <a:cs typeface="Consolas" pitchFamily="49" charset="0"/>
+              </a:rPr>
+              <a:t>}</a:t>
+            </a:r>
+            <a:r>
+              <a:rPr lang="de-DE" sz="1600" dirty="0" smtClean="0">
+                <a:latin typeface="Consolas" pitchFamily="49" charset="0"/>
+                <a:cs typeface="Consolas" pitchFamily="49" charset="0"/>
+              </a:rPr>
+              <a:t/>
+            </a:r>
+            <a:br>
+              <a:rPr lang="de-DE" sz="1600" dirty="0" smtClean="0">
+                <a:latin typeface="Consolas" pitchFamily="49" charset="0"/>
+                <a:cs typeface="Consolas" pitchFamily="49" charset="0"/>
+              </a:rPr>
+            </a:br>
+            <a:r>
+              <a:rPr lang="de-DE" sz="1600" dirty="0" smtClean="0">
+                <a:latin typeface="Consolas" pitchFamily="49" charset="0"/>
+                <a:cs typeface="Consolas" pitchFamily="49" charset="0"/>
+              </a:rPr>
+              <a:t/>
+            </a:r>
+            <a:br>
+              <a:rPr lang="de-DE" sz="1600" dirty="0" smtClean="0">
+                <a:latin typeface="Consolas" pitchFamily="49" charset="0"/>
+                <a:cs typeface="Consolas" pitchFamily="49" charset="0"/>
+              </a:rPr>
+            </a:br>
+            <a:r>
+              <a:rPr lang="de-DE" sz="1600" b="0" dirty="0" smtClean="0">
+                <a:solidFill>
+                  <a:srgbClr val="000000"/>
+                </a:solidFill>
+                <a:latin typeface="Consolas" pitchFamily="49" charset="0"/>
+                <a:cs typeface="Consolas" pitchFamily="49" charset="0"/>
+              </a:rPr>
+              <a:t>​</a:t>
+            </a:r>
+            <a:endParaRPr lang="de-DE" sz="1600" dirty="0">
+              <a:latin typeface="Consolas" pitchFamily="49" charset="0"/>
+              <a:cs typeface="Consolas" pitchFamily="49" charset="0"/>
+            </a:endParaRPr>
+          </a:p>
+        </p:txBody>
+      </p:sp>
+      <p:sp>
+        <p:nvSpPr>
+          <p:cNvPr id="4" name="Textfeld 3"/>
+          <p:cNvSpPr txBox="1"/>
+          <p:nvPr/>
+        </p:nvSpPr>
+        <p:spPr>
+          <a:xfrm>
+            <a:off x="2843808" y="6381328"/>
+            <a:ext cx="6156358" cy="369332"/>
+          </a:xfrm>
+          <a:prstGeom prst="rect">
+            <a:avLst/>
+          </a:prstGeom>
+          <a:noFill/>
+        </p:spPr>
+        <p:txBody>
+          <a:bodyPr wrap="square" rtlCol="0">
+            <a:spAutoFit/>
+          </a:bodyPr>
+          <a:lstStyle/>
+          <a:p>
+            <a:pPr algn="r"/>
+            <a:r>
+              <a:rPr lang="de-DE" dirty="0" smtClean="0">
+                <a:solidFill>
+                  <a:schemeClr val="tx1">
+                    <a:lumMod val="50000"/>
+                    <a:lumOff val="50000"/>
+                  </a:schemeClr>
+                </a:solidFill>
+              </a:rPr>
+              <a:t>Zum Ausprobieren: </a:t>
+            </a:r>
+            <a:r>
+              <a:rPr lang="de-DE" dirty="0" err="1" smtClean="0">
+                <a:solidFill>
+                  <a:schemeClr val="tx1">
+                    <a:lumMod val="50000"/>
+                    <a:lumOff val="50000"/>
+                  </a:schemeClr>
+                </a:solidFill>
+              </a:rPr>
+              <a:t>gradle</a:t>
+            </a:r>
+            <a:r>
+              <a:rPr lang="de-DE" dirty="0" smtClean="0">
+                <a:solidFill>
+                  <a:schemeClr val="tx1">
+                    <a:lumMod val="50000"/>
+                    <a:lumOff val="50000"/>
+                  </a:schemeClr>
+                </a:solidFill>
+              </a:rPr>
+              <a:t> </a:t>
+            </a:r>
+            <a:r>
+              <a:rPr lang="de-DE" dirty="0" err="1" smtClean="0">
+                <a:solidFill>
+                  <a:schemeClr val="tx1">
+                    <a:lumMod val="50000"/>
+                    <a:lumOff val="50000"/>
+                  </a:schemeClr>
+                </a:solidFill>
+              </a:rPr>
+              <a:t>PropertyBindingSample</a:t>
+            </a:r>
+            <a:endParaRPr lang="de-DE" dirty="0">
+              <a:solidFill>
+                <a:schemeClr val="tx1">
+                  <a:lumMod val="50000"/>
+                  <a:lumOff val="50000"/>
+                </a:schemeClr>
+              </a:solidFill>
+            </a:endParaRPr>
+          </a:p>
+        </p:txBody>
+      </p:sp>
+    </p:spTree>
+  </p:cSld>
+  <p:clrMapOvr>
+    <a:masterClrMapping/>
+  </p:clrMapOvr>
+  <p:timing>
+    <p:tnLst>
+      <p:par>
+        <p:cTn id="1" dur="indefinite" restart="never" nodeType="tmRoot"/>
+      </p:par>
+    </p:tnLst>
+  </p:timing>
+</p:sld>
+</file>
+
+<file path=ppt/slides/slide22.xml><?xml version="1.0" encoding="utf-8"?>
+<p:sld xmlns:a="http://schemas.openxmlformats.org/drawingml/2006/main" xmlns:r="http://schemas.openxmlformats.org/officeDocument/2006/relationships" xmlns:p="http://schemas.openxmlformats.org/presentationml/2006/main">
+  <p:cSld>
+    <p:spTree>
+      <p:nvGrpSpPr>
+        <p:cNvPr id="1" name=""/>
+        <p:cNvGrpSpPr/>
+        <p:nvPr/>
+      </p:nvGrpSpPr>
+      <p:grpSpPr>
+        <a:xfrm>
+          <a:off x="0" y="0"/>
+          <a:ext cx="0" cy="0"/>
+          <a:chOff x="0" y="0"/>
+          <a:chExt cx="0" cy="0"/>
+        </a:xfrm>
+      </p:grpSpPr>
+      <p:sp>
+        <p:nvSpPr>
+          <p:cNvPr id="2" name="Titel 1"/>
+          <p:cNvSpPr>
+            <a:spLocks noGrp="1"/>
+          </p:cNvSpPr>
+          <p:nvPr>
+            <p:ph type="title"/>
+          </p:nvPr>
+        </p:nvSpPr>
+        <p:spPr/>
+        <p:txBody>
+          <a:bodyPr/>
+          <a:lstStyle/>
+          <a:p>
+            <a:r>
+              <a:rPr lang="de-DE" dirty="0" smtClean="0"/>
+              <a:t>Properties Beispiel</a:t>
+            </a:r>
+            <a:endParaRPr lang="de-DE" dirty="0"/>
+          </a:p>
+        </p:txBody>
+      </p:sp>
+      <p:pic>
+        <p:nvPicPr>
+          <p:cNvPr id="70658" name="Picture 2"/>
+          <p:cNvPicPr>
+            <a:picLocks noChangeAspect="1" noChangeArrowheads="1"/>
+          </p:cNvPicPr>
+          <p:nvPr/>
+        </p:nvPicPr>
+        <p:blipFill>
+          <a:blip r:embed="rId2" cstate="print"/>
+          <a:srcRect/>
+          <a:stretch>
+            <a:fillRect/>
+          </a:stretch>
+        </p:blipFill>
+        <p:spPr bwMode="auto">
+          <a:xfrm>
+            <a:off x="3067050" y="3038475"/>
+            <a:ext cx="3009900" cy="781050"/>
+          </a:xfrm>
+          <a:prstGeom prst="rect">
+            <a:avLst/>
+          </a:prstGeom>
+          <a:noFill/>
+          <a:ln w="9525">
+            <a:noFill/>
+            <a:miter lim="800000"/>
+            <a:headEnd/>
+            <a:tailEnd/>
+          </a:ln>
+        </p:spPr>
+      </p:pic>
+    </p:spTree>
+  </p:cSld>
+  <p:clrMapOvr>
+    <a:masterClrMapping/>
+  </p:clrMapOvr>
+  <p:timing>
+    <p:tnLst>
+      <p:par>
+        <p:cTn id="1" dur="indefinite" restart="never" nodeType="tmRoot"/>
+      </p:par>
+    </p:tnLst>
+  </p:timing>
+</p:sld>
+</file>
+
+<file path=ppt/slides/slide23.xml><?xml version="1.0" encoding="utf-8"?>
+<p:sld xmlns:a="http://schemas.openxmlformats.org/drawingml/2006/main" xmlns:r="http://schemas.openxmlformats.org/officeDocument/2006/relationships" xmlns:p="http://schemas.openxmlformats.org/presentationml/2006/main">
+  <p:cSld>
+    <p:spTree>
+      <p:nvGrpSpPr>
+        <p:cNvPr id="1" name=""/>
+        <p:cNvGrpSpPr/>
+        <p:nvPr/>
+      </p:nvGrpSpPr>
+      <p:grpSpPr>
+        <a:xfrm>
+          <a:off x="0" y="0"/>
+          <a:ext cx="0" cy="0"/>
+          <a:chOff x="0" y="0"/>
+          <a:chExt cx="0" cy="0"/>
+        </a:xfrm>
+      </p:grpSpPr>
+      <p:sp>
+        <p:nvSpPr>
+          <p:cNvPr id="2" name="Titel 1"/>
+          <p:cNvSpPr>
+            <a:spLocks noGrp="1"/>
+          </p:cNvSpPr>
+          <p:nvPr>
+            <p:ph type="title"/>
+          </p:nvPr>
+        </p:nvSpPr>
+        <p:spPr/>
+        <p:txBody>
+          <a:bodyPr/>
+          <a:lstStyle/>
+          <a:p>
+            <a:r>
+              <a:rPr lang="en-US" dirty="0" err="1" smtClean="0"/>
+              <a:t>Fazit</a:t>
+            </a:r>
+            <a:endParaRPr lang="de-DE" dirty="0"/>
+          </a:p>
+        </p:txBody>
+      </p:sp>
+      <p:pic>
+        <p:nvPicPr>
+          <p:cNvPr id="6" name="Inhaltsplatzhalter 5" descr="puzzle01.jpg"/>
+          <p:cNvPicPr>
+            <a:picLocks noGrp="1" noChangeAspect="1"/>
+          </p:cNvPicPr>
+          <p:nvPr>
+            <p:ph idx="1"/>
+          </p:nvPr>
+        </p:nvPicPr>
+        <p:blipFill>
+          <a:blip r:embed="rId3" cstate="print">
+            <a:clrChange>
+              <a:clrFrom>
+                <a:srgbClr val="FFFFFF"/>
+              </a:clrFrom>
+              <a:clrTo>
+                <a:srgbClr val="FFFFFF">
+                  <a:alpha val="0"/>
+                </a:srgbClr>
+              </a:clrTo>
+            </a:clrChange>
+          </a:blip>
+          <a:stretch>
+            <a:fillRect/>
+          </a:stretch>
+        </p:blipFill>
+        <p:spPr>
+          <a:xfrm>
+            <a:off x="1619672" y="2492896"/>
+            <a:ext cx="5904656" cy="3554344"/>
+          </a:xfrm>
+        </p:spPr>
+      </p:pic>
+      <p:sp>
+        <p:nvSpPr>
+          <p:cNvPr id="4" name="Textfeld 3"/>
+          <p:cNvSpPr txBox="1"/>
+          <p:nvPr/>
+        </p:nvSpPr>
+        <p:spPr>
+          <a:xfrm>
+            <a:off x="791580" y="1693257"/>
+            <a:ext cx="7560840" cy="1200329"/>
+          </a:xfrm>
+          <a:prstGeom prst="rect">
+            <a:avLst/>
+          </a:prstGeom>
+          <a:noFill/>
+        </p:spPr>
+        <p:txBody>
+          <a:bodyPr wrap="square" rtlCol="0">
+            <a:spAutoFit/>
+          </a:bodyPr>
+          <a:lstStyle/>
+          <a:p>
+            <a:r>
+              <a:rPr lang="en-US" sz="2400" i="1" dirty="0" smtClean="0"/>
+              <a:t>“Our </a:t>
+            </a:r>
+            <a:r>
+              <a:rPr lang="en-US" sz="2400" i="1" dirty="0" smtClean="0"/>
+              <a:t>goal with </a:t>
+            </a:r>
+            <a:r>
+              <a:rPr lang="en-US" sz="2400" i="1" dirty="0" err="1" smtClean="0"/>
+              <a:t>GroovyFX</a:t>
+            </a:r>
+            <a:r>
+              <a:rPr lang="en-US" sz="2400" i="1" dirty="0" smtClean="0"/>
+              <a:t> is to make it fun and easy to write client Java applications. </a:t>
+            </a:r>
+            <a:r>
+              <a:rPr lang="en-US" sz="2400" i="1" dirty="0" smtClean="0"/>
+              <a:t>So </a:t>
+            </a:r>
+            <a:r>
+              <a:rPr lang="en-US" sz="2400" i="1" dirty="0" smtClean="0"/>
+              <a:t>join in</a:t>
+            </a:r>
+            <a:r>
+              <a:rPr lang="en-US" sz="2400" i="1" dirty="0" smtClean="0"/>
+              <a:t>!” </a:t>
+            </a:r>
+            <a:r>
+              <a:rPr lang="en-US" sz="2400" dirty="0" smtClean="0"/>
+              <a:t>--</a:t>
+            </a:r>
+            <a:r>
+              <a:rPr lang="en-US" sz="2400" dirty="0" smtClean="0"/>
+              <a:t> Dean Iverson</a:t>
+            </a:r>
+          </a:p>
+          <a:p>
+            <a:endParaRPr lang="de-DE" sz="2400" dirty="0"/>
+          </a:p>
+        </p:txBody>
+      </p:sp>
+    </p:spTree>
+  </p:cSld>
+  <p:clrMapOvr>
+    <a:masterClrMapping/>
+  </p:clrMapOvr>
+  <p:transition/>
+  <p:timing>
+    <p:tnLst>
+      <p:par>
+        <p:cTn id="1" dur="indefinite" restart="never" nodeType="tmRoot"/>
+      </p:par>
+    </p:tnLst>
+  </p:timing>
+</p:sld>
+</file>
+
+<file path=ppt/slides/slide24.xml><?xml version="1.0" encoding="utf-8"?>
+<p:sld xmlns:a="http://schemas.openxmlformats.org/drawingml/2006/main" xmlns:r="http://schemas.openxmlformats.org/officeDocument/2006/relationships" xmlns:p="http://schemas.openxmlformats.org/presentationml/2006/main">
+  <p:cSld>
+    <p:spTree>
+      <p:nvGrpSpPr>
+        <p:cNvPr id="1" name=""/>
+        <p:cNvGrpSpPr/>
+        <p:nvPr/>
+      </p:nvGrpSpPr>
+      <p:grpSpPr>
+        <a:xfrm>
+          <a:off x="0" y="0"/>
+          <a:ext cx="0" cy="0"/>
+          <a:chOff x="0" y="0"/>
+          <a:chExt cx="0" cy="0"/>
+        </a:xfrm>
+      </p:grpSpPr>
+      <p:sp>
+        <p:nvSpPr>
+          <p:cNvPr id="2" name="Titel 1"/>
+          <p:cNvSpPr>
+            <a:spLocks noGrp="1"/>
+          </p:cNvSpPr>
+          <p:nvPr>
+            <p:ph type="title"/>
+          </p:nvPr>
+        </p:nvSpPr>
+        <p:spPr/>
+        <p:txBody>
+          <a:bodyPr/>
+          <a:lstStyle/>
+          <a:p>
+            <a:r>
+              <a:rPr lang="de-DE" dirty="0" smtClean="0"/>
+              <a:t>Im Netz...</a:t>
+            </a:r>
+            <a:endParaRPr lang="de-DE" dirty="0"/>
+          </a:p>
+        </p:txBody>
+      </p:sp>
+      <p:sp>
+        <p:nvSpPr>
+          <p:cNvPr id="4" name="Rechteck 3"/>
+          <p:cNvSpPr/>
+          <p:nvPr/>
+        </p:nvSpPr>
+        <p:spPr>
+          <a:xfrm>
+            <a:off x="323410" y="1628750"/>
+            <a:ext cx="8497180" cy="4524315"/>
+          </a:xfrm>
+          <a:prstGeom prst="rect">
+            <a:avLst/>
+          </a:prstGeom>
+        </p:spPr>
+        <p:txBody>
+          <a:bodyPr wrap="square">
+            <a:spAutoFit/>
+          </a:bodyPr>
+          <a:lstStyle/>
+          <a:p>
+            <a:pPr algn="ctr">
+              <a:lnSpc>
+                <a:spcPct val="120000"/>
+              </a:lnSpc>
+            </a:pPr>
+            <a:r>
+              <a:rPr lang="de-DE" sz="2400" b="1" dirty="0" smtClean="0"/>
+              <a:t>Groovy und </a:t>
+            </a:r>
+            <a:r>
+              <a:rPr lang="de-DE" sz="2400" b="1" dirty="0" err="1" smtClean="0"/>
+              <a:t>GroovyFX</a:t>
+            </a:r>
+            <a:endParaRPr lang="de-DE" sz="2400" b="1" dirty="0" smtClean="0"/>
+          </a:p>
+          <a:p>
+            <a:pPr algn="ctr">
+              <a:lnSpc>
+                <a:spcPct val="120000"/>
+              </a:lnSpc>
+            </a:pPr>
+            <a:r>
+              <a:rPr lang="de-DE" sz="2400" dirty="0" smtClean="0">
+                <a:hlinkClick r:id="rId2"/>
+              </a:rPr>
+              <a:t>http://groovy.codehaus.org</a:t>
+            </a:r>
+            <a:r>
+              <a:rPr lang="de-DE" sz="2400" dirty="0" smtClean="0"/>
+              <a:t> </a:t>
+            </a:r>
+          </a:p>
+          <a:p>
+            <a:pPr algn="ctr">
+              <a:lnSpc>
+                <a:spcPct val="120000"/>
+              </a:lnSpc>
+            </a:pPr>
+            <a:r>
+              <a:rPr lang="de-DE" sz="2400" dirty="0" smtClean="0">
+                <a:hlinkClick r:id="rId3"/>
+              </a:rPr>
+              <a:t>http://groovy.codehaus.org/GroovyFX</a:t>
+            </a:r>
+            <a:r>
+              <a:rPr lang="de-DE" sz="2400" dirty="0" smtClean="0"/>
+              <a:t> </a:t>
+            </a:r>
+          </a:p>
+          <a:p>
+            <a:pPr algn="ctr">
+              <a:lnSpc>
+                <a:spcPct val="120000"/>
+              </a:lnSpc>
+            </a:pPr>
+            <a:r>
+              <a:rPr lang="de-DE" sz="2400" dirty="0" smtClean="0">
+                <a:hlinkClick r:id="rId4"/>
+              </a:rPr>
+              <a:t>http://fxexperience.com</a:t>
+            </a:r>
+            <a:endParaRPr lang="de-DE" sz="2400" dirty="0" smtClean="0"/>
+          </a:p>
+          <a:p>
+            <a:pPr algn="ctr">
+              <a:lnSpc>
+                <a:spcPct val="120000"/>
+              </a:lnSpc>
+            </a:pPr>
+            <a:endParaRPr lang="de-DE" sz="2400" dirty="0" smtClean="0"/>
+          </a:p>
+          <a:p>
+            <a:pPr algn="ctr">
+              <a:lnSpc>
+                <a:spcPct val="120000"/>
+              </a:lnSpc>
+            </a:pPr>
+            <a:r>
+              <a:rPr lang="de-DE" sz="2400" b="1" dirty="0" smtClean="0"/>
+              <a:t>Beispiele:</a:t>
+            </a:r>
+          </a:p>
+          <a:p>
+            <a:pPr algn="ctr">
+              <a:lnSpc>
+                <a:spcPct val="120000"/>
+              </a:lnSpc>
+            </a:pPr>
+            <a:r>
+              <a:rPr lang="de-DE" sz="2400" dirty="0" smtClean="0">
+                <a:hlinkClick r:id="rId5"/>
+              </a:rPr>
+              <a:t>https://github.com/codescape/presentations</a:t>
+            </a:r>
+            <a:endParaRPr lang="de-DE" sz="2400" dirty="0" smtClean="0"/>
+          </a:p>
+          <a:p>
+            <a:pPr algn="ctr">
+              <a:lnSpc>
+                <a:spcPct val="120000"/>
+              </a:lnSpc>
+            </a:pPr>
+            <a:endParaRPr lang="de-DE" sz="2400" b="1" dirty="0" smtClean="0"/>
+          </a:p>
+          <a:p>
+            <a:pPr algn="ctr">
+              <a:lnSpc>
+                <a:spcPct val="120000"/>
+              </a:lnSpc>
+            </a:pPr>
+            <a:r>
+              <a:rPr lang="de-DE" sz="2400" b="1" dirty="0" err="1" smtClean="0"/>
+              <a:t>Twitter</a:t>
+            </a:r>
+            <a:r>
+              <a:rPr lang="de-DE" sz="2400" b="1" dirty="0" smtClean="0"/>
+              <a:t>:</a:t>
+            </a:r>
+          </a:p>
+          <a:p>
+            <a:pPr algn="ctr">
+              <a:lnSpc>
+                <a:spcPct val="120000"/>
+              </a:lnSpc>
+            </a:pPr>
+            <a:r>
+              <a:rPr lang="de-DE" sz="2400" dirty="0" smtClean="0">
+                <a:hlinkClick r:id="rId6"/>
+              </a:rPr>
+              <a:t>@</a:t>
+            </a:r>
+            <a:r>
+              <a:rPr lang="de-DE" sz="2400" dirty="0" err="1" smtClean="0">
+                <a:hlinkClick r:id="rId6"/>
+              </a:rPr>
+              <a:t>stefanglase</a:t>
+            </a:r>
+            <a:endParaRPr lang="de-DE" sz="2400" dirty="0"/>
+          </a:p>
+        </p:txBody>
+      </p:sp>
+    </p:spTree>
+    <p:extLst>
+      <p:ext uri="{BB962C8B-B14F-4D97-AF65-F5344CB8AC3E}">
+        <p14:creationId xmlns="" xmlns:p14="http://schemas.microsoft.com/office/powerpoint/2010/main" val="1364891894"/>
+      </p:ext>
+    </p:extLst>
+  </p:cSld>
+  <p:clrMapOvr>
+    <a:masterClrMapping/>
+  </p:clrMapOvr>
+  <p:transition/>
+  <p:timing>
+    <p:tnLst>
+      <p:par>
+        <p:cTn id="1" dur="indefinite" restart="never" nodeType="tmRoot"/>
+      </p:par>
+    </p:tnLst>
+  </p:timing>
+</p:sld>
+</file>
+
+<file path=ppt/slides/slide25.xml><?xml version="1.0" encoding="utf-8"?>
+<p:sld xmlns:a="http://schemas.openxmlformats.org/drawingml/2006/main" xmlns:r="http://schemas.openxmlformats.org/officeDocument/2006/relationships" xmlns:p="http://schemas.openxmlformats.org/presentationml/2006/main">
+  <p:cSld>
+    <p:spTree>
+      <p:nvGrpSpPr>
+        <p:cNvPr id="1" name=""/>
+        <p:cNvGrpSpPr/>
+        <p:nvPr/>
+      </p:nvGrpSpPr>
+      <p:grpSpPr>
+        <a:xfrm>
+          <a:off x="0" y="0"/>
+          <a:ext cx="0" cy="0"/>
+          <a:chOff x="0" y="0"/>
+          <a:chExt cx="0" cy="0"/>
+        </a:xfrm>
+      </p:grpSpPr>
+      <p:sp>
+        <p:nvSpPr>
+          <p:cNvPr id="2" name="Titel 1"/>
+          <p:cNvSpPr>
+            <a:spLocks noGrp="1"/>
+          </p:cNvSpPr>
+          <p:nvPr>
+            <p:ph type="title"/>
+          </p:nvPr>
+        </p:nvSpPr>
+        <p:spPr/>
+        <p:txBody>
+          <a:bodyPr/>
+          <a:lstStyle/>
+          <a:p>
+            <a:r>
+              <a:rPr lang="de-DE" dirty="0" smtClean="0"/>
               <a:t>Fragen und Antworten</a:t>
             </a:r>
             <a:endParaRPr lang="de-DE" dirty="0"/>
@@ -26589,7 +30612,7 @@
 </p:sld>
 </file>
 
-<file path=ppt/slides/slide22.xml><?xml version="1.0" encoding="utf-8"?>
+<file path=ppt/slides/slide26.xml><?xml version="1.0" encoding="utf-8"?>
 <p:sld xmlns:a="http://schemas.openxmlformats.org/drawingml/2006/main" xmlns:r="http://schemas.openxmlformats.org/officeDocument/2006/relationships" xmlns:p="http://schemas.openxmlformats.org/presentationml/2006/main">
   <p:cSld>
     <p:spTree>
@@ -27375,7 +31398,7 @@
               <a:blip r:embed="rId5" cstate="print">
                 <a:extLst>
                   <a:ext uri="{28A0092B-C50C-407E-A947-70E740481C1C}">
-                    <a14:useLocalDpi xmlns:a14="http://schemas.microsoft.com/office/drawing/2010/main" xmlns="" val="0"/>
+                    <a14:useLocalDpi xmlns="" xmlns:a14="http://schemas.microsoft.com/office/drawing/2010/main" val="0"/>
                   </a:ext>
                 </a:extLst>
               </a:blip>
@@ -27405,7 +31428,7 @@
               <a:blip r:embed="rId6" cstate="print">
                 <a:extLst>
                   <a:ext uri="{28A0092B-C50C-407E-A947-70E740481C1C}">
-                    <a14:useLocalDpi xmlns:a14="http://schemas.microsoft.com/office/drawing/2010/main" xmlns="" val="0"/>
+                    <a14:useLocalDpi xmlns="" xmlns:a14="http://schemas.microsoft.com/office/drawing/2010/main" val="0"/>
                   </a:ext>
                 </a:extLst>
               </a:blip>
@@ -27435,7 +31458,7 @@
               <a:blip r:embed="rId7" cstate="print">
                 <a:extLst>
                   <a:ext uri="{28A0092B-C50C-407E-A947-70E740481C1C}">
-                    <a14:useLocalDpi xmlns:a14="http://schemas.microsoft.com/office/drawing/2010/main" xmlns="" val="0"/>
+                    <a14:useLocalDpi xmlns="" xmlns:a14="http://schemas.microsoft.com/office/drawing/2010/main" val="0"/>
                   </a:ext>
                 </a:extLst>
               </a:blip>
@@ -27468,7 +31491,7 @@
             <a:blip r:embed="rId9" cstate="print">
               <a:extLst>
                 <a:ext uri="{28A0092B-C50C-407E-A947-70E740481C1C}">
-                  <a14:useLocalDpi xmlns="" xmlns:a14="http://schemas.microsoft.com/office/drawing/2010/main" val="0"/>
+                  <a14:useLocalDpi xmlns:a14="http://schemas.microsoft.com/office/drawing/2010/main" xmlns="" val="0"/>
                 </a:ext>
               </a:extLst>
             </a:blip>
@@ -27490,7 +31513,7 @@
     </p:spTree>
     <p:extLst>
       <p:ext uri="{BB962C8B-B14F-4D97-AF65-F5344CB8AC3E}">
-        <p14:creationId xmlns:p14="http://schemas.microsoft.com/office/powerpoint/2010/main" xmlns="" val="1074872443"/>
+        <p14:creationId xmlns="" xmlns:p14="http://schemas.microsoft.com/office/powerpoint/2010/main" val="1074872443"/>
       </p:ext>
     </p:extLst>
   </p:cSld>
@@ -29972,15 +33995,12 @@
 </file>
 
 <file path=customXml/item1.xml><?xml version="1.0" encoding="utf-8"?>
-<p:properties xmlns:p="http://schemas.microsoft.com/office/2006/metadata/properties" xmlns:xsi="http://www.w3.org/2001/XMLSchema-instance">
-  <documentManagement>
-    <_dlc_DocId xmlns="8cc9f148-63af-4ae4-b4c0-3a33ca8129b3">DOCID-7-65</_dlc_DocId>
-    <_dlc_DocIdUrl xmlns="8cc9f148-63af-4ae4-b4c0-3a33ca8129b3">
-      <Url>https://portal.opitz-consulting.de/_layouts/DocIdRedir.aspx?ID=DOCID-7-65</Url>
-      <Description>DOCID-7-65</Description>
-    </_dlc_DocIdUrl>
-  </documentManagement>
-</p:properties>
+<?mso-contentType ?>
+<FormTemplates xmlns="http://schemas.microsoft.com/sharepoint/v3/contenttype/forms">
+  <Display>DocumentLibraryForm</Display>
+  <Edit>DocumentLibraryForm</Edit>
+  <New>DocumentLibraryForm</New>
+</FormTemplates>
 </file>
 
 <file path=customXml/item2.xml><?xml version="1.0" encoding="utf-8"?>
@@ -30030,12 +34050,15 @@
 </file>
 
 <file path=customXml/item3.xml><?xml version="1.0" encoding="utf-8"?>
-<?mso-contentType ?>
-<FormTemplates xmlns="http://schemas.microsoft.com/sharepoint/v3/contenttype/forms">
-  <Display>DocumentLibraryForm</Display>
-  <Edit>DocumentLibraryForm</Edit>
-  <New>DocumentLibraryForm</New>
-</FormTemplates>
+<p:properties xmlns:p="http://schemas.microsoft.com/office/2006/metadata/properties" xmlns:xsi="http://www.w3.org/2001/XMLSchema-instance">
+  <documentManagement>
+    <_dlc_DocId xmlns="8cc9f148-63af-4ae4-b4c0-3a33ca8129b3">DOCID-7-65</_dlc_DocId>
+    <_dlc_DocIdUrl xmlns="8cc9f148-63af-4ae4-b4c0-3a33ca8129b3">
+      <Url>https://portal.opitz-consulting.de/_layouts/DocIdRedir.aspx?ID=DOCID-7-65</Url>
+      <Description>DOCID-7-65</Description>
+    </_dlc_DocIdUrl>
+  </documentManagement>
+</p:properties>
 </file>
 
 <file path=customXml/item4.xml><?xml version="1.0" encoding="utf-8"?>
@@ -30184,17 +34207,9 @@
 </file>
 
 <file path=customXml/itemProps1.xml><?xml version="1.0" encoding="utf-8"?>
-<ds:datastoreItem xmlns:ds="http://schemas.openxmlformats.org/officeDocument/2006/customXml" ds:itemID="{AF7E4967-43BC-4F71-AEEC-BDE09349FE60}">
+<ds:datastoreItem xmlns:ds="http://schemas.openxmlformats.org/officeDocument/2006/customXml" ds:itemID="{7E7A0F45-7BDE-4AA7-A1BB-E146938E8111}">
   <ds:schemaRefs>
-    <ds:schemaRef ds:uri="http://purl.org/dc/elements/1.1/"/>
-    <ds:schemaRef ds:uri="http://www.w3.org/XML/1998/namespace"/>
-    <ds:schemaRef ds:uri="8cc9f148-63af-4ae4-b4c0-3a33ca8129b3"/>
-    <ds:schemaRef ds:uri="http://schemas.microsoft.com/office/2006/documentManagement/types"/>
-    <ds:schemaRef ds:uri="http://schemas.microsoft.com/office/2006/metadata/properties"/>
-    <ds:schemaRef ds:uri="http://purl.org/dc/dcmitype/"/>
-    <ds:schemaRef ds:uri="http://schemas.microsoft.com/office/infopath/2007/PartnerControls"/>
-    <ds:schemaRef ds:uri="http://schemas.openxmlformats.org/package/2006/metadata/core-properties"/>
-    <ds:schemaRef ds:uri="http://purl.org/dc/terms/"/>
+    <ds:schemaRef ds:uri="http://schemas.microsoft.com/sharepoint/v3/contenttype/forms"/>
   </ds:schemaRefs>
 </ds:datastoreItem>
 </file>
@@ -30208,9 +34223,17 @@
 </file>
 
 <file path=customXml/itemProps3.xml><?xml version="1.0" encoding="utf-8"?>
-<ds:datastoreItem xmlns:ds="http://schemas.openxmlformats.org/officeDocument/2006/customXml" ds:itemID="{7E7A0F45-7BDE-4AA7-A1BB-E146938E8111}">
+<ds:datastoreItem xmlns:ds="http://schemas.openxmlformats.org/officeDocument/2006/customXml" ds:itemID="{AF7E4967-43BC-4F71-AEEC-BDE09349FE60}">
   <ds:schemaRefs>
-    <ds:schemaRef ds:uri="http://schemas.microsoft.com/sharepoint/v3/contenttype/forms"/>
+    <ds:schemaRef ds:uri="http://purl.org/dc/elements/1.1/"/>
+    <ds:schemaRef ds:uri="http://www.w3.org/XML/1998/namespace"/>
+    <ds:schemaRef ds:uri="8cc9f148-63af-4ae4-b4c0-3a33ca8129b3"/>
+    <ds:schemaRef ds:uri="http://schemas.microsoft.com/office/2006/documentManagement/types"/>
+    <ds:schemaRef ds:uri="http://schemas.microsoft.com/office/2006/metadata/properties"/>
+    <ds:schemaRef ds:uri="http://purl.org/dc/dcmitype/"/>
+    <ds:schemaRef ds:uri="http://schemas.microsoft.com/office/infopath/2007/PartnerControls"/>
+    <ds:schemaRef ds:uri="http://schemas.openxmlformats.org/package/2006/metadata/core-properties"/>
+    <ds:schemaRef ds:uri="http://purl.org/dc/terms/"/>
   </ds:schemaRefs>
 </ds:datastoreItem>
 </file>

</xml_diff>

<commit_message>
removing timer from slides
</commit_message>
<xml_diff>
--- a/groovyfx-entfesselt-javafx/groovyfx-oop-2012.pptx
+++ b/groovyfx-entfesselt-javafx/groovyfx-oop-2012.pptx
@@ -159,6 +159,7 @@
 
 <file path=ppt/charts/chart1.xml><?xml version="1.0" encoding="utf-8"?>
 <c:chartSpace xmlns:c="http://schemas.openxmlformats.org/drawingml/2006/chart" xmlns:a="http://schemas.openxmlformats.org/drawingml/2006/main" xmlns:r="http://schemas.openxmlformats.org/officeDocument/2006/relationships">
+  <c:date1904 val="1"/>
   <c:lang val="de-DE"/>
   <c:chart>
     <c:view3D>
@@ -321,7 +322,7 @@
             <a:fld id="{E4B7E1CC-5804-4FAA-A440-E3B0242BB0EE}" type="datetimeFigureOut">
               <a:rPr lang="de-DE" smtClean="0"/>
               <a:pPr/>
-              <a:t>23.01.2012</a:t>
+              <a:t>30.01.2012</a:t>
             </a:fld>
             <a:endParaRPr lang="de-DE"/>
           </a:p>
@@ -390,7 +391,7 @@
     </p:spTree>
     <p:extLst>
       <p:ext uri="{BB962C8B-B14F-4D97-AF65-F5344CB8AC3E}">
-        <p14:creationId xmlns:p14="http://schemas.microsoft.com/office/powerpoint/2010/main" xmlns="" val="143795665"/>
+        <p14:creationId xmlns="" xmlns:p14="http://schemas.microsoft.com/office/powerpoint/2010/main" val="143795665"/>
       </p:ext>
     </p:extLst>
   </p:cSld>
@@ -490,7 +491,7 @@
             <a:fld id="{600A7168-685E-42A5-A6B5-B6E3AF6AADAA}" type="datetimeFigureOut">
               <a:rPr lang="de-DE" smtClean="0"/>
               <a:pPr/>
-              <a:t>23.01.2012</a:t>
+              <a:t>30.01.2012</a:t>
             </a:fld>
             <a:endParaRPr lang="de-DE"/>
           </a:p>
@@ -654,7 +655,7 @@
     </p:spTree>
     <p:extLst>
       <p:ext uri="{BB962C8B-B14F-4D97-AF65-F5344CB8AC3E}">
-        <p14:creationId xmlns:p14="http://schemas.microsoft.com/office/powerpoint/2010/main" xmlns="" val="3015979536"/>
+        <p14:creationId xmlns="" xmlns:p14="http://schemas.microsoft.com/office/powerpoint/2010/main" val="3015979536"/>
       </p:ext>
     </p:extLst>
   </p:cSld>
@@ -8162,7 +8163,7 @@
           <p:nvPr userDrawn="1">
             <p:extLst>
               <p:ext uri="{D42A27DB-BD31-4B8C-83A1-F6EECF244321}">
-                <p14:modId xmlns:p14="http://schemas.microsoft.com/office/powerpoint/2010/main" xmlns="" val="1305585469"/>
+                <p14:modId xmlns="" xmlns:p14="http://schemas.microsoft.com/office/powerpoint/2010/main" val="1305585469"/>
               </p:ext>
             </p:extLst>
           </p:nvPr>
@@ -11148,7 +11149,7 @@
     </p:spTree>
     <p:extLst>
       <p:ext uri="{BB962C8B-B14F-4D97-AF65-F5344CB8AC3E}">
-        <p14:creationId xmlns:p14="http://schemas.microsoft.com/office/powerpoint/2010/main" xmlns="" val="844123879"/>
+        <p14:creationId xmlns="" xmlns:p14="http://schemas.microsoft.com/office/powerpoint/2010/main" val="844123879"/>
       </p:ext>
     </p:extLst>
   </p:cSld>
@@ -11353,7 +11354,7 @@
     </p:spTree>
     <p:extLst>
       <p:ext uri="{BB962C8B-B14F-4D97-AF65-F5344CB8AC3E}">
-        <p14:creationId xmlns:p14="http://schemas.microsoft.com/office/powerpoint/2010/main" xmlns="" val="2057847455"/>
+        <p14:creationId xmlns="" xmlns:p14="http://schemas.microsoft.com/office/powerpoint/2010/main" val="2057847455"/>
       </p:ext>
     </p:extLst>
   </p:cSld>
@@ -11430,7 +11431,7 @@
     </p:spTree>
     <p:extLst>
       <p:ext uri="{BB962C8B-B14F-4D97-AF65-F5344CB8AC3E}">
-        <p14:creationId xmlns:p14="http://schemas.microsoft.com/office/powerpoint/2010/main" xmlns="" val="1363170605"/>
+        <p14:creationId xmlns="" xmlns:p14="http://schemas.microsoft.com/office/powerpoint/2010/main" val="1363170605"/>
       </p:ext>
     </p:extLst>
   </p:cSld>
@@ -11535,7 +11536,7 @@
     </p:spTree>
     <p:extLst>
       <p:ext uri="{BB962C8B-B14F-4D97-AF65-F5344CB8AC3E}">
-        <p14:creationId xmlns:p14="http://schemas.microsoft.com/office/powerpoint/2010/main" xmlns="" val="3061540536"/>
+        <p14:creationId xmlns="" xmlns:p14="http://schemas.microsoft.com/office/powerpoint/2010/main" val="3061540536"/>
       </p:ext>
     </p:extLst>
   </p:cSld>
@@ -11543,7 +11544,7 @@
     <a:masterClrMapping/>
   </p:clrMapOvr>
   <mc:AlternateContent xmlns:mc="http://schemas.openxmlformats.org/markup-compatibility/2006">
-    <mc:Choice xmlns:p14="http://schemas.microsoft.com/office/powerpoint/2010/main" xmlns="" Requires="p14">
+    <mc:Choice xmlns="" xmlns:p14="http://schemas.microsoft.com/office/powerpoint/2010/main" Requires="p14">
       <p:transition spd="med" p14:dur="700">
         <p:fade/>
       </p:transition>
@@ -11668,7 +11669,7 @@
     </p:spTree>
     <p:extLst>
       <p:ext uri="{BB962C8B-B14F-4D97-AF65-F5344CB8AC3E}">
-        <p14:creationId xmlns:p14="http://schemas.microsoft.com/office/powerpoint/2010/main" xmlns="" val="3295006165"/>
+        <p14:creationId xmlns="" xmlns:p14="http://schemas.microsoft.com/office/powerpoint/2010/main" val="3295006165"/>
       </p:ext>
     </p:extLst>
   </p:cSld>
@@ -11797,7 +11798,7 @@
     </p:spTree>
     <p:extLst>
       <p:ext uri="{BB962C8B-B14F-4D97-AF65-F5344CB8AC3E}">
-        <p14:creationId xmlns:p14="http://schemas.microsoft.com/office/powerpoint/2010/main" xmlns="" val="2651243940"/>
+        <p14:creationId xmlns="" xmlns:p14="http://schemas.microsoft.com/office/powerpoint/2010/main" val="2651243940"/>
       </p:ext>
     </p:extLst>
   </p:cSld>
@@ -12991,7 +12992,7 @@
     </p:spTree>
     <p:extLst>
       <p:ext uri="{BB962C8B-B14F-4D97-AF65-F5344CB8AC3E}">
-        <p14:creationId xmlns:p14="http://schemas.microsoft.com/office/powerpoint/2010/main" xmlns="" val="3634760287"/>
+        <p14:creationId xmlns="" xmlns:p14="http://schemas.microsoft.com/office/powerpoint/2010/main" val="3634760287"/>
       </p:ext>
     </p:extLst>
   </p:cSld>
@@ -13138,7 +13139,7 @@
     </p:spTree>
     <p:extLst>
       <p:ext uri="{BB962C8B-B14F-4D97-AF65-F5344CB8AC3E}">
-        <p14:creationId xmlns:p14="http://schemas.microsoft.com/office/powerpoint/2010/main" xmlns="" val="3463583603"/>
+        <p14:creationId xmlns="" xmlns:p14="http://schemas.microsoft.com/office/powerpoint/2010/main" val="3463583603"/>
       </p:ext>
     </p:extLst>
   </p:cSld>
@@ -13350,7 +13351,7 @@
     </p:spTree>
     <p:extLst>
       <p:ext uri="{BB962C8B-B14F-4D97-AF65-F5344CB8AC3E}">
-        <p14:creationId xmlns:p14="http://schemas.microsoft.com/office/powerpoint/2010/main" xmlns="" val="3494811284"/>
+        <p14:creationId xmlns="" xmlns:p14="http://schemas.microsoft.com/office/powerpoint/2010/main" val="3494811284"/>
       </p:ext>
     </p:extLst>
   </p:cSld>
@@ -13596,7 +13597,7 @@
             <a:fld id="{C56B2E86-08FC-5E4E-AA0C-3532805D34FB}" type="datetimeFigureOut">
               <a:rPr lang="de-DE" smtClean="0"/>
               <a:pPr/>
-              <a:t>23.01.2012</a:t>
+              <a:t>30.01.2012</a:t>
             </a:fld>
             <a:endParaRPr lang="de-DE"/>
           </a:p>
@@ -13656,7 +13657,7 @@
     </p:spTree>
     <p:extLst>
       <p:ext uri="{BB962C8B-B14F-4D97-AF65-F5344CB8AC3E}">
-        <p14:creationId xmlns:p14="http://schemas.microsoft.com/office/powerpoint/2010/main" xmlns="" val="1453913930"/>
+        <p14:creationId xmlns="" xmlns:p14="http://schemas.microsoft.com/office/powerpoint/2010/main" val="1453913930"/>
       </p:ext>
     </p:extLst>
   </p:cSld>
@@ -14036,7 +14037,7 @@
             <a:fld id="{C56B2E86-08FC-5E4E-AA0C-3532805D34FB}" type="datetimeFigureOut">
               <a:rPr lang="de-DE" smtClean="0"/>
               <a:pPr/>
-              <a:t>23.01.2012</a:t>
+              <a:t>30.01.2012</a:t>
             </a:fld>
             <a:endParaRPr lang="de-DE"/>
           </a:p>
@@ -14096,7 +14097,7 @@
     </p:spTree>
     <p:extLst>
       <p:ext uri="{BB962C8B-B14F-4D97-AF65-F5344CB8AC3E}">
-        <p14:creationId xmlns:p14="http://schemas.microsoft.com/office/powerpoint/2010/main" xmlns="" val="275773452"/>
+        <p14:creationId xmlns="" xmlns:p14="http://schemas.microsoft.com/office/powerpoint/2010/main" val="275773452"/>
       </p:ext>
     </p:extLst>
   </p:cSld>
@@ -21210,7 +21211,7 @@
     </p:spTree>
     <p:extLst>
       <p:ext uri="{BB962C8B-B14F-4D97-AF65-F5344CB8AC3E}">
-        <p14:creationId xmlns:p14="http://schemas.microsoft.com/office/powerpoint/2010/main" xmlns="" val="2421447281"/>
+        <p14:creationId xmlns="" xmlns:p14="http://schemas.microsoft.com/office/powerpoint/2010/main" val="2421447281"/>
       </p:ext>
     </p:extLst>
   </p:cSld>
@@ -22034,7 +22035,7 @@
   <p:clrMapOvr>
     <a:masterClrMapping/>
   </p:clrMapOvr>
-  <p:transition advTm="10000"/>
+  <p:transition/>
   <p:timing>
     <p:tnLst>
       <p:par>
@@ -22164,6 +22165,7 @@
   <p:clrMapOvr>
     <a:masterClrMapping/>
   </p:clrMapOvr>
+  <p:transition/>
   <p:timing>
     <p:tnLst>
       <p:par>
@@ -23427,7 +23429,7 @@
   <p:clrMapOvr>
     <a:masterClrMapping/>
   </p:clrMapOvr>
-  <p:transition advTm="10000"/>
+  <p:transition/>
   <p:timing>
     <p:tnLst>
       <p:par>
@@ -23834,7 +23836,7 @@
   <p:clrMapOvr>
     <a:masterClrMapping/>
   </p:clrMapOvr>
-  <p:transition advTm="10000"/>
+  <p:transition/>
   <p:timing>
     <p:tnLst>
       <p:par>
@@ -23917,6 +23919,7 @@
   <p:clrMapOvr>
     <a:masterClrMapping/>
   </p:clrMapOvr>
+  <p:transition/>
   <p:timing>
     <p:tnLst>
       <p:par>
@@ -24299,6 +24302,7 @@
   <p:clrMapOvr>
     <a:masterClrMapping/>
   </p:clrMapOvr>
+  <p:transition/>
   <p:timing>
     <p:tnLst>
       <p:par>
@@ -24504,6 +24508,7 @@
   <p:clrMapOvr>
     <a:masterClrMapping/>
   </p:clrMapOvr>
+  <p:transition/>
   <p:timing>
     <p:tnLst>
       <p:par>
@@ -26191,6 +26196,7 @@
   <p:clrMapOvr>
     <a:masterClrMapping/>
   </p:clrMapOvr>
+  <p:transition/>
   <p:timing>
     <p:tnLst>
       <p:par>
@@ -26364,6 +26370,7 @@
   <p:clrMapOvr>
     <a:masterClrMapping/>
   </p:clrMapOvr>
+  <p:transition/>
   <p:timing>
     <p:tnLst>
       <p:par>
@@ -26528,6 +26535,7 @@
   <p:clrMapOvr>
     <a:masterClrMapping/>
   </p:clrMapOvr>
+  <p:transition/>
   <p:timing>
     <p:tnLst>
       <p:par>
@@ -26857,7 +26865,7 @@
   <p:clrMapOvr>
     <a:masterClrMapping/>
   </p:clrMapOvr>
-  <p:transition advTm="10000"/>
+  <p:transition/>
   <p:timing>
     <p:tnLst>
       <p:par>
@@ -27026,6 +27034,7 @@
   <p:clrMapOvr>
     <a:masterClrMapping/>
   </p:clrMapOvr>
+  <p:transition/>
   <p:timing>
     <p:tnLst>
       <p:par>
@@ -29157,6 +29166,7 @@
   <p:clrMapOvr>
     <a:masterClrMapping/>
   </p:clrMapOvr>
+  <p:transition/>
   <p:timing>
     <p:tnLst>
       <p:par>
@@ -30688,6 +30698,7 @@
   <p:clrMapOvr>
     <a:masterClrMapping/>
   </p:clrMapOvr>
+  <p:transition/>
   <p:timing>
     <p:tnLst>
       <p:par>
@@ -30775,6 +30786,7 @@
   <p:clrMapOvr>
     <a:masterClrMapping/>
   </p:clrMapOvr>
+  <p:transition/>
   <p:timing>
     <p:tnLst>
       <p:par>
@@ -30865,6 +30877,7 @@
   <p:clrMapOvr>
     <a:masterClrMapping/>
   </p:clrMapOvr>
+  <p:transition/>
   <p:timing>
     <p:tnLst>
       <p:par>
@@ -31055,6 +31068,7 @@
   <p:clrMapOvr>
     <a:masterClrMapping/>
   </p:clrMapOvr>
+  <p:transition/>
   <p:timing>
     <p:tnLst>
       <p:par>
@@ -32146,6 +32160,7 @@
   <p:clrMapOvr>
     <a:masterClrMapping/>
   </p:clrMapOvr>
+  <p:transition/>
   <p:timing>
     <p:tnLst>
       <p:par>
@@ -34186,6 +34201,7 @@
   <p:clrMapOvr>
     <a:masterClrMapping/>
   </p:clrMapOvr>
+  <p:transition/>
   <p:timing>
     <p:tnLst>
       <p:par>
@@ -36288,6 +36304,7 @@
   <p:clrMapOvr>
     <a:masterClrMapping/>
   </p:clrMapOvr>
+  <p:transition/>
   <p:timing>
     <p:tnLst>
       <p:par>
@@ -36372,7 +36389,7 @@
   <p:clrMapOvr>
     <a:masterClrMapping/>
   </p:clrMapOvr>
-  <p:transition spd="slow" advTm="10000"/>
+  <p:transition spd="slow"/>
   <p:timing>
     <p:tnLst>
       <p:par>
@@ -36459,6 +36476,7 @@
   <p:clrMapOvr>
     <a:masterClrMapping/>
   </p:clrMapOvr>
+  <p:transition/>
   <p:timing>
     <p:tnLst>
       <p:par>
@@ -36551,6 +36569,7 @@
   <p:clrMapOvr>
     <a:masterClrMapping/>
   </p:clrMapOvr>
+  <p:transition/>
 </p:sld>
 </file>
 
@@ -38258,6 +38277,7 @@
   <p:clrMapOvr>
     <a:masterClrMapping/>
   </p:clrMapOvr>
+  <p:transition/>
   <p:timing>
     <p:tnLst>
       <p:par>
@@ -40025,6 +40045,7 @@
   <p:clrMapOvr>
     <a:masterClrMapping/>
   </p:clrMapOvr>
+  <p:transition/>
   <p:timing>
     <p:tnLst>
       <p:par>
@@ -41800,6 +41821,7 @@
   <p:clrMapOvr>
     <a:masterClrMapping/>
   </p:clrMapOvr>
+  <p:transition/>
   <p:timing>
     <p:tnLst>
       <p:par>
@@ -43567,6 +43589,7 @@
   <p:clrMapOvr>
     <a:masterClrMapping/>
   </p:clrMapOvr>
+  <p:transition/>
   <p:timing>
     <p:tnLst>
       <p:par>
@@ -43770,6 +43793,7 @@
   <p:clrMapOvr>
     <a:masterClrMapping/>
   </p:clrMapOvr>
+  <p:transition/>
 </p:sld>
 </file>
 
@@ -43849,6 +43873,7 @@
   <p:clrMapOvr>
     <a:masterClrMapping/>
   </p:clrMapOvr>
+  <p:transition/>
   <p:timing>
     <p:tnLst>
       <p:par>
@@ -44010,6 +44035,7 @@
   <p:clrMapOvr>
     <a:masterClrMapping/>
   </p:clrMapOvr>
+  <p:transition/>
   <p:timing>
     <p:tnLst>
       <p:par>
@@ -45321,6 +45347,7 @@
   <p:clrMapOvr>
     <a:masterClrMapping/>
   </p:clrMapOvr>
+  <p:transition/>
   <p:timing>
     <p:tnLst>
       <p:par>
@@ -45491,7 +45518,7 @@
   <p:clrMapOvr>
     <a:masterClrMapping/>
   </p:clrMapOvr>
-  <p:transition advTm="10000"/>
+  <p:transition/>
   <p:timing>
     <p:tnLst>
       <p:par>
@@ -45659,6 +45686,7 @@
   <p:clrMapOvr>
     <a:masterClrMapping/>
   </p:clrMapOvr>
+  <p:transition/>
 </p:sld>
 </file>
 
@@ -46001,7 +46029,7 @@
     </p:spTree>
     <p:extLst>
       <p:ext uri="{BB962C8B-B14F-4D97-AF65-F5344CB8AC3E}">
-        <p14:creationId xmlns="" xmlns:p14="http://schemas.microsoft.com/office/powerpoint/2010/main" val="1364891894"/>
+        <p14:creationId xmlns:p14="http://schemas.microsoft.com/office/powerpoint/2010/main" xmlns="" val="1364891894"/>
       </p:ext>
     </p:extLst>
   </p:cSld>
@@ -46064,7 +46092,7 @@
   <p:clrMapOvr>
     <a:masterClrMapping/>
   </p:clrMapOvr>
-  <p:transition spd="slow" advTm="10000"/>
+  <p:transition spd="slow"/>
   <p:timing>
     <p:tnLst>
       <p:par>
@@ -46861,7 +46889,7 @@
               <a:blip r:embed="rId5" cstate="print">
                 <a:extLst>
                   <a:ext uri="{28A0092B-C50C-407E-A947-70E740481C1C}">
-                    <a14:useLocalDpi xmlns="" xmlns:a14="http://schemas.microsoft.com/office/drawing/2010/main" val="0"/>
+                    <a14:useLocalDpi xmlns:a14="http://schemas.microsoft.com/office/drawing/2010/main" xmlns="" val="0"/>
                   </a:ext>
                 </a:extLst>
               </a:blip>
@@ -46891,7 +46919,7 @@
               <a:blip r:embed="rId6" cstate="print">
                 <a:extLst>
                   <a:ext uri="{28A0092B-C50C-407E-A947-70E740481C1C}">
-                    <a14:useLocalDpi xmlns="" xmlns:a14="http://schemas.microsoft.com/office/drawing/2010/main" val="0"/>
+                    <a14:useLocalDpi xmlns:a14="http://schemas.microsoft.com/office/drawing/2010/main" xmlns="" val="0"/>
                   </a:ext>
                 </a:extLst>
               </a:blip>
@@ -46921,7 +46949,7 @@
               <a:blip r:embed="rId7" cstate="print">
                 <a:extLst>
                   <a:ext uri="{28A0092B-C50C-407E-A947-70E740481C1C}">
-                    <a14:useLocalDpi xmlns="" xmlns:a14="http://schemas.microsoft.com/office/drawing/2010/main" val="0"/>
+                    <a14:useLocalDpi xmlns:a14="http://schemas.microsoft.com/office/drawing/2010/main" xmlns="" val="0"/>
                   </a:ext>
                 </a:extLst>
               </a:blip>
@@ -46954,7 +46982,7 @@
             <a:blip r:embed="rId9" cstate="print">
               <a:extLst>
                 <a:ext uri="{28A0092B-C50C-407E-A947-70E740481C1C}">
-                  <a14:useLocalDpi xmlns:a14="http://schemas.microsoft.com/office/drawing/2010/main" xmlns="" val="0"/>
+                  <a14:useLocalDpi xmlns="" xmlns:a14="http://schemas.microsoft.com/office/drawing/2010/main" val="0"/>
                 </a:ext>
               </a:extLst>
             </a:blip>
@@ -46976,7 +47004,7 @@
     </p:spTree>
     <p:extLst>
       <p:ext uri="{BB962C8B-B14F-4D97-AF65-F5344CB8AC3E}">
-        <p14:creationId xmlns="" xmlns:p14="http://schemas.microsoft.com/office/powerpoint/2010/main" val="1074872443"/>
+        <p14:creationId xmlns:p14="http://schemas.microsoft.com/office/powerpoint/2010/main" xmlns="" val="1074872443"/>
       </p:ext>
     </p:extLst>
   </p:cSld>
@@ -47058,6 +47086,7 @@
   <p:clrMapOvr>
     <a:masterClrMapping/>
   </p:clrMapOvr>
+  <p:transition/>
   <p:timing>
     <p:tnLst>
       <p:par>
@@ -47272,7 +47301,7 @@
   <p:clrMapOvr>
     <a:masterClrMapping/>
   </p:clrMapOvr>
-  <p:transition advTm="10000"/>
+  <p:transition/>
   <p:timing>
     <p:tnLst>
       <p:par>
@@ -47582,7 +47611,7 @@
   <p:clrMapOvr>
     <a:masterClrMapping/>
   </p:clrMapOvr>
-  <p:transition advTm="10000"/>
+  <p:transition/>
   <p:timing>
     <p:tnLst>
       <p:par>
@@ -47702,7 +47731,7 @@
   <p:clrMapOvr>
     <a:masterClrMapping/>
   </p:clrMapOvr>
-  <p:transition advTm="10000"/>
+  <p:transition/>
   <p:timing>
     <p:tnLst>
       <p:par>
@@ -48175,7 +48204,7 @@
   <p:clrMapOvr>
     <a:masterClrMapping/>
   </p:clrMapOvr>
-  <p:transition advTm="10000"/>
+  <p:transition/>
   <p:timing>
     <p:tnLst>
       <p:par>
@@ -49298,6 +49327,18 @@
 </file>
 
 <file path=customXml/item1.xml><?xml version="1.0" encoding="utf-8"?>
+<p:properties xmlns:p="http://schemas.microsoft.com/office/2006/metadata/properties" xmlns:xsi="http://www.w3.org/2001/XMLSchema-instance">
+  <documentManagement>
+    <_dlc_DocId xmlns="8cc9f148-63af-4ae4-b4c0-3a33ca8129b3">DOCID-7-65</_dlc_DocId>
+    <_dlc_DocIdUrl xmlns="8cc9f148-63af-4ae4-b4c0-3a33ca8129b3">
+      <Url>https://portal.opitz-consulting.de/_layouts/DocIdRedir.aspx?ID=DOCID-7-65</Url>
+      <Description>DOCID-7-65</Description>
+    </_dlc_DocIdUrl>
+  </documentManagement>
+</p:properties>
+</file>
+
+<file path=customXml/item2.xml><?xml version="1.0" encoding="utf-8"?>
 <?mso-contentType ?>
 <spe:Receivers xmlns:spe="http://schemas.microsoft.com/sharepoint/events">
   <Receiver>
@@ -49343,19 +49384,16 @@
 </spe:Receivers>
 </file>
 
-<file path=customXml/item2.xml><?xml version="1.0" encoding="utf-8"?>
-<p:properties xmlns:p="http://schemas.microsoft.com/office/2006/metadata/properties" xmlns:xsi="http://www.w3.org/2001/XMLSchema-instance">
-  <documentManagement>
-    <_dlc_DocId xmlns="8cc9f148-63af-4ae4-b4c0-3a33ca8129b3">DOCID-7-65</_dlc_DocId>
-    <_dlc_DocIdUrl xmlns="8cc9f148-63af-4ae4-b4c0-3a33ca8129b3">
-      <Url>https://portal.opitz-consulting.de/_layouts/DocIdRedir.aspx?ID=DOCID-7-65</Url>
-      <Description>DOCID-7-65</Description>
-    </_dlc_DocIdUrl>
-  </documentManagement>
-</p:properties>
+<file path=customXml/item3.xml><?xml version="1.0" encoding="utf-8"?>
+<?mso-contentType ?>
+<FormTemplates xmlns="http://schemas.microsoft.com/sharepoint/v3/contenttype/forms">
+  <Display>DocumentLibraryForm</Display>
+  <Edit>DocumentLibraryForm</Edit>
+  <New>DocumentLibraryForm</New>
+</FormTemplates>
 </file>
 
-<file path=customXml/item3.xml><?xml version="1.0" encoding="utf-8"?>
+<file path=customXml/item4.xml><?xml version="1.0" encoding="utf-8"?>
 <ct:contentTypeSchema xmlns:ct="http://schemas.microsoft.com/office/2006/metadata/contentType" xmlns:ma="http://schemas.microsoft.com/office/2006/metadata/properties/metaAttributes" ct:_="" ma:_="" ma:contentTypeName="Dokument" ma:contentTypeID="0x010100F0B52A70371B6E438CF9C392B7191A29" ma:contentTypeVersion="11" ma:contentTypeDescription="Ein neues Dokument erstellen." ma:contentTypeScope="" ma:versionID="3e0049091e97ddc6c5a9b1c13a68b96a">
   <xsd:schema xmlns:xsd="http://www.w3.org/2001/XMLSchema" xmlns:xs="http://www.w3.org/2001/XMLSchema" xmlns:p="http://schemas.microsoft.com/office/2006/metadata/properties" xmlns:ns2="8cc9f148-63af-4ae4-b4c0-3a33ca8129b3" targetNamespace="http://schemas.microsoft.com/office/2006/metadata/properties" ma:root="true" ma:fieldsID="387f7d665b09c33f4d21a96ec7b2b776" ns2:_="">
     <xsd:import namespace="8cc9f148-63af-4ae4-b4c0-3a33ca8129b3"/>
@@ -49500,24 +49538,7 @@
 </ct:contentTypeSchema>
 </file>
 
-<file path=customXml/item4.xml><?xml version="1.0" encoding="utf-8"?>
-<?mso-contentType ?>
-<FormTemplates xmlns="http://schemas.microsoft.com/sharepoint/v3/contenttype/forms">
-  <Display>DocumentLibraryForm</Display>
-  <Edit>DocumentLibraryForm</Edit>
-  <New>DocumentLibraryForm</New>
-</FormTemplates>
-</file>
-
 <file path=customXml/itemProps1.xml><?xml version="1.0" encoding="utf-8"?>
-<ds:datastoreItem xmlns:ds="http://schemas.openxmlformats.org/officeDocument/2006/customXml" ds:itemID="{3D36A60C-181D-47DA-909E-3F329EE9755B}">
-  <ds:schemaRefs>
-    <ds:schemaRef ds:uri="http://schemas.microsoft.com/sharepoint/events"/>
-  </ds:schemaRefs>
-</ds:datastoreItem>
-</file>
-
-<file path=customXml/itemProps2.xml><?xml version="1.0" encoding="utf-8"?>
 <ds:datastoreItem xmlns:ds="http://schemas.openxmlformats.org/officeDocument/2006/customXml" ds:itemID="{AF7E4967-43BC-4F71-AEEC-BDE09349FE60}">
   <ds:schemaRefs>
     <ds:schemaRef ds:uri="http://purl.org/dc/elements/1.1/"/>
@@ -49533,7 +49554,23 @@
 </ds:datastoreItem>
 </file>
 
+<file path=customXml/itemProps2.xml><?xml version="1.0" encoding="utf-8"?>
+<ds:datastoreItem xmlns:ds="http://schemas.openxmlformats.org/officeDocument/2006/customXml" ds:itemID="{3D36A60C-181D-47DA-909E-3F329EE9755B}">
+  <ds:schemaRefs>
+    <ds:schemaRef ds:uri="http://schemas.microsoft.com/sharepoint/events"/>
+  </ds:schemaRefs>
+</ds:datastoreItem>
+</file>
+
 <file path=customXml/itemProps3.xml><?xml version="1.0" encoding="utf-8"?>
+<ds:datastoreItem xmlns:ds="http://schemas.openxmlformats.org/officeDocument/2006/customXml" ds:itemID="{7E7A0F45-7BDE-4AA7-A1BB-E146938E8111}">
+  <ds:schemaRefs>
+    <ds:schemaRef ds:uri="http://schemas.microsoft.com/sharepoint/v3/contenttype/forms"/>
+  </ds:schemaRefs>
+</ds:datastoreItem>
+</file>
+
+<file path=customXml/itemProps4.xml><?xml version="1.0" encoding="utf-8"?>
 <ds:datastoreItem xmlns:ds="http://schemas.openxmlformats.org/officeDocument/2006/customXml" ds:itemID="{C7C1A758-3BEA-47D2-B285-59AD51FEA791}">
   <ds:schemaRefs>
     <ds:schemaRef ds:uri="http://schemas.microsoft.com/office/2006/metadata/contentType"/>
@@ -49549,12 +49586,4 @@
     <ds:schemaRef ds:uri="http://schemas.microsoft.com/internal/obd"/>
   </ds:schemaRefs>
 </ds:datastoreItem>
-</file>
-
-<file path=customXml/itemProps4.xml><?xml version="1.0" encoding="utf-8"?>
-<ds:datastoreItem xmlns:ds="http://schemas.openxmlformats.org/officeDocument/2006/customXml" ds:itemID="{7E7A0F45-7BDE-4AA7-A1BB-E146938E8111}">
-  <ds:schemaRefs>
-    <ds:schemaRef ds:uri="http://schemas.microsoft.com/sharepoint/v3/contenttype/forms"/>
-  </ds:schemaRefs>
-</ds:datastoreItem>
 </file>
</xml_diff>